<commit_message>
figure 1 and fig 1 caption edits
</commit_message>
<xml_diff>
--- a/paper_rmd/fig_levels.pptx
+++ b/paper_rmd/fig_levels.pptx
@@ -154,7 +154,7 @@
           </a:lstStyle>
           <a:p>
             <a:r>
-              <a:rPr lang="es-ES" smtClean="0"/>
+              <a:rPr lang="es-ES"/>
               <a:t>Click to edit Master title style</a:t>
             </a:r>
             <a:endParaRPr lang="en-US" dirty="0"/>
@@ -219,7 +219,7 @@
           </a:lstStyle>
           <a:p>
             <a:r>
-              <a:rPr lang="es-ES" smtClean="0"/>
+              <a:rPr lang="es-ES"/>
               <a:t>Click to edit Master subtitle style</a:t>
             </a:r>
             <a:endParaRPr lang="en-US" dirty="0"/>
@@ -243,7 +243,7 @@
           <a:p>
             <a:fld id="{B379093E-BEAA-FA4E-8A8F-8A6D064ADF88}" type="datetimeFigureOut">
               <a:rPr lang="en-US" smtClean="0"/>
-              <a:t>10/3/19</a:t>
+              <a:t>1/14/20</a:t>
             </a:fld>
             <a:endParaRPr lang="en-US"/>
           </a:p>
@@ -337,7 +337,7 @@
           <a:lstStyle/>
           <a:p>
             <a:r>
-              <a:rPr lang="es-ES" smtClean="0"/>
+              <a:rPr lang="es-ES"/>
               <a:t>Click to edit Master title style</a:t>
             </a:r>
             <a:endParaRPr lang="en-US" dirty="0"/>
@@ -361,35 +361,35 @@
           <a:p>
             <a:pPr lvl="0"/>
             <a:r>
-              <a:rPr lang="es-ES" smtClean="0"/>
+              <a:rPr lang="es-ES"/>
               <a:t>Click to edit Master text styles</a:t>
             </a:r>
           </a:p>
           <a:p>
             <a:pPr lvl="1"/>
             <a:r>
-              <a:rPr lang="es-ES" smtClean="0"/>
+              <a:rPr lang="es-ES"/>
               <a:t>Second level</a:t>
             </a:r>
           </a:p>
           <a:p>
             <a:pPr lvl="2"/>
             <a:r>
-              <a:rPr lang="es-ES" smtClean="0"/>
+              <a:rPr lang="es-ES"/>
               <a:t>Third level</a:t>
             </a:r>
           </a:p>
           <a:p>
             <a:pPr lvl="3"/>
             <a:r>
-              <a:rPr lang="es-ES" smtClean="0"/>
+              <a:rPr lang="es-ES"/>
               <a:t>Fourth level</a:t>
             </a:r>
           </a:p>
           <a:p>
             <a:pPr lvl="4"/>
             <a:r>
-              <a:rPr lang="es-ES" smtClean="0"/>
+              <a:rPr lang="es-ES"/>
               <a:t>Fifth level</a:t>
             </a:r>
             <a:endParaRPr lang="en-US" dirty="0"/>
@@ -413,7 +413,7 @@
           <a:p>
             <a:fld id="{B379093E-BEAA-FA4E-8A8F-8A6D064ADF88}" type="datetimeFigureOut">
               <a:rPr lang="en-US" smtClean="0"/>
-              <a:t>10/3/19</a:t>
+              <a:t>1/14/20</a:t>
             </a:fld>
             <a:endParaRPr lang="en-US"/>
           </a:p>
@@ -512,7 +512,7 @@
           <a:lstStyle/>
           <a:p>
             <a:r>
-              <a:rPr lang="es-ES" smtClean="0"/>
+              <a:rPr lang="es-ES"/>
               <a:t>Click to edit Master title style</a:t>
             </a:r>
             <a:endParaRPr lang="en-US" dirty="0"/>
@@ -541,35 +541,35 @@
           <a:p>
             <a:pPr lvl="0"/>
             <a:r>
-              <a:rPr lang="es-ES" smtClean="0"/>
+              <a:rPr lang="es-ES"/>
               <a:t>Click to edit Master text styles</a:t>
             </a:r>
           </a:p>
           <a:p>
             <a:pPr lvl="1"/>
             <a:r>
-              <a:rPr lang="es-ES" smtClean="0"/>
+              <a:rPr lang="es-ES"/>
               <a:t>Second level</a:t>
             </a:r>
           </a:p>
           <a:p>
             <a:pPr lvl="2"/>
             <a:r>
-              <a:rPr lang="es-ES" smtClean="0"/>
+              <a:rPr lang="es-ES"/>
               <a:t>Third level</a:t>
             </a:r>
           </a:p>
           <a:p>
             <a:pPr lvl="3"/>
             <a:r>
-              <a:rPr lang="es-ES" smtClean="0"/>
+              <a:rPr lang="es-ES"/>
               <a:t>Fourth level</a:t>
             </a:r>
           </a:p>
           <a:p>
             <a:pPr lvl="4"/>
             <a:r>
-              <a:rPr lang="es-ES" smtClean="0"/>
+              <a:rPr lang="es-ES"/>
               <a:t>Fifth level</a:t>
             </a:r>
             <a:endParaRPr lang="en-US" dirty="0"/>
@@ -593,7 +593,7 @@
           <a:p>
             <a:fld id="{B379093E-BEAA-FA4E-8A8F-8A6D064ADF88}" type="datetimeFigureOut">
               <a:rPr lang="en-US" smtClean="0"/>
-              <a:t>10/3/19</a:t>
+              <a:t>1/14/20</a:t>
             </a:fld>
             <a:endParaRPr lang="en-US"/>
           </a:p>
@@ -687,7 +687,7 @@
           <a:lstStyle/>
           <a:p>
             <a:r>
-              <a:rPr lang="es-ES" smtClean="0"/>
+              <a:rPr lang="es-ES"/>
               <a:t>Click to edit Master title style</a:t>
             </a:r>
             <a:endParaRPr lang="en-US" dirty="0"/>
@@ -711,35 +711,35 @@
           <a:p>
             <a:pPr lvl="0"/>
             <a:r>
-              <a:rPr lang="es-ES" smtClean="0"/>
+              <a:rPr lang="es-ES"/>
               <a:t>Click to edit Master text styles</a:t>
             </a:r>
           </a:p>
           <a:p>
             <a:pPr lvl="1"/>
             <a:r>
-              <a:rPr lang="es-ES" smtClean="0"/>
+              <a:rPr lang="es-ES"/>
               <a:t>Second level</a:t>
             </a:r>
           </a:p>
           <a:p>
             <a:pPr lvl="2"/>
             <a:r>
-              <a:rPr lang="es-ES" smtClean="0"/>
+              <a:rPr lang="es-ES"/>
               <a:t>Third level</a:t>
             </a:r>
           </a:p>
           <a:p>
             <a:pPr lvl="3"/>
             <a:r>
-              <a:rPr lang="es-ES" smtClean="0"/>
+              <a:rPr lang="es-ES"/>
               <a:t>Fourth level</a:t>
             </a:r>
           </a:p>
           <a:p>
             <a:pPr lvl="4"/>
             <a:r>
-              <a:rPr lang="es-ES" smtClean="0"/>
+              <a:rPr lang="es-ES"/>
               <a:t>Fifth level</a:t>
             </a:r>
             <a:endParaRPr lang="en-US" dirty="0"/>
@@ -763,7 +763,7 @@
           <a:p>
             <a:fld id="{B379093E-BEAA-FA4E-8A8F-8A6D064ADF88}" type="datetimeFigureOut">
               <a:rPr lang="en-US" smtClean="0"/>
-              <a:t>10/3/19</a:t>
+              <a:t>1/14/20</a:t>
             </a:fld>
             <a:endParaRPr lang="en-US"/>
           </a:p>
@@ -866,7 +866,7 @@
           </a:lstStyle>
           <a:p>
             <a:r>
-              <a:rPr lang="es-ES" smtClean="0"/>
+              <a:rPr lang="es-ES"/>
               <a:t>Click to edit Master title style</a:t>
             </a:r>
             <a:endParaRPr lang="en-US" dirty="0"/>
@@ -986,7 +986,7 @@
           <a:p>
             <a:pPr lvl="0"/>
             <a:r>
-              <a:rPr lang="es-ES" smtClean="0"/>
+              <a:rPr lang="es-ES"/>
               <a:t>Click to edit Master text styles</a:t>
             </a:r>
           </a:p>
@@ -1009,7 +1009,7 @@
           <a:p>
             <a:fld id="{B379093E-BEAA-FA4E-8A8F-8A6D064ADF88}" type="datetimeFigureOut">
               <a:rPr lang="en-US" smtClean="0"/>
-              <a:t>10/3/19</a:t>
+              <a:t>1/14/20</a:t>
             </a:fld>
             <a:endParaRPr lang="en-US"/>
           </a:p>
@@ -1103,7 +1103,7 @@
           <a:lstStyle/>
           <a:p>
             <a:r>
-              <a:rPr lang="es-ES" smtClean="0"/>
+              <a:rPr lang="es-ES"/>
               <a:t>Click to edit Master title style</a:t>
             </a:r>
             <a:endParaRPr lang="en-US" dirty="0"/>
@@ -1132,35 +1132,35 @@
           <a:p>
             <a:pPr lvl="0"/>
             <a:r>
-              <a:rPr lang="es-ES" smtClean="0"/>
+              <a:rPr lang="es-ES"/>
               <a:t>Click to edit Master text styles</a:t>
             </a:r>
           </a:p>
           <a:p>
             <a:pPr lvl="1"/>
             <a:r>
-              <a:rPr lang="es-ES" smtClean="0"/>
+              <a:rPr lang="es-ES"/>
               <a:t>Second level</a:t>
             </a:r>
           </a:p>
           <a:p>
             <a:pPr lvl="2"/>
             <a:r>
-              <a:rPr lang="es-ES" smtClean="0"/>
+              <a:rPr lang="es-ES"/>
               <a:t>Third level</a:t>
             </a:r>
           </a:p>
           <a:p>
             <a:pPr lvl="3"/>
             <a:r>
-              <a:rPr lang="es-ES" smtClean="0"/>
+              <a:rPr lang="es-ES"/>
               <a:t>Fourth level</a:t>
             </a:r>
           </a:p>
           <a:p>
             <a:pPr lvl="4"/>
             <a:r>
-              <a:rPr lang="es-ES" smtClean="0"/>
+              <a:rPr lang="es-ES"/>
               <a:t>Fifth level</a:t>
             </a:r>
             <a:endParaRPr lang="en-US" dirty="0"/>
@@ -1189,35 +1189,35 @@
           <a:p>
             <a:pPr lvl="0"/>
             <a:r>
-              <a:rPr lang="es-ES" smtClean="0"/>
+              <a:rPr lang="es-ES"/>
               <a:t>Click to edit Master text styles</a:t>
             </a:r>
           </a:p>
           <a:p>
             <a:pPr lvl="1"/>
             <a:r>
-              <a:rPr lang="es-ES" smtClean="0"/>
+              <a:rPr lang="es-ES"/>
               <a:t>Second level</a:t>
             </a:r>
           </a:p>
           <a:p>
             <a:pPr lvl="2"/>
             <a:r>
-              <a:rPr lang="es-ES" smtClean="0"/>
+              <a:rPr lang="es-ES"/>
               <a:t>Third level</a:t>
             </a:r>
           </a:p>
           <a:p>
             <a:pPr lvl="3"/>
             <a:r>
-              <a:rPr lang="es-ES" smtClean="0"/>
+              <a:rPr lang="es-ES"/>
               <a:t>Fourth level</a:t>
             </a:r>
           </a:p>
           <a:p>
             <a:pPr lvl="4"/>
             <a:r>
-              <a:rPr lang="es-ES" smtClean="0"/>
+              <a:rPr lang="es-ES"/>
               <a:t>Fifth level</a:t>
             </a:r>
             <a:endParaRPr lang="en-US" dirty="0"/>
@@ -1241,7 +1241,7 @@
           <a:p>
             <a:fld id="{B379093E-BEAA-FA4E-8A8F-8A6D064ADF88}" type="datetimeFigureOut">
               <a:rPr lang="en-US" smtClean="0"/>
-              <a:t>10/3/19</a:t>
+              <a:t>1/14/20</a:t>
             </a:fld>
             <a:endParaRPr lang="en-US"/>
           </a:p>
@@ -1340,7 +1340,7 @@
           <a:lstStyle/>
           <a:p>
             <a:r>
-              <a:rPr lang="es-ES" smtClean="0"/>
+              <a:rPr lang="es-ES"/>
               <a:t>Click to edit Master title style</a:t>
             </a:r>
             <a:endParaRPr lang="en-US" dirty="0"/>
@@ -1406,7 +1406,7 @@
           <a:p>
             <a:pPr lvl="0"/>
             <a:r>
-              <a:rPr lang="es-ES" smtClean="0"/>
+              <a:rPr lang="es-ES"/>
               <a:t>Click to edit Master text styles</a:t>
             </a:r>
           </a:p>
@@ -1434,35 +1434,35 @@
           <a:p>
             <a:pPr lvl="0"/>
             <a:r>
-              <a:rPr lang="es-ES" smtClean="0"/>
+              <a:rPr lang="es-ES"/>
               <a:t>Click to edit Master text styles</a:t>
             </a:r>
           </a:p>
           <a:p>
             <a:pPr lvl="1"/>
             <a:r>
-              <a:rPr lang="es-ES" smtClean="0"/>
+              <a:rPr lang="es-ES"/>
               <a:t>Second level</a:t>
             </a:r>
           </a:p>
           <a:p>
             <a:pPr lvl="2"/>
             <a:r>
-              <a:rPr lang="es-ES" smtClean="0"/>
+              <a:rPr lang="es-ES"/>
               <a:t>Third level</a:t>
             </a:r>
           </a:p>
           <a:p>
             <a:pPr lvl="3"/>
             <a:r>
-              <a:rPr lang="es-ES" smtClean="0"/>
+              <a:rPr lang="es-ES"/>
               <a:t>Fourth level</a:t>
             </a:r>
           </a:p>
           <a:p>
             <a:pPr lvl="4"/>
             <a:r>
-              <a:rPr lang="es-ES" smtClean="0"/>
+              <a:rPr lang="es-ES"/>
               <a:t>Fifth level</a:t>
             </a:r>
             <a:endParaRPr lang="en-US" dirty="0"/>
@@ -1528,7 +1528,7 @@
           <a:p>
             <a:pPr lvl="0"/>
             <a:r>
-              <a:rPr lang="es-ES" smtClean="0"/>
+              <a:rPr lang="es-ES"/>
               <a:t>Click to edit Master text styles</a:t>
             </a:r>
           </a:p>
@@ -1556,35 +1556,35 @@
           <a:p>
             <a:pPr lvl="0"/>
             <a:r>
-              <a:rPr lang="es-ES" smtClean="0"/>
+              <a:rPr lang="es-ES"/>
               <a:t>Click to edit Master text styles</a:t>
             </a:r>
           </a:p>
           <a:p>
             <a:pPr lvl="1"/>
             <a:r>
-              <a:rPr lang="es-ES" smtClean="0"/>
+              <a:rPr lang="es-ES"/>
               <a:t>Second level</a:t>
             </a:r>
           </a:p>
           <a:p>
             <a:pPr lvl="2"/>
             <a:r>
-              <a:rPr lang="es-ES" smtClean="0"/>
+              <a:rPr lang="es-ES"/>
               <a:t>Third level</a:t>
             </a:r>
           </a:p>
           <a:p>
             <a:pPr lvl="3"/>
             <a:r>
-              <a:rPr lang="es-ES" smtClean="0"/>
+              <a:rPr lang="es-ES"/>
               <a:t>Fourth level</a:t>
             </a:r>
           </a:p>
           <a:p>
             <a:pPr lvl="4"/>
             <a:r>
-              <a:rPr lang="es-ES" smtClean="0"/>
+              <a:rPr lang="es-ES"/>
               <a:t>Fifth level</a:t>
             </a:r>
             <a:endParaRPr lang="en-US" dirty="0"/>
@@ -1608,7 +1608,7 @@
           <a:p>
             <a:fld id="{B379093E-BEAA-FA4E-8A8F-8A6D064ADF88}" type="datetimeFigureOut">
               <a:rPr lang="en-US" smtClean="0"/>
-              <a:t>10/3/19</a:t>
+              <a:t>1/14/20</a:t>
             </a:fld>
             <a:endParaRPr lang="en-US"/>
           </a:p>
@@ -1702,7 +1702,7 @@
           <a:lstStyle/>
           <a:p>
             <a:r>
-              <a:rPr lang="es-ES" smtClean="0"/>
+              <a:rPr lang="es-ES"/>
               <a:t>Click to edit Master title style</a:t>
             </a:r>
             <a:endParaRPr lang="en-US" dirty="0"/>
@@ -1726,7 +1726,7 @@
           <a:p>
             <a:fld id="{B379093E-BEAA-FA4E-8A8F-8A6D064ADF88}" type="datetimeFigureOut">
               <a:rPr lang="en-US" smtClean="0"/>
-              <a:t>10/3/19</a:t>
+              <a:t>1/14/20</a:t>
             </a:fld>
             <a:endParaRPr lang="en-US"/>
           </a:p>
@@ -1821,7 +1821,7 @@
           <a:p>
             <a:fld id="{B379093E-BEAA-FA4E-8A8F-8A6D064ADF88}" type="datetimeFigureOut">
               <a:rPr lang="en-US" smtClean="0"/>
-              <a:t>10/3/19</a:t>
+              <a:t>1/14/20</a:t>
             </a:fld>
             <a:endParaRPr lang="en-US"/>
           </a:p>
@@ -1924,7 +1924,7 @@
           </a:lstStyle>
           <a:p>
             <a:r>
-              <a:rPr lang="es-ES" smtClean="0"/>
+              <a:rPr lang="es-ES"/>
               <a:t>Click to edit Master title style</a:t>
             </a:r>
             <a:endParaRPr lang="en-US" dirty="0"/>
@@ -1981,35 +1981,35 @@
           <a:p>
             <a:pPr lvl="0"/>
             <a:r>
-              <a:rPr lang="es-ES" smtClean="0"/>
+              <a:rPr lang="es-ES"/>
               <a:t>Click to edit Master text styles</a:t>
             </a:r>
           </a:p>
           <a:p>
             <a:pPr lvl="1"/>
             <a:r>
-              <a:rPr lang="es-ES" smtClean="0"/>
+              <a:rPr lang="es-ES"/>
               <a:t>Second level</a:t>
             </a:r>
           </a:p>
           <a:p>
             <a:pPr lvl="2"/>
             <a:r>
-              <a:rPr lang="es-ES" smtClean="0"/>
+              <a:rPr lang="es-ES"/>
               <a:t>Third level</a:t>
             </a:r>
           </a:p>
           <a:p>
             <a:pPr lvl="3"/>
             <a:r>
-              <a:rPr lang="es-ES" smtClean="0"/>
+              <a:rPr lang="es-ES"/>
               <a:t>Fourth level</a:t>
             </a:r>
           </a:p>
           <a:p>
             <a:pPr lvl="4"/>
             <a:r>
-              <a:rPr lang="es-ES" smtClean="0"/>
+              <a:rPr lang="es-ES"/>
               <a:t>Fifth level</a:t>
             </a:r>
             <a:endParaRPr lang="en-US" dirty="0"/>
@@ -2075,7 +2075,7 @@
           <a:p>
             <a:pPr lvl="0"/>
             <a:r>
-              <a:rPr lang="es-ES" smtClean="0"/>
+              <a:rPr lang="es-ES"/>
               <a:t>Click to edit Master text styles</a:t>
             </a:r>
           </a:p>
@@ -2098,7 +2098,7 @@
           <a:p>
             <a:fld id="{B379093E-BEAA-FA4E-8A8F-8A6D064ADF88}" type="datetimeFigureOut">
               <a:rPr lang="en-US" smtClean="0"/>
-              <a:t>10/3/19</a:t>
+              <a:t>1/14/20</a:t>
             </a:fld>
             <a:endParaRPr lang="en-US"/>
           </a:p>
@@ -2201,7 +2201,7 @@
           </a:lstStyle>
           <a:p>
             <a:r>
-              <a:rPr lang="es-ES" smtClean="0"/>
+              <a:rPr lang="es-ES"/>
               <a:t>Click to edit Master title style</a:t>
             </a:r>
             <a:endParaRPr lang="en-US" dirty="0"/>
@@ -2266,7 +2266,7 @@
           </a:lstStyle>
           <a:p>
             <a:r>
-              <a:rPr lang="es-ES" smtClean="0"/>
+              <a:rPr lang="es-ES"/>
               <a:t>Drag picture to placeholder or click icon to add</a:t>
             </a:r>
             <a:endParaRPr lang="en-US" dirty="0"/>
@@ -2332,7 +2332,7 @@
           <a:p>
             <a:pPr lvl="0"/>
             <a:r>
-              <a:rPr lang="es-ES" smtClean="0"/>
+              <a:rPr lang="es-ES"/>
               <a:t>Click to edit Master text styles</a:t>
             </a:r>
           </a:p>
@@ -2355,7 +2355,7 @@
           <a:p>
             <a:fld id="{B379093E-BEAA-FA4E-8A8F-8A6D064ADF88}" type="datetimeFigureOut">
               <a:rPr lang="en-US" smtClean="0"/>
-              <a:t>10/3/19</a:t>
+              <a:t>1/14/20</a:t>
             </a:fld>
             <a:endParaRPr lang="en-US"/>
           </a:p>
@@ -2464,7 +2464,7 @@
           <a:lstStyle/>
           <a:p>
             <a:r>
-              <a:rPr lang="es-ES" smtClean="0"/>
+              <a:rPr lang="es-ES"/>
               <a:t>Click to edit Master title style</a:t>
             </a:r>
             <a:endParaRPr lang="en-US" dirty="0"/>
@@ -2498,35 +2498,35 @@
           <a:p>
             <a:pPr lvl="0"/>
             <a:r>
-              <a:rPr lang="es-ES" smtClean="0"/>
+              <a:rPr lang="es-ES"/>
               <a:t>Click to edit Master text styles</a:t>
             </a:r>
           </a:p>
           <a:p>
             <a:pPr lvl="1"/>
             <a:r>
-              <a:rPr lang="es-ES" smtClean="0"/>
+              <a:rPr lang="es-ES"/>
               <a:t>Second level</a:t>
             </a:r>
           </a:p>
           <a:p>
             <a:pPr lvl="2"/>
             <a:r>
-              <a:rPr lang="es-ES" smtClean="0"/>
+              <a:rPr lang="es-ES"/>
               <a:t>Third level</a:t>
             </a:r>
           </a:p>
           <a:p>
             <a:pPr lvl="3"/>
             <a:r>
-              <a:rPr lang="es-ES" smtClean="0"/>
+              <a:rPr lang="es-ES"/>
               <a:t>Fourth level</a:t>
             </a:r>
           </a:p>
           <a:p>
             <a:pPr lvl="4"/>
             <a:r>
-              <a:rPr lang="es-ES" smtClean="0"/>
+              <a:rPr lang="es-ES"/>
               <a:t>Fifth level</a:t>
             </a:r>
             <a:endParaRPr lang="en-US" dirty="0"/>
@@ -2568,7 +2568,7 @@
           <a:p>
             <a:fld id="{B379093E-BEAA-FA4E-8A8F-8A6D064ADF88}" type="datetimeFigureOut">
               <a:rPr lang="en-US" smtClean="0"/>
-              <a:t>10/3/19</a:t>
+              <a:t>1/14/20</a:t>
             </a:fld>
             <a:endParaRPr lang="en-US"/>
           </a:p>
@@ -3513,10 +3513,9 @@
           <a:lstStyle/>
           <a:p>
             <a:r>
-              <a:rPr lang="en-US" smtClean="0"/>
+              <a:rPr lang="en-US"/>
               <a:t>Recording</a:t>
             </a:r>
-            <a:endParaRPr lang="en-US"/>
           </a:p>
         </p:txBody>
       </p:sp>
@@ -3543,10 +3542,9 @@
           <a:lstStyle/>
           <a:p>
             <a:r>
-              <a:rPr lang="en-US" dirty="0" smtClean="0"/>
+              <a:rPr lang="en-US" dirty="0"/>
               <a:t>Clip</a:t>
             </a:r>
-            <a:endParaRPr lang="en-US" dirty="0"/>
           </a:p>
         </p:txBody>
       </p:sp>
@@ -3558,7 +3556,7 @@
         </p:nvSpPr>
         <p:spPr>
           <a:xfrm>
-            <a:off x="4128523" y="270404"/>
+            <a:off x="4128523" y="267477"/>
             <a:ext cx="639175" cy="276071"/>
           </a:xfrm>
           <a:prstGeom prst="rect">
@@ -3587,10 +3585,9 @@
           <a:p>
             <a:pPr algn="ctr"/>
             <a:r>
-              <a:rPr lang="en-US" dirty="0" smtClean="0"/>
+              <a:rPr lang="en-US" dirty="0"/>
               <a:t>SIL</a:t>
             </a:r>
-            <a:endParaRPr lang="en-US" dirty="0"/>
           </a:p>
         </p:txBody>
       </p:sp>
@@ -3617,7 +3614,7 @@
           <a:lstStyle/>
           <a:p>
             <a:r>
-              <a:rPr lang="en-US" smtClean="0"/>
+              <a:rPr lang="en-US"/>
               <a:t>LENA</a:t>
             </a:r>
             <a:endParaRPr lang="en-US" dirty="0"/>
@@ -3632,7 +3629,7 @@
         </p:nvSpPr>
         <p:spPr>
           <a:xfrm>
-            <a:off x="4767698" y="267478"/>
+            <a:off x="4767698" y="267477"/>
             <a:ext cx="1278350" cy="286814"/>
           </a:xfrm>
           <a:prstGeom prst="rect">
@@ -3664,10 +3661,9 @@
           <a:p>
             <a:pPr algn="ctr"/>
             <a:r>
-              <a:rPr lang="en-US" dirty="0" smtClean="0"/>
+              <a:rPr lang="en-US" dirty="0"/>
               <a:t>CHN</a:t>
             </a:r>
-            <a:endParaRPr lang="en-US" dirty="0"/>
           </a:p>
         </p:txBody>
       </p:sp>
@@ -3711,10 +3707,9 @@
           <a:p>
             <a:pPr algn="ctr"/>
             <a:r>
-              <a:rPr lang="en-US" dirty="0" smtClean="0"/>
+              <a:rPr lang="en-US" dirty="0"/>
               <a:t>FAN</a:t>
             </a:r>
-            <a:endParaRPr lang="en-US" dirty="0"/>
           </a:p>
         </p:txBody>
       </p:sp>
@@ -3761,13 +3756,8 @@
             <a:pPr algn="ctr"/>
             <a:r>
               <a:rPr lang="en-US" dirty="0"/>
-              <a:t>M</a:t>
-            </a:r>
-            <a:r>
-              <a:rPr lang="en-US" dirty="0" smtClean="0"/>
-              <a:t>AN</a:t>
-            </a:r>
-            <a:endParaRPr lang="en-US" dirty="0"/>
+              <a:t>MAN</a:t>
+            </a:r>
           </a:p>
         </p:txBody>
       </p:sp>
@@ -3779,7 +3769,7 @@
         </p:nvSpPr>
         <p:spPr>
           <a:xfrm>
-            <a:off x="8278606" y="280410"/>
+            <a:off x="8278606" y="267477"/>
             <a:ext cx="1013345" cy="273882"/>
           </a:xfrm>
           <a:prstGeom prst="rect">
@@ -3808,10 +3798,9 @@
           <a:p>
             <a:pPr algn="ctr"/>
             <a:r>
-              <a:rPr lang="en-US" dirty="0" smtClean="0"/>
+              <a:rPr lang="en-US" dirty="0"/>
               <a:t>SIL</a:t>
             </a:r>
-            <a:endParaRPr lang="en-US" dirty="0"/>
           </a:p>
         </p:txBody>
       </p:sp>
@@ -3838,7 +3827,7 @@
           <a:lstStyle/>
           <a:p>
             <a:r>
-              <a:rPr lang="en-US" smtClean="0"/>
+              <a:rPr lang="en-US"/>
               <a:t>Human</a:t>
             </a:r>
             <a:endParaRPr lang="en-US" dirty="0"/>
@@ -3853,7 +3842,7 @@
         </p:nvSpPr>
         <p:spPr>
           <a:xfrm>
-            <a:off x="4602817" y="1479996"/>
+            <a:off x="4602817" y="1424580"/>
             <a:ext cx="1174129" cy="322702"/>
           </a:xfrm>
           <a:prstGeom prst="rect">
@@ -3885,10 +3874,9 @@
           <a:p>
             <a:pPr algn="ctr"/>
             <a:r>
-              <a:rPr lang="en-US" dirty="0" smtClean="0"/>
+              <a:rPr lang="en-US" dirty="0"/>
               <a:t>Key child</a:t>
             </a:r>
-            <a:endParaRPr lang="en-US" dirty="0"/>
           </a:p>
         </p:txBody>
       </p:sp>
@@ -3900,7 +3888,7 @@
         </p:nvSpPr>
         <p:spPr>
           <a:xfrm>
-            <a:off x="5776946" y="2013053"/>
+            <a:off x="5776946" y="1763681"/>
             <a:ext cx="1792968" cy="272838"/>
           </a:xfrm>
           <a:prstGeom prst="rect">
@@ -3932,10 +3920,9 @@
           <a:p>
             <a:pPr algn="ctr"/>
             <a:r>
-              <a:rPr lang="en-US" dirty="0" smtClean="0"/>
+              <a:rPr lang="en-US" dirty="0"/>
               <a:t>Female Ad</a:t>
             </a:r>
-            <a:endParaRPr lang="en-US" dirty="0"/>
           </a:p>
         </p:txBody>
       </p:sp>
@@ -3947,7 +3934,7 @@
         </p:nvSpPr>
         <p:spPr>
           <a:xfrm>
-            <a:off x="7979331" y="1480883"/>
+            <a:off x="7979331" y="1425467"/>
             <a:ext cx="1174129" cy="322702"/>
           </a:xfrm>
           <a:prstGeom prst="rect">
@@ -3979,86 +3966,9 @@
           <a:p>
             <a:pPr algn="ctr"/>
             <a:r>
-              <a:rPr lang="en-US" dirty="0" smtClean="0"/>
+              <a:rPr lang="en-US" dirty="0"/>
               <a:t>Key child</a:t>
             </a:r>
-            <a:endParaRPr lang="en-US" dirty="0"/>
-          </a:p>
-        </p:txBody>
-      </p:sp>
-      <p:sp>
-        <p:nvSpPr>
-          <p:cNvPr id="172" name="TextBox 171"/>
-          <p:cNvSpPr txBox="1"/>
-          <p:nvPr/>
-        </p:nvSpPr>
-        <p:spPr>
-          <a:xfrm>
-            <a:off x="11892983" y="39107"/>
-            <a:ext cx="1278351" cy="395045"/>
-          </a:xfrm>
-          <a:prstGeom prst="rect">
-            <a:avLst/>
-          </a:prstGeom>
-          <a:noFill/>
-        </p:spPr>
-        <p:txBody>
-          <a:bodyPr wrap="square" rtlCol="0">
-            <a:spAutoFit/>
-          </a:bodyPr>
-          <a:lstStyle/>
-          <a:p>
-            <a:r>
-              <a:rPr lang="en-US" dirty="0" smtClean="0">
-                <a:solidFill>
-                  <a:srgbClr val="FF0000"/>
-                </a:solidFill>
-              </a:rPr>
-              <a:t>CVC=1</a:t>
-            </a:r>
-            <a:endParaRPr lang="en-US" dirty="0">
-              <a:solidFill>
-                <a:srgbClr val="FF0000"/>
-              </a:solidFill>
-            </a:endParaRPr>
-          </a:p>
-        </p:txBody>
-      </p:sp>
-      <p:sp>
-        <p:nvSpPr>
-          <p:cNvPr id="173" name="TextBox 172"/>
-          <p:cNvSpPr txBox="1"/>
-          <p:nvPr/>
-        </p:nvSpPr>
-        <p:spPr>
-          <a:xfrm>
-            <a:off x="11911665" y="339790"/>
-            <a:ext cx="1278351" cy="395045"/>
-          </a:xfrm>
-          <a:prstGeom prst="rect">
-            <a:avLst/>
-          </a:prstGeom>
-          <a:noFill/>
-        </p:spPr>
-        <p:txBody>
-          <a:bodyPr wrap="square" rtlCol="0">
-            <a:spAutoFit/>
-          </a:bodyPr>
-          <a:lstStyle/>
-          <a:p>
-            <a:r>
-              <a:rPr lang="en-US" dirty="0" smtClean="0">
-                <a:solidFill>
-                  <a:srgbClr val="FF0000"/>
-                </a:solidFill>
-              </a:rPr>
-              <a:t>CTC=1</a:t>
-            </a:r>
-            <a:endParaRPr lang="en-US" dirty="0">
-              <a:solidFill>
-                <a:srgbClr val="FF0000"/>
-              </a:solidFill>
-            </a:endParaRPr>
           </a:p>
         </p:txBody>
       </p:sp>
@@ -4070,7 +3980,7 @@
         </p:nvSpPr>
         <p:spPr>
           <a:xfrm>
-            <a:off x="4091671" y="184929"/>
+            <a:off x="4103556" y="258817"/>
             <a:ext cx="5200279" cy="730878"/>
           </a:xfrm>
           <a:prstGeom prst="rect">
@@ -4117,7 +4027,7 @@
         </p:nvSpPr>
         <p:spPr>
           <a:xfrm>
-            <a:off x="4085084" y="1296958"/>
+            <a:off x="4103556" y="1047586"/>
             <a:ext cx="5200279" cy="1256462"/>
           </a:xfrm>
           <a:prstGeom prst="rect">
@@ -4164,7 +4074,7 @@
         </p:nvSpPr>
         <p:spPr>
           <a:xfrm>
-            <a:off x="6291563" y="599015"/>
+            <a:off x="6162259" y="599015"/>
             <a:ext cx="1278351" cy="369332"/>
           </a:xfrm>
           <a:prstGeom prst="rect">
@@ -4179,10 +4089,9 @@
           <a:lstStyle/>
           <a:p>
             <a:r>
-              <a:rPr lang="en-US" smtClean="0"/>
+              <a:rPr lang="en-US" dirty="0"/>
               <a:t>AWC=2.3</a:t>
             </a:r>
-            <a:endParaRPr lang="en-US" dirty="0"/>
           </a:p>
         </p:txBody>
       </p:sp>
@@ -4194,7 +4103,7 @@
         </p:nvSpPr>
         <p:spPr>
           <a:xfrm>
-            <a:off x="7393105" y="595294"/>
+            <a:off x="7263801" y="595294"/>
             <a:ext cx="1278351" cy="369332"/>
           </a:xfrm>
           <a:prstGeom prst="rect">
@@ -4209,10 +4118,9 @@
           <a:lstStyle/>
           <a:p>
             <a:r>
-              <a:rPr lang="en-US" smtClean="0"/>
+              <a:rPr lang="en-US" dirty="0"/>
               <a:t>AWC=1.3</a:t>
             </a:r>
-            <a:endParaRPr lang="en-US" dirty="0"/>
           </a:p>
         </p:txBody>
       </p:sp>
@@ -4224,7 +4132,7 @@
         </p:nvSpPr>
         <p:spPr>
           <a:xfrm>
-            <a:off x="6025642" y="2248037"/>
+            <a:off x="6127957" y="1998970"/>
             <a:ext cx="1278351" cy="369332"/>
           </a:xfrm>
           <a:prstGeom prst="rect">
@@ -4239,162 +4147,9 @@
           <a:lstStyle/>
           <a:p>
             <a:r>
-              <a:rPr lang="en-US" dirty="0" smtClean="0"/>
+              <a:rPr lang="en-US" dirty="0"/>
               <a:t>AWC=6</a:t>
             </a:r>
-            <a:endParaRPr lang="en-US" dirty="0"/>
-          </a:p>
-        </p:txBody>
-      </p:sp>
-      <p:sp>
-        <p:nvSpPr>
-          <p:cNvPr id="179" name="TextBox 178"/>
-          <p:cNvSpPr txBox="1"/>
-          <p:nvPr/>
-        </p:nvSpPr>
-        <p:spPr>
-          <a:xfrm>
-            <a:off x="11866484" y="641492"/>
-            <a:ext cx="1278351" cy="395045"/>
-          </a:xfrm>
-          <a:prstGeom prst="rect">
-            <a:avLst/>
-          </a:prstGeom>
-          <a:noFill/>
-        </p:spPr>
-        <p:txBody>
-          <a:bodyPr wrap="square" rtlCol="0">
-            <a:spAutoFit/>
-          </a:bodyPr>
-          <a:lstStyle/>
-          <a:p>
-            <a:r>
-              <a:rPr lang="en-US" dirty="0" smtClean="0">
-                <a:solidFill>
-                  <a:srgbClr val="FF0000"/>
-                </a:solidFill>
-              </a:rPr>
-              <a:t>AWC=3.6</a:t>
-            </a:r>
-            <a:endParaRPr lang="en-US" dirty="0">
-              <a:solidFill>
-                <a:srgbClr val="FF0000"/>
-              </a:solidFill>
-            </a:endParaRPr>
-          </a:p>
-        </p:txBody>
-      </p:sp>
-      <p:sp>
-        <p:nvSpPr>
-          <p:cNvPr id="180" name="TextBox 179"/>
-          <p:cNvSpPr txBox="1"/>
-          <p:nvPr/>
-        </p:nvSpPr>
-        <p:spPr>
-          <a:xfrm>
-            <a:off x="11743206" y="1314173"/>
-            <a:ext cx="1278351" cy="395045"/>
-          </a:xfrm>
-          <a:prstGeom prst="rect">
-            <a:avLst/>
-          </a:prstGeom>
-          <a:noFill/>
-        </p:spPr>
-        <p:txBody>
-          <a:bodyPr wrap="square" rtlCol="0">
-            <a:spAutoFit/>
-          </a:bodyPr>
-          <a:lstStyle/>
-          <a:p>
-            <a:r>
-              <a:rPr lang="en-US" dirty="0" smtClean="0">
-                <a:solidFill>
-                  <a:srgbClr val="FF0000"/>
-                </a:solidFill>
-              </a:rPr>
-              <a:t>CVC=2</a:t>
-            </a:r>
-            <a:endParaRPr lang="en-US" dirty="0">
-              <a:solidFill>
-                <a:srgbClr val="FF0000"/>
-              </a:solidFill>
-            </a:endParaRPr>
-          </a:p>
-        </p:txBody>
-      </p:sp>
-      <p:sp>
-        <p:nvSpPr>
-          <p:cNvPr id="181" name="TextBox 180"/>
-          <p:cNvSpPr txBox="1"/>
-          <p:nvPr/>
-        </p:nvSpPr>
-        <p:spPr>
-          <a:xfrm>
-            <a:off x="11761888" y="1614856"/>
-            <a:ext cx="1278351" cy="395045"/>
-          </a:xfrm>
-          <a:prstGeom prst="rect">
-            <a:avLst/>
-          </a:prstGeom>
-          <a:noFill/>
-        </p:spPr>
-        <p:txBody>
-          <a:bodyPr wrap="square" rtlCol="0">
-            <a:spAutoFit/>
-          </a:bodyPr>
-          <a:lstStyle/>
-          <a:p>
-            <a:r>
-              <a:rPr lang="en-US" dirty="0" smtClean="0">
-                <a:solidFill>
-                  <a:srgbClr val="FF0000"/>
-                </a:solidFill>
-              </a:rPr>
-              <a:t>CTC=2</a:t>
-            </a:r>
-            <a:endParaRPr lang="en-US" dirty="0">
-              <a:solidFill>
-                <a:srgbClr val="FF0000"/>
-              </a:solidFill>
-            </a:endParaRPr>
-          </a:p>
-        </p:txBody>
-      </p:sp>
-      <p:sp>
-        <p:nvSpPr>
-          <p:cNvPr id="182" name="TextBox 181"/>
-          <p:cNvSpPr txBox="1"/>
-          <p:nvPr/>
-        </p:nvSpPr>
-        <p:spPr>
-          <a:xfrm>
-            <a:off x="11716707" y="1916558"/>
-            <a:ext cx="1278351" cy="395045"/>
-          </a:xfrm>
-          <a:prstGeom prst="rect">
-            <a:avLst/>
-          </a:prstGeom>
-          <a:noFill/>
-        </p:spPr>
-        <p:txBody>
-          <a:bodyPr wrap="square" rtlCol="0">
-            <a:spAutoFit/>
-          </a:bodyPr>
-          <a:lstStyle/>
-          <a:p>
-            <a:r>
-              <a:rPr lang="en-US" dirty="0" smtClean="0">
-                <a:solidFill>
-                  <a:srgbClr val="FF0000"/>
-                </a:solidFill>
-              </a:rPr>
-              <a:t>AWC=6</a:t>
-            </a:r>
-            <a:endParaRPr lang="en-US" dirty="0">
-              <a:solidFill>
-                <a:srgbClr val="FF0000"/>
-              </a:solidFill>
-            </a:endParaRPr>
           </a:p>
         </p:txBody>
       </p:sp>
@@ -4493,11 +4248,11 @@
           <a:lstStyle/>
           <a:p>
             <a:r>
-              <a:rPr lang="en-US" dirty="0" smtClean="0"/>
+              <a:rPr lang="en-US" dirty="0"/>
               <a:t>Speech </a:t>
             </a:r>
             <a:r>
-              <a:rPr lang="en-US" smtClean="0"/>
+              <a:rPr lang="en-US"/>
               <a:t>tech analyses</a:t>
             </a:r>
             <a:endParaRPr lang="en-US" dirty="0"/>
@@ -4728,7 +4483,7 @@
         </p:nvSpPr>
         <p:spPr>
           <a:xfrm>
-            <a:off x="9291951" y="2675750"/>
+            <a:off x="9245484" y="2675750"/>
             <a:ext cx="2592360" cy="395045"/>
           </a:xfrm>
           <a:prstGeom prst="rect">
@@ -4743,10 +4498,9 @@
           <a:lstStyle/>
           <a:p>
             <a:r>
-              <a:rPr lang="en-US" dirty="0" smtClean="0"/>
-              <a:t>Missed 113 frames</a:t>
-            </a:r>
-            <a:endParaRPr lang="en-US" dirty="0"/>
+              <a:rPr lang="en-US" dirty="0"/>
+              <a:t>Missed 113f</a:t>
+            </a:r>
           </a:p>
         </p:txBody>
       </p:sp>
@@ -4758,7 +4512,7 @@
         </p:nvSpPr>
         <p:spPr>
           <a:xfrm>
-            <a:off x="9293170" y="3039883"/>
+            <a:off x="9245484" y="3039883"/>
             <a:ext cx="2453253" cy="395045"/>
           </a:xfrm>
           <a:prstGeom prst="rect">
@@ -4773,10 +4527,9 @@
           <a:lstStyle/>
           <a:p>
             <a:r>
-              <a:rPr lang="en-US" dirty="0" smtClean="0"/>
-              <a:t>False alarm 45 frames</a:t>
-            </a:r>
-            <a:endParaRPr lang="en-US" dirty="0"/>
+              <a:rPr lang="en-US" dirty="0"/>
+              <a:t>False alarm 45f</a:t>
+            </a:r>
           </a:p>
         </p:txBody>
       </p:sp>
@@ -4824,7 +4577,7 @@
         </p:nvSpPr>
         <p:spPr>
           <a:xfrm>
-            <a:off x="9308763" y="3428019"/>
+            <a:off x="9245484" y="3428019"/>
             <a:ext cx="2437659" cy="395045"/>
           </a:xfrm>
           <a:prstGeom prst="rect">
@@ -4839,10 +4592,9 @@
           <a:lstStyle/>
           <a:p>
             <a:r>
-              <a:rPr lang="en-US" dirty="0" smtClean="0"/>
-              <a:t>Confusion 55 frames</a:t>
-            </a:r>
-            <a:endParaRPr lang="en-US" dirty="0"/>
+              <a:rPr lang="en-US" dirty="0"/>
+              <a:t>Confusion 55f</a:t>
+            </a:r>
           </a:p>
         </p:txBody>
       </p:sp>
@@ -5069,7 +4821,7 @@
         </p:nvSpPr>
         <p:spPr>
           <a:xfrm>
-            <a:off x="9285363" y="3849014"/>
+            <a:off x="9245484" y="3849014"/>
             <a:ext cx="2437659" cy="395045"/>
           </a:xfrm>
           <a:prstGeom prst="rect">
@@ -5084,10 +4836,9 @@
           <a:lstStyle/>
           <a:p>
             <a:r>
-              <a:rPr lang="en-US" dirty="0" smtClean="0"/>
-              <a:t>Speech 443 frames</a:t>
-            </a:r>
-            <a:endParaRPr lang="en-US" dirty="0"/>
+              <a:rPr lang="en-US" dirty="0"/>
+              <a:t>Speech 443f</a:t>
+            </a:r>
           </a:p>
         </p:txBody>
       </p:sp>
@@ -5251,14 +5002,14 @@
       </p:cxnSp>
       <p:sp>
         <p:nvSpPr>
-          <p:cNvPr id="206" name="TextBox 205"/>
+          <p:cNvPr id="209" name="TextBox 208"/>
           <p:cNvSpPr txBox="1"/>
           <p:nvPr/>
         </p:nvSpPr>
         <p:spPr>
           <a:xfrm>
-            <a:off x="11823307" y="2631879"/>
-            <a:ext cx="2227758" cy="395045"/>
+            <a:off x="3323090" y="4573301"/>
+            <a:ext cx="1105599" cy="1000467"/>
           </a:xfrm>
           <a:prstGeom prst="rect">
             <a:avLst/>
@@ -5272,31 +5023,22 @@
           <a:lstStyle/>
           <a:p>
             <a:r>
-              <a:rPr lang="en-US" dirty="0" smtClean="0">
-                <a:solidFill>
-                  <a:srgbClr val="FF0000"/>
-                </a:solidFill>
-              </a:rPr>
-              <a:t>miss rate = 113/443</a:t>
-            </a:r>
-            <a:endParaRPr lang="en-US" dirty="0">
-              <a:solidFill>
-                <a:srgbClr val="FF0000"/>
-              </a:solidFill>
-            </a:endParaRPr>
-          </a:p>
-        </p:txBody>
-      </p:sp>
-      <p:sp>
-        <p:nvSpPr>
-          <p:cNvPr id="207" name="TextBox 206"/>
+              <a:rPr lang="en-US" dirty="0"/>
+              <a:t>Precision &amp; recall analyses</a:t>
+            </a:r>
+          </a:p>
+        </p:txBody>
+      </p:sp>
+      <p:sp>
+        <p:nvSpPr>
+          <p:cNvPr id="210" name="TextBox 209"/>
           <p:cNvSpPr txBox="1"/>
           <p:nvPr/>
         </p:nvSpPr>
         <p:spPr>
           <a:xfrm>
-            <a:off x="11811441" y="3017284"/>
-            <a:ext cx="2810655" cy="395045"/>
+            <a:off x="9245484" y="5211321"/>
+            <a:ext cx="3017506" cy="395045"/>
           </a:xfrm>
           <a:prstGeom prst="rect">
             <a:avLst/>
@@ -5310,116 +5052,9 @@
           <a:lstStyle/>
           <a:p>
             <a:r>
-              <a:rPr lang="en-US" dirty="0" smtClean="0">
-                <a:solidFill>
-                  <a:srgbClr val="FF0000"/>
-                </a:solidFill>
-              </a:rPr>
-              <a:t>false alarm rate = 45/443</a:t>
-            </a:r>
-            <a:endParaRPr lang="en-US" dirty="0">
-              <a:solidFill>
-                <a:srgbClr val="FF0000"/>
-              </a:solidFill>
-            </a:endParaRPr>
-          </a:p>
-        </p:txBody>
-      </p:sp>
-      <p:sp>
-        <p:nvSpPr>
-          <p:cNvPr id="208" name="TextBox 207"/>
-          <p:cNvSpPr txBox="1"/>
-          <p:nvPr/>
-        </p:nvSpPr>
-        <p:spPr>
-          <a:xfrm>
-            <a:off x="11741397" y="3463942"/>
-            <a:ext cx="2634445" cy="395045"/>
-          </a:xfrm>
-          <a:prstGeom prst="rect">
-            <a:avLst/>
-          </a:prstGeom>
-          <a:noFill/>
-        </p:spPr>
-        <p:txBody>
-          <a:bodyPr wrap="square" rtlCol="0">
-            <a:spAutoFit/>
-          </a:bodyPr>
-          <a:lstStyle/>
-          <a:p>
-            <a:r>
-              <a:rPr lang="en-US" dirty="0" smtClean="0">
-                <a:solidFill>
-                  <a:srgbClr val="FF0000"/>
-                </a:solidFill>
-              </a:rPr>
-              <a:t>confusion rate = 55/443</a:t>
-            </a:r>
-            <a:endParaRPr lang="en-US" dirty="0">
-              <a:solidFill>
-                <a:srgbClr val="FF0000"/>
-              </a:solidFill>
-            </a:endParaRPr>
-          </a:p>
-        </p:txBody>
-      </p:sp>
-      <p:sp>
-        <p:nvSpPr>
-          <p:cNvPr id="209" name="TextBox 208"/>
-          <p:cNvSpPr txBox="1"/>
-          <p:nvPr/>
-        </p:nvSpPr>
-        <p:spPr>
-          <a:xfrm>
-            <a:off x="3323090" y="4573301"/>
-            <a:ext cx="1105599" cy="1000467"/>
-          </a:xfrm>
-          <a:prstGeom prst="rect">
-            <a:avLst/>
-          </a:prstGeom>
-          <a:noFill/>
-        </p:spPr>
-        <p:txBody>
-          <a:bodyPr wrap="square" rtlCol="0">
-            <a:spAutoFit/>
-          </a:bodyPr>
-          <a:lstStyle/>
-          <a:p>
-            <a:r>
-              <a:rPr lang="en-US" dirty="0" smtClean="0"/>
-              <a:t>Precision &amp; recall analyses</a:t>
-            </a:r>
-            <a:endParaRPr lang="en-US" dirty="0"/>
-          </a:p>
-        </p:txBody>
-      </p:sp>
-      <p:sp>
-        <p:nvSpPr>
-          <p:cNvPr id="210" name="TextBox 209"/>
-          <p:cNvSpPr txBox="1"/>
-          <p:nvPr/>
-        </p:nvSpPr>
-        <p:spPr>
-          <a:xfrm>
-            <a:off x="9249686" y="5211321"/>
-            <a:ext cx="3017506" cy="395045"/>
-          </a:xfrm>
-          <a:prstGeom prst="rect">
-            <a:avLst/>
-          </a:prstGeom>
-          <a:noFill/>
-        </p:spPr>
-        <p:txBody>
-          <a:bodyPr wrap="square" rtlCol="0">
-            <a:spAutoFit/>
-          </a:bodyPr>
-          <a:lstStyle/>
-          <a:p>
-            <a:r>
-              <a:rPr lang="en-US" dirty="0" smtClean="0"/>
-              <a:t>CHN &amp; Key child 107 frames</a:t>
-            </a:r>
-            <a:endParaRPr lang="en-US" dirty="0"/>
+              <a:rPr lang="en-US" dirty="0"/>
+              <a:t>CHN &amp; Key child 107f</a:t>
+            </a:r>
           </a:p>
         </p:txBody>
       </p:sp>
@@ -5517,7 +5152,7 @@
         </p:nvSpPr>
         <p:spPr>
           <a:xfrm>
-            <a:off x="9282206" y="5490986"/>
+            <a:off x="9245484" y="5490986"/>
             <a:ext cx="3566823" cy="395045"/>
           </a:xfrm>
           <a:prstGeom prst="rect">
@@ -5532,10 +5167,9 @@
           <a:lstStyle/>
           <a:p>
             <a:r>
-              <a:rPr lang="en-US" dirty="0" smtClean="0"/>
-              <a:t>FAN &amp; Female adult 143  frames</a:t>
-            </a:r>
-            <a:endParaRPr lang="en-US" dirty="0"/>
+              <a:rPr lang="en-US" dirty="0"/>
+              <a:t>FAN &amp; Female adult 143f</a:t>
+            </a:r>
           </a:p>
         </p:txBody>
       </p:sp>
@@ -5547,7 +5181,7 @@
         </p:nvSpPr>
         <p:spPr>
           <a:xfrm>
-            <a:off x="9311565" y="4261874"/>
+            <a:off x="9245484" y="4261874"/>
             <a:ext cx="3017506" cy="395045"/>
           </a:xfrm>
           <a:prstGeom prst="rect">
@@ -5562,10 +5196,9 @@
           <a:lstStyle/>
           <a:p>
             <a:r>
-              <a:rPr lang="en-US" dirty="0" smtClean="0"/>
-              <a:t>CHN 140 frames</a:t>
-            </a:r>
-            <a:endParaRPr lang="en-US" dirty="0"/>
+              <a:rPr lang="en-US" dirty="0"/>
+              <a:t>CHN 140f</a:t>
+            </a:r>
           </a:p>
         </p:txBody>
       </p:sp>
@@ -5577,7 +5210,7 @@
         </p:nvSpPr>
         <p:spPr>
           <a:xfrm>
-            <a:off x="9333688" y="4583775"/>
+            <a:off x="9245484" y="4583775"/>
             <a:ext cx="3017506" cy="395045"/>
           </a:xfrm>
           <a:prstGeom prst="rect">
@@ -5592,10 +5225,9 @@
           <a:lstStyle/>
           <a:p>
             <a:r>
-              <a:rPr lang="en-US" dirty="0" smtClean="0"/>
-              <a:t>FAN 140 frames</a:t>
-            </a:r>
-            <a:endParaRPr lang="en-US" dirty="0"/>
+              <a:rPr lang="en-US" dirty="0"/>
+              <a:t>FAN 140f</a:t>
+            </a:r>
           </a:p>
         </p:txBody>
       </p:sp>
@@ -5607,7 +5239,7 @@
         </p:nvSpPr>
         <p:spPr>
           <a:xfrm>
-            <a:off x="9291950" y="6041936"/>
+            <a:off x="9245484" y="6041936"/>
             <a:ext cx="3017506" cy="395045"/>
           </a:xfrm>
           <a:prstGeom prst="rect">
@@ -5622,10 +5254,9 @@
           <a:lstStyle/>
           <a:p>
             <a:r>
-              <a:rPr lang="en-US" dirty="0" smtClean="0"/>
-              <a:t>Key child 256 frames</a:t>
-            </a:r>
-            <a:endParaRPr lang="en-US" dirty="0"/>
+              <a:rPr lang="en-US" dirty="0"/>
+              <a:t>Key child 256f</a:t>
+            </a:r>
           </a:p>
         </p:txBody>
       </p:sp>
@@ -5652,22 +5283,21 @@
           <a:lstStyle/>
           <a:p>
             <a:r>
-              <a:rPr lang="en-US" dirty="0" smtClean="0"/>
-              <a:t>Female adult 196 frames</a:t>
-            </a:r>
-            <a:endParaRPr lang="en-US" dirty="0"/>
-          </a:p>
-        </p:txBody>
-      </p:sp>
-      <p:sp>
-        <p:nvSpPr>
-          <p:cNvPr id="218" name="TextBox 217"/>
+              <a:rPr lang="en-US" dirty="0"/>
+              <a:t>Female adult 196f</a:t>
+            </a:r>
+          </a:p>
+        </p:txBody>
+      </p:sp>
+      <p:sp>
+        <p:nvSpPr>
+          <p:cNvPr id="220" name="TextBox 219"/>
           <p:cNvSpPr txBox="1"/>
           <p:nvPr/>
         </p:nvSpPr>
         <p:spPr>
           <a:xfrm>
-            <a:off x="11881668" y="4175125"/>
+            <a:off x="9245484" y="4902144"/>
             <a:ext cx="3017506" cy="395045"/>
           </a:xfrm>
           <a:prstGeom prst="rect">
@@ -5682,30 +5312,21 @@
           <a:lstStyle/>
           <a:p>
             <a:r>
-              <a:rPr lang="en-US" dirty="0" smtClean="0">
-                <a:solidFill>
-                  <a:srgbClr val="FF0000"/>
-                </a:solidFill>
-              </a:rPr>
-              <a:t>CHN Precision = 107/140</a:t>
-            </a:r>
-            <a:endParaRPr lang="en-US" dirty="0">
-              <a:solidFill>
-                <a:srgbClr val="FF0000"/>
-              </a:solidFill>
-            </a:endParaRPr>
-          </a:p>
-        </p:txBody>
-      </p:sp>
-      <p:sp>
-        <p:nvSpPr>
-          <p:cNvPr id="219" name="TextBox 218"/>
+              <a:rPr lang="en-US" dirty="0"/>
+              <a:t>MAN 104f</a:t>
+            </a:r>
+          </a:p>
+        </p:txBody>
+      </p:sp>
+      <p:sp>
+        <p:nvSpPr>
+          <p:cNvPr id="222" name="TextBox 221"/>
           <p:cNvSpPr txBox="1"/>
           <p:nvPr/>
         </p:nvSpPr>
         <p:spPr>
           <a:xfrm>
-            <a:off x="11859411" y="4541539"/>
+            <a:off x="9245484" y="6704255"/>
             <a:ext cx="3017506" cy="395045"/>
           </a:xfrm>
           <a:prstGeom prst="rect">
@@ -5720,31 +5341,22 @@
           <a:lstStyle/>
           <a:p>
             <a:r>
-              <a:rPr lang="en-US" dirty="0" smtClean="0">
-                <a:solidFill>
-                  <a:srgbClr val="FF0000"/>
-                </a:solidFill>
-              </a:rPr>
-              <a:t>FAN Precision = 143/140</a:t>
-            </a:r>
-            <a:endParaRPr lang="en-US" dirty="0">
-              <a:solidFill>
-                <a:srgbClr val="FF0000"/>
-              </a:solidFill>
-            </a:endParaRPr>
-          </a:p>
-        </p:txBody>
-      </p:sp>
-      <p:sp>
-        <p:nvSpPr>
-          <p:cNvPr id="220" name="TextBox 219"/>
+              <a:rPr lang="en-US" dirty="0"/>
+              <a:t>Male adult 0f</a:t>
+            </a:r>
+          </a:p>
+        </p:txBody>
+      </p:sp>
+      <p:sp>
+        <p:nvSpPr>
+          <p:cNvPr id="223" name="TextBox 222"/>
           <p:cNvSpPr txBox="1"/>
           <p:nvPr/>
         </p:nvSpPr>
         <p:spPr>
           <a:xfrm>
-            <a:off x="9312582" y="4902144"/>
-            <a:ext cx="3017506" cy="395045"/>
+            <a:off x="9245484" y="5745439"/>
+            <a:ext cx="3566823" cy="395045"/>
           </a:xfrm>
           <a:prstGeom prst="rect">
             <a:avLst/>
@@ -5758,281 +5370,570 @@
           <a:lstStyle/>
           <a:p>
             <a:r>
-              <a:rPr lang="en-US" dirty="0" smtClean="0"/>
-              <a:t>MAN 104 frames</a:t>
-            </a:r>
-            <a:endParaRPr lang="en-US" dirty="0"/>
-          </a:p>
-        </p:txBody>
-      </p:sp>
-      <p:sp>
-        <p:nvSpPr>
-          <p:cNvPr id="221" name="TextBox 220"/>
-          <p:cNvSpPr txBox="1"/>
-          <p:nvPr/>
-        </p:nvSpPr>
-        <p:spPr>
-          <a:xfrm>
-            <a:off x="11848055" y="4882601"/>
-            <a:ext cx="3017506" cy="395045"/>
-          </a:xfrm>
-          <a:prstGeom prst="rect">
-            <a:avLst/>
-          </a:prstGeom>
-          <a:noFill/>
-        </p:spPr>
-        <p:txBody>
-          <a:bodyPr wrap="square" rtlCol="0">
-            <a:spAutoFit/>
-          </a:bodyPr>
-          <a:lstStyle/>
-          <a:p>
-            <a:r>
-              <a:rPr lang="en-US" dirty="0">
-                <a:solidFill>
-                  <a:srgbClr val="FF0000"/>
-                </a:solidFill>
-              </a:rPr>
-              <a:t>M</a:t>
-            </a:r>
-            <a:r>
-              <a:rPr lang="en-US" dirty="0" smtClean="0">
-                <a:solidFill>
-                  <a:srgbClr val="FF0000"/>
-                </a:solidFill>
-              </a:rPr>
-              <a:t>AN Precision = 0/104</a:t>
-            </a:r>
-            <a:endParaRPr lang="en-US" dirty="0">
-              <a:solidFill>
-                <a:srgbClr val="FF0000"/>
-              </a:solidFill>
-            </a:endParaRPr>
-          </a:p>
-        </p:txBody>
-      </p:sp>
-      <p:sp>
-        <p:nvSpPr>
-          <p:cNvPr id="222" name="TextBox 221"/>
-          <p:cNvSpPr txBox="1"/>
-          <p:nvPr/>
-        </p:nvSpPr>
-        <p:spPr>
-          <a:xfrm>
-            <a:off x="9249686" y="6704255"/>
-            <a:ext cx="3017506" cy="395045"/>
-          </a:xfrm>
-          <a:prstGeom prst="rect">
-            <a:avLst/>
-          </a:prstGeom>
-          <a:noFill/>
-        </p:spPr>
-        <p:txBody>
-          <a:bodyPr wrap="square" rtlCol="0">
-            <a:spAutoFit/>
-          </a:bodyPr>
-          <a:lstStyle/>
-          <a:p>
-            <a:r>
               <a:rPr lang="en-US" dirty="0"/>
-              <a:t>M</a:t>
-            </a:r>
-            <a:r>
-              <a:rPr lang="en-US" dirty="0" smtClean="0"/>
-              <a:t>ale adult 0 frames</a:t>
-            </a:r>
-            <a:endParaRPr lang="en-US" dirty="0"/>
-          </a:p>
-        </p:txBody>
-      </p:sp>
-      <p:sp>
-        <p:nvSpPr>
-          <p:cNvPr id="223" name="TextBox 222"/>
-          <p:cNvSpPr txBox="1"/>
-          <p:nvPr/>
-        </p:nvSpPr>
-        <p:spPr>
-          <a:xfrm>
-            <a:off x="9291950" y="5745439"/>
-            <a:ext cx="3566823" cy="395045"/>
-          </a:xfrm>
-          <a:prstGeom prst="rect">
-            <a:avLst/>
-          </a:prstGeom>
-          <a:noFill/>
-        </p:spPr>
-        <p:txBody>
-          <a:bodyPr wrap="square" rtlCol="0">
-            <a:spAutoFit/>
-          </a:bodyPr>
-          <a:lstStyle/>
-          <a:p>
-            <a:r>
-              <a:rPr lang="en-US" dirty="0"/>
-              <a:t>M</a:t>
-            </a:r>
-            <a:r>
-              <a:rPr lang="en-US" dirty="0" smtClean="0"/>
-              <a:t>AN &amp; Male adult 0  frames</a:t>
-            </a:r>
-            <a:endParaRPr lang="en-US" dirty="0"/>
-          </a:p>
-        </p:txBody>
-      </p:sp>
-      <p:sp>
-        <p:nvSpPr>
-          <p:cNvPr id="224" name="TextBox 223"/>
-          <p:cNvSpPr txBox="1"/>
-          <p:nvPr/>
-        </p:nvSpPr>
-        <p:spPr>
-          <a:xfrm>
-            <a:off x="12075095" y="6057153"/>
-            <a:ext cx="3017506" cy="395045"/>
-          </a:xfrm>
-          <a:prstGeom prst="rect">
-            <a:avLst/>
-          </a:prstGeom>
-          <a:noFill/>
-        </p:spPr>
-        <p:txBody>
-          <a:bodyPr wrap="square" rtlCol="0">
-            <a:spAutoFit/>
-          </a:bodyPr>
-          <a:lstStyle/>
-          <a:p>
-            <a:r>
-              <a:rPr lang="en-US" dirty="0" smtClean="0">
-                <a:solidFill>
-                  <a:srgbClr val="FF0000"/>
-                </a:solidFill>
-              </a:rPr>
-              <a:t>CHN Recall = 107/256</a:t>
-            </a:r>
-            <a:endParaRPr lang="en-US" dirty="0">
-              <a:solidFill>
-                <a:srgbClr val="FF0000"/>
-              </a:solidFill>
-            </a:endParaRPr>
-          </a:p>
-        </p:txBody>
-      </p:sp>
-      <p:sp>
-        <p:nvSpPr>
-          <p:cNvPr id="225" name="TextBox 224"/>
-          <p:cNvSpPr txBox="1"/>
-          <p:nvPr/>
-        </p:nvSpPr>
-        <p:spPr>
-          <a:xfrm>
-            <a:off x="12052838" y="6423567"/>
-            <a:ext cx="3017506" cy="395045"/>
-          </a:xfrm>
-          <a:prstGeom prst="rect">
-            <a:avLst/>
-          </a:prstGeom>
-          <a:noFill/>
-        </p:spPr>
-        <p:txBody>
-          <a:bodyPr wrap="square" rtlCol="0">
-            <a:spAutoFit/>
-          </a:bodyPr>
-          <a:lstStyle/>
-          <a:p>
-            <a:r>
-              <a:rPr lang="en-US" dirty="0" smtClean="0">
-                <a:solidFill>
-                  <a:srgbClr val="FF0000"/>
-                </a:solidFill>
-              </a:rPr>
-              <a:t>FAN </a:t>
-            </a:r>
-            <a:r>
-              <a:rPr lang="en-US" dirty="0">
-                <a:solidFill>
-                  <a:srgbClr val="FF0000"/>
-                </a:solidFill>
-              </a:rPr>
-              <a:t>Recall </a:t>
-            </a:r>
-            <a:r>
-              <a:rPr lang="en-US" dirty="0" smtClean="0">
-                <a:solidFill>
-                  <a:srgbClr val="FF0000"/>
-                </a:solidFill>
-              </a:rPr>
-              <a:t>= 143/196</a:t>
-            </a:r>
-            <a:endParaRPr lang="en-US" dirty="0">
-              <a:solidFill>
-                <a:srgbClr val="FF0000"/>
-              </a:solidFill>
-            </a:endParaRPr>
-          </a:p>
-        </p:txBody>
-      </p:sp>
-      <p:sp>
-        <p:nvSpPr>
-          <p:cNvPr id="226" name="TextBox 225"/>
-          <p:cNvSpPr txBox="1"/>
-          <p:nvPr/>
-        </p:nvSpPr>
-        <p:spPr>
-          <a:xfrm>
-            <a:off x="12041482" y="6764629"/>
-            <a:ext cx="3017506" cy="395045"/>
-          </a:xfrm>
-          <a:prstGeom prst="rect">
-            <a:avLst/>
-          </a:prstGeom>
-          <a:noFill/>
-        </p:spPr>
-        <p:txBody>
-          <a:bodyPr wrap="square" rtlCol="0">
-            <a:spAutoFit/>
-          </a:bodyPr>
-          <a:lstStyle/>
-          <a:p>
-            <a:r>
-              <a:rPr lang="en-US" dirty="0">
-                <a:solidFill>
-                  <a:srgbClr val="FF0000"/>
-                </a:solidFill>
-              </a:rPr>
-              <a:t>M</a:t>
-            </a:r>
-            <a:r>
-              <a:rPr lang="en-US" dirty="0" smtClean="0">
-                <a:solidFill>
-                  <a:srgbClr val="FF0000"/>
-                </a:solidFill>
-              </a:rPr>
-              <a:t>AN </a:t>
-            </a:r>
-            <a:r>
-              <a:rPr lang="en-US" dirty="0">
-                <a:solidFill>
-                  <a:srgbClr val="FF0000"/>
-                </a:solidFill>
-              </a:rPr>
-              <a:t>Recall </a:t>
-            </a:r>
-            <a:r>
-              <a:rPr lang="en-US" dirty="0" smtClean="0">
-                <a:solidFill>
-                  <a:srgbClr val="FF0000"/>
-                </a:solidFill>
-              </a:rPr>
-              <a:t>= NA</a:t>
-            </a:r>
-            <a:endParaRPr lang="en-US" dirty="0">
-              <a:solidFill>
-                <a:srgbClr val="FF0000"/>
-              </a:solidFill>
-            </a:endParaRPr>
-          </a:p>
-        </p:txBody>
-      </p:sp>
+              <a:t>MAN &amp; Male adult 0f</a:t>
+            </a:r>
+          </a:p>
+        </p:txBody>
+      </p:sp>
+      <p:grpSp>
+        <p:nvGrpSpPr>
+          <p:cNvPr id="8" name="Group 7">
+            <a:extLst>
+              <a:ext uri="{FF2B5EF4-FFF2-40B4-BE49-F238E27FC236}">
+                <a16:creationId xmlns:a16="http://schemas.microsoft.com/office/drawing/2014/main" id="{27DB7850-3006-C14F-AF81-4F9C5CDDB698}"/>
+              </a:ext>
+            </a:extLst>
+          </p:cNvPr>
+          <p:cNvGrpSpPr/>
+          <p:nvPr/>
+        </p:nvGrpSpPr>
+        <p:grpSpPr>
+          <a:xfrm>
+            <a:off x="11870701" y="188865"/>
+            <a:ext cx="3017506" cy="6970809"/>
+            <a:chOff x="11963061" y="188865"/>
+            <a:chExt cx="3017506" cy="6970809"/>
+          </a:xfrm>
+        </p:grpSpPr>
+        <p:grpSp>
+          <p:nvGrpSpPr>
+            <p:cNvPr id="7" name="Group 6">
+              <a:extLst>
+                <a:ext uri="{FF2B5EF4-FFF2-40B4-BE49-F238E27FC236}">
+                  <a16:creationId xmlns:a16="http://schemas.microsoft.com/office/drawing/2014/main" id="{C755969C-A581-084B-B059-48A8DCC1CD76}"/>
+                </a:ext>
+              </a:extLst>
+            </p:cNvPr>
+            <p:cNvGrpSpPr/>
+            <p:nvPr/>
+          </p:nvGrpSpPr>
+          <p:grpSpPr>
+            <a:xfrm>
+              <a:off x="12024543" y="188865"/>
+              <a:ext cx="1765348" cy="997430"/>
+              <a:chOff x="12024543" y="96505"/>
+              <a:chExt cx="1765348" cy="997430"/>
+            </a:xfrm>
+          </p:grpSpPr>
+          <p:sp>
+            <p:nvSpPr>
+              <p:cNvPr id="172" name="TextBox 171"/>
+              <p:cNvSpPr txBox="1"/>
+              <p:nvPr/>
+            </p:nvSpPr>
+            <p:spPr>
+              <a:xfrm>
+                <a:off x="12024543" y="96505"/>
+                <a:ext cx="1765348" cy="395045"/>
+              </a:xfrm>
+              <a:prstGeom prst="rect">
+                <a:avLst/>
+              </a:prstGeom>
+              <a:noFill/>
+            </p:spPr>
+            <p:txBody>
+              <a:bodyPr wrap="square" rtlCol="0">
+                <a:spAutoFit/>
+              </a:bodyPr>
+              <a:lstStyle/>
+              <a:p>
+                <a:r>
+                  <a:rPr lang="en-US" dirty="0">
+                    <a:solidFill>
+                      <a:srgbClr val="FF0000"/>
+                    </a:solidFill>
+                  </a:rPr>
+                  <a:t>LENA CVC=1</a:t>
+                </a:r>
+              </a:p>
+            </p:txBody>
+          </p:sp>
+          <p:sp>
+            <p:nvSpPr>
+              <p:cNvPr id="173" name="TextBox 172"/>
+              <p:cNvSpPr txBox="1"/>
+              <p:nvPr/>
+            </p:nvSpPr>
+            <p:spPr>
+              <a:xfrm>
+                <a:off x="12024543" y="397188"/>
+                <a:ext cx="1451310" cy="395045"/>
+              </a:xfrm>
+              <a:prstGeom prst="rect">
+                <a:avLst/>
+              </a:prstGeom>
+              <a:noFill/>
+            </p:spPr>
+            <p:txBody>
+              <a:bodyPr wrap="square" rtlCol="0">
+                <a:spAutoFit/>
+              </a:bodyPr>
+              <a:lstStyle/>
+              <a:p>
+                <a:r>
+                  <a:rPr lang="en-US" dirty="0">
+                    <a:solidFill>
+                      <a:srgbClr val="FF0000"/>
+                    </a:solidFill>
+                  </a:rPr>
+                  <a:t>LENA CTC=1</a:t>
+                </a:r>
+              </a:p>
+            </p:txBody>
+          </p:sp>
+          <p:sp>
+            <p:nvSpPr>
+              <p:cNvPr id="179" name="TextBox 178"/>
+              <p:cNvSpPr txBox="1"/>
+              <p:nvPr/>
+            </p:nvSpPr>
+            <p:spPr>
+              <a:xfrm>
+                <a:off x="12024543" y="698890"/>
+                <a:ext cx="1765346" cy="395045"/>
+              </a:xfrm>
+              <a:prstGeom prst="rect">
+                <a:avLst/>
+              </a:prstGeom>
+              <a:noFill/>
+            </p:spPr>
+            <p:txBody>
+              <a:bodyPr wrap="square" rtlCol="0">
+                <a:spAutoFit/>
+              </a:bodyPr>
+              <a:lstStyle/>
+              <a:p>
+                <a:r>
+                  <a:rPr lang="en-US" dirty="0">
+                    <a:solidFill>
+                      <a:srgbClr val="FF0000"/>
+                    </a:solidFill>
+                  </a:rPr>
+                  <a:t>LENA AWC=3.6</a:t>
+                </a:r>
+              </a:p>
+            </p:txBody>
+          </p:sp>
+        </p:grpSp>
+        <p:grpSp>
+          <p:nvGrpSpPr>
+            <p:cNvPr id="6" name="Group 5">
+              <a:extLst>
+                <a:ext uri="{FF2B5EF4-FFF2-40B4-BE49-F238E27FC236}">
+                  <a16:creationId xmlns:a16="http://schemas.microsoft.com/office/drawing/2014/main" id="{DB538943-FEB6-6741-89E9-34CFF838A36A}"/>
+                </a:ext>
+              </a:extLst>
+            </p:cNvPr>
+            <p:cNvGrpSpPr/>
+            <p:nvPr/>
+          </p:nvGrpSpPr>
+          <p:grpSpPr>
+            <a:xfrm>
+              <a:off x="12024543" y="1325391"/>
+              <a:ext cx="2051675" cy="997430"/>
+              <a:chOff x="12024543" y="1371571"/>
+              <a:chExt cx="2051675" cy="997430"/>
+            </a:xfrm>
+          </p:grpSpPr>
+          <p:sp>
+            <p:nvSpPr>
+              <p:cNvPr id="180" name="TextBox 179"/>
+              <p:cNvSpPr txBox="1"/>
+              <p:nvPr/>
+            </p:nvSpPr>
+            <p:spPr>
+              <a:xfrm>
+                <a:off x="12024543" y="1371571"/>
+                <a:ext cx="1885421" cy="395045"/>
+              </a:xfrm>
+              <a:prstGeom prst="rect">
+                <a:avLst/>
+              </a:prstGeom>
+              <a:noFill/>
+            </p:spPr>
+            <p:txBody>
+              <a:bodyPr wrap="square" rtlCol="0">
+                <a:spAutoFit/>
+              </a:bodyPr>
+              <a:lstStyle/>
+              <a:p>
+                <a:r>
+                  <a:rPr lang="en-US" dirty="0">
+                    <a:solidFill>
+                      <a:srgbClr val="FF0000"/>
+                    </a:solidFill>
+                  </a:rPr>
+                  <a:t>Human CVC=2</a:t>
+                </a:r>
+              </a:p>
+            </p:txBody>
+          </p:sp>
+          <p:sp>
+            <p:nvSpPr>
+              <p:cNvPr id="181" name="TextBox 180"/>
+              <p:cNvSpPr txBox="1"/>
+              <p:nvPr/>
+            </p:nvSpPr>
+            <p:spPr>
+              <a:xfrm>
+                <a:off x="12024543" y="1672254"/>
+                <a:ext cx="1885421" cy="395045"/>
+              </a:xfrm>
+              <a:prstGeom prst="rect">
+                <a:avLst/>
+              </a:prstGeom>
+              <a:noFill/>
+            </p:spPr>
+            <p:txBody>
+              <a:bodyPr wrap="square" rtlCol="0">
+                <a:spAutoFit/>
+              </a:bodyPr>
+              <a:lstStyle/>
+              <a:p>
+                <a:r>
+                  <a:rPr lang="en-US" dirty="0">
+                    <a:solidFill>
+                      <a:srgbClr val="FF0000"/>
+                    </a:solidFill>
+                  </a:rPr>
+                  <a:t>Human CTC=2</a:t>
+                </a:r>
+              </a:p>
+            </p:txBody>
+          </p:sp>
+          <p:sp>
+            <p:nvSpPr>
+              <p:cNvPr id="182" name="TextBox 181"/>
+              <p:cNvSpPr txBox="1"/>
+              <p:nvPr/>
+            </p:nvSpPr>
+            <p:spPr>
+              <a:xfrm>
+                <a:off x="12024543" y="1973956"/>
+                <a:ext cx="2051675" cy="395045"/>
+              </a:xfrm>
+              <a:prstGeom prst="rect">
+                <a:avLst/>
+              </a:prstGeom>
+              <a:noFill/>
+            </p:spPr>
+            <p:txBody>
+              <a:bodyPr wrap="square" rtlCol="0">
+                <a:spAutoFit/>
+              </a:bodyPr>
+              <a:lstStyle/>
+              <a:p>
+                <a:r>
+                  <a:rPr lang="en-US" dirty="0">
+                    <a:solidFill>
+                      <a:srgbClr val="FF0000"/>
+                    </a:solidFill>
+                  </a:rPr>
+                  <a:t>Human AWC=6</a:t>
+                </a:r>
+              </a:p>
+            </p:txBody>
+          </p:sp>
+        </p:grpSp>
+        <p:sp>
+          <p:nvSpPr>
+            <p:cNvPr id="206" name="TextBox 205"/>
+            <p:cNvSpPr txBox="1"/>
+            <p:nvPr/>
+          </p:nvSpPr>
+          <p:spPr>
+            <a:xfrm>
+              <a:off x="11963061" y="2631879"/>
+              <a:ext cx="2227758" cy="395045"/>
+            </a:xfrm>
+            <a:prstGeom prst="rect">
+              <a:avLst/>
+            </a:prstGeom>
+            <a:noFill/>
+          </p:spPr>
+          <p:txBody>
+            <a:bodyPr wrap="square" rtlCol="0">
+              <a:spAutoFit/>
+            </a:bodyPr>
+            <a:lstStyle/>
+            <a:p>
+              <a:r>
+                <a:rPr lang="en-US" dirty="0">
+                  <a:solidFill>
+                    <a:srgbClr val="FF0000"/>
+                  </a:solidFill>
+                </a:rPr>
+                <a:t>miss rate = 113/443</a:t>
+              </a:r>
+            </a:p>
+          </p:txBody>
+        </p:sp>
+        <p:sp>
+          <p:nvSpPr>
+            <p:cNvPr id="207" name="TextBox 206"/>
+            <p:cNvSpPr txBox="1"/>
+            <p:nvPr/>
+          </p:nvSpPr>
+          <p:spPr>
+            <a:xfrm>
+              <a:off x="11963061" y="3017284"/>
+              <a:ext cx="2810655" cy="395045"/>
+            </a:xfrm>
+            <a:prstGeom prst="rect">
+              <a:avLst/>
+            </a:prstGeom>
+            <a:noFill/>
+          </p:spPr>
+          <p:txBody>
+            <a:bodyPr wrap="square" rtlCol="0">
+              <a:spAutoFit/>
+            </a:bodyPr>
+            <a:lstStyle/>
+            <a:p>
+              <a:r>
+                <a:rPr lang="en-US" dirty="0">
+                  <a:solidFill>
+                    <a:srgbClr val="FF0000"/>
+                  </a:solidFill>
+                </a:rPr>
+                <a:t>false alarm rate = 45/443</a:t>
+              </a:r>
+            </a:p>
+          </p:txBody>
+        </p:sp>
+        <p:sp>
+          <p:nvSpPr>
+            <p:cNvPr id="208" name="TextBox 207"/>
+            <p:cNvSpPr txBox="1"/>
+            <p:nvPr/>
+          </p:nvSpPr>
+          <p:spPr>
+            <a:xfrm>
+              <a:off x="11963061" y="3463942"/>
+              <a:ext cx="2634445" cy="395045"/>
+            </a:xfrm>
+            <a:prstGeom prst="rect">
+              <a:avLst/>
+            </a:prstGeom>
+            <a:noFill/>
+          </p:spPr>
+          <p:txBody>
+            <a:bodyPr wrap="square" rtlCol="0">
+              <a:spAutoFit/>
+            </a:bodyPr>
+            <a:lstStyle/>
+            <a:p>
+              <a:r>
+                <a:rPr lang="en-US" dirty="0">
+                  <a:solidFill>
+                    <a:srgbClr val="FF0000"/>
+                  </a:solidFill>
+                </a:rPr>
+                <a:t>confusion rate = 55/443</a:t>
+              </a:r>
+            </a:p>
+          </p:txBody>
+        </p:sp>
+        <p:sp>
+          <p:nvSpPr>
+            <p:cNvPr id="218" name="TextBox 217"/>
+            <p:cNvSpPr txBox="1"/>
+            <p:nvPr/>
+          </p:nvSpPr>
+          <p:spPr>
+            <a:xfrm>
+              <a:off x="11963061" y="4175125"/>
+              <a:ext cx="3017506" cy="395045"/>
+            </a:xfrm>
+            <a:prstGeom prst="rect">
+              <a:avLst/>
+            </a:prstGeom>
+            <a:noFill/>
+          </p:spPr>
+          <p:txBody>
+            <a:bodyPr wrap="square" rtlCol="0">
+              <a:spAutoFit/>
+            </a:bodyPr>
+            <a:lstStyle/>
+            <a:p>
+              <a:r>
+                <a:rPr lang="en-US" dirty="0">
+                  <a:solidFill>
+                    <a:srgbClr val="FF0000"/>
+                  </a:solidFill>
+                </a:rPr>
+                <a:t>CHN Precision = 107/140</a:t>
+              </a:r>
+            </a:p>
+          </p:txBody>
+        </p:sp>
+        <p:sp>
+          <p:nvSpPr>
+            <p:cNvPr id="219" name="TextBox 218"/>
+            <p:cNvSpPr txBox="1"/>
+            <p:nvPr/>
+          </p:nvSpPr>
+          <p:spPr>
+            <a:xfrm>
+              <a:off x="11963061" y="4541539"/>
+              <a:ext cx="3017506" cy="395045"/>
+            </a:xfrm>
+            <a:prstGeom prst="rect">
+              <a:avLst/>
+            </a:prstGeom>
+            <a:noFill/>
+          </p:spPr>
+          <p:txBody>
+            <a:bodyPr wrap="square" rtlCol="0">
+              <a:spAutoFit/>
+            </a:bodyPr>
+            <a:lstStyle/>
+            <a:p>
+              <a:r>
+                <a:rPr lang="en-US" dirty="0">
+                  <a:solidFill>
+                    <a:srgbClr val="FF0000"/>
+                  </a:solidFill>
+                </a:rPr>
+                <a:t>FAN Precision = 143/140</a:t>
+              </a:r>
+            </a:p>
+          </p:txBody>
+        </p:sp>
+        <p:sp>
+          <p:nvSpPr>
+            <p:cNvPr id="221" name="TextBox 220"/>
+            <p:cNvSpPr txBox="1"/>
+            <p:nvPr/>
+          </p:nvSpPr>
+          <p:spPr>
+            <a:xfrm>
+              <a:off x="11963061" y="4882601"/>
+              <a:ext cx="3017506" cy="395045"/>
+            </a:xfrm>
+            <a:prstGeom prst="rect">
+              <a:avLst/>
+            </a:prstGeom>
+            <a:noFill/>
+          </p:spPr>
+          <p:txBody>
+            <a:bodyPr wrap="square" rtlCol="0">
+              <a:spAutoFit/>
+            </a:bodyPr>
+            <a:lstStyle/>
+            <a:p>
+              <a:r>
+                <a:rPr lang="en-US" dirty="0">
+                  <a:solidFill>
+                    <a:srgbClr val="FF0000"/>
+                  </a:solidFill>
+                </a:rPr>
+                <a:t>MAN Precision = 0/104</a:t>
+              </a:r>
+            </a:p>
+          </p:txBody>
+        </p:sp>
+        <p:sp>
+          <p:nvSpPr>
+            <p:cNvPr id="224" name="TextBox 223"/>
+            <p:cNvSpPr txBox="1"/>
+            <p:nvPr/>
+          </p:nvSpPr>
+          <p:spPr>
+            <a:xfrm>
+              <a:off x="11963061" y="6057153"/>
+              <a:ext cx="3017506" cy="395045"/>
+            </a:xfrm>
+            <a:prstGeom prst="rect">
+              <a:avLst/>
+            </a:prstGeom>
+            <a:noFill/>
+          </p:spPr>
+          <p:txBody>
+            <a:bodyPr wrap="square" rtlCol="0">
+              <a:spAutoFit/>
+            </a:bodyPr>
+            <a:lstStyle/>
+            <a:p>
+              <a:r>
+                <a:rPr lang="en-US" dirty="0">
+                  <a:solidFill>
+                    <a:srgbClr val="FF0000"/>
+                  </a:solidFill>
+                </a:rPr>
+                <a:t>CHN Recall = 107/256</a:t>
+              </a:r>
+            </a:p>
+          </p:txBody>
+        </p:sp>
+        <p:sp>
+          <p:nvSpPr>
+            <p:cNvPr id="225" name="TextBox 224"/>
+            <p:cNvSpPr txBox="1"/>
+            <p:nvPr/>
+          </p:nvSpPr>
+          <p:spPr>
+            <a:xfrm>
+              <a:off x="11963061" y="6423567"/>
+              <a:ext cx="3017506" cy="395045"/>
+            </a:xfrm>
+            <a:prstGeom prst="rect">
+              <a:avLst/>
+            </a:prstGeom>
+            <a:noFill/>
+          </p:spPr>
+          <p:txBody>
+            <a:bodyPr wrap="square" rtlCol="0">
+              <a:spAutoFit/>
+            </a:bodyPr>
+            <a:lstStyle/>
+            <a:p>
+              <a:r>
+                <a:rPr lang="en-US" dirty="0">
+                  <a:solidFill>
+                    <a:srgbClr val="FF0000"/>
+                  </a:solidFill>
+                </a:rPr>
+                <a:t>FAN Recall = 143/196</a:t>
+              </a:r>
+            </a:p>
+          </p:txBody>
+        </p:sp>
+        <p:sp>
+          <p:nvSpPr>
+            <p:cNvPr id="226" name="TextBox 225"/>
+            <p:cNvSpPr txBox="1"/>
+            <p:nvPr/>
+          </p:nvSpPr>
+          <p:spPr>
+            <a:xfrm>
+              <a:off x="11963061" y="6764629"/>
+              <a:ext cx="3017506" cy="395045"/>
+            </a:xfrm>
+            <a:prstGeom prst="rect">
+              <a:avLst/>
+            </a:prstGeom>
+            <a:noFill/>
+          </p:spPr>
+          <p:txBody>
+            <a:bodyPr wrap="square" rtlCol="0">
+              <a:spAutoFit/>
+            </a:bodyPr>
+            <a:lstStyle/>
+            <a:p>
+              <a:r>
+                <a:rPr lang="en-US" dirty="0">
+                  <a:solidFill>
+                    <a:srgbClr val="FF0000"/>
+                  </a:solidFill>
+                </a:rPr>
+                <a:t>MAN Recall = NA</a:t>
+              </a:r>
+            </a:p>
+          </p:txBody>
+        </p:sp>
+      </p:grpSp>
       <p:sp>
         <p:nvSpPr>
           <p:cNvPr id="227" name="Rectangle 226"/>
@@ -6256,8 +6157,8 @@
         </p:nvSpPr>
         <p:spPr>
           <a:xfrm>
-            <a:off x="9450031" y="339790"/>
-            <a:ext cx="1544472" cy="395045"/>
+            <a:off x="9293013" y="339790"/>
+            <a:ext cx="2404561" cy="338554"/>
           </a:xfrm>
           <a:prstGeom prst="rect">
             <a:avLst/>
@@ -6271,10 +6172,9 @@
           <a:lstStyle/>
           <a:p>
             <a:r>
-              <a:rPr lang="en-US" smtClean="0"/>
-              <a:t>(5 segments)</a:t>
-            </a:r>
-            <a:endParaRPr lang="en-US" dirty="0"/>
+              <a:rPr lang="en-US" sz="1600" dirty="0"/>
+              <a:t>5 LENA segments</a:t>
+            </a:r>
           </a:p>
         </p:txBody>
       </p:sp>
@@ -6286,8 +6186,8 @@
         </p:nvSpPr>
         <p:spPr>
           <a:xfrm>
-            <a:off x="9417942" y="1566370"/>
-            <a:ext cx="1668507" cy="395045"/>
+            <a:off x="9260925" y="1566370"/>
+            <a:ext cx="2576918" cy="338554"/>
           </a:xfrm>
           <a:prstGeom prst="rect">
             <a:avLst/>
@@ -6301,14 +6201,365 @@
           <a:lstStyle/>
           <a:p>
             <a:r>
-              <a:rPr lang="en-US" smtClean="0"/>
-              <a:t>(3</a:t>
-            </a:r>
-            <a:r>
-              <a:rPr lang="en-US" smtClean="0"/>
-              <a:t> segments)</a:t>
-            </a:r>
-            <a:endParaRPr lang="en-US" dirty="0"/>
+              <a:rPr lang="en-US" sz="1600" dirty="0"/>
+              <a:t>3 Human-tagged segments</a:t>
+            </a:r>
+          </a:p>
+        </p:txBody>
+      </p:sp>
+      <p:sp>
+        <p:nvSpPr>
+          <p:cNvPr id="4" name="Rectangle 3">
+            <a:extLst>
+              <a:ext uri="{FF2B5EF4-FFF2-40B4-BE49-F238E27FC236}">
+                <a16:creationId xmlns:a16="http://schemas.microsoft.com/office/drawing/2014/main" id="{FDA1E27B-1934-D540-8805-5F450CFBAAFD}"/>
+              </a:ext>
+            </a:extLst>
+          </p:cNvPr>
+          <p:cNvSpPr/>
+          <p:nvPr/>
+        </p:nvSpPr>
+        <p:spPr>
+          <a:xfrm>
+            <a:off x="9315489" y="2582682"/>
+            <a:ext cx="2548918" cy="4516617"/>
+          </a:xfrm>
+          <a:prstGeom prst="rect">
+            <a:avLst/>
+          </a:prstGeom>
+          <a:noFill/>
+          <a:ln w="38100">
+            <a:solidFill>
+              <a:schemeClr val="tx1"/>
+            </a:solidFill>
+          </a:ln>
+        </p:spPr>
+        <p:style>
+          <a:lnRef idx="2">
+            <a:schemeClr val="accent1">
+              <a:shade val="50000"/>
+            </a:schemeClr>
+          </a:lnRef>
+          <a:fillRef idx="1">
+            <a:schemeClr val="accent1"/>
+          </a:fillRef>
+          <a:effectRef idx="0">
+            <a:schemeClr val="accent1"/>
+          </a:effectRef>
+          <a:fontRef idx="minor">
+            <a:schemeClr val="lt1"/>
+          </a:fontRef>
+        </p:style>
+        <p:txBody>
+          <a:bodyPr rtlCol="0" anchor="ctr"/>
+          <a:lstStyle/>
+          <a:p>
+            <a:pPr algn="ctr"/>
+            <a:endParaRPr lang="en-US"/>
+          </a:p>
+        </p:txBody>
+      </p:sp>
+      <p:sp>
+        <p:nvSpPr>
+          <p:cNvPr id="5" name="TextBox 4">
+            <a:extLst>
+              <a:ext uri="{FF2B5EF4-FFF2-40B4-BE49-F238E27FC236}">
+                <a16:creationId xmlns:a16="http://schemas.microsoft.com/office/drawing/2014/main" id="{1A57059C-1324-F342-B6E1-BE56A58A7F9E}"/>
+              </a:ext>
+            </a:extLst>
+          </p:cNvPr>
+          <p:cNvSpPr txBox="1"/>
+          <p:nvPr/>
+        </p:nvSpPr>
+        <p:spPr>
+          <a:xfrm>
+            <a:off x="9262372" y="2245253"/>
+            <a:ext cx="2125090" cy="369332"/>
+          </a:xfrm>
+          <a:prstGeom prst="rect">
+            <a:avLst/>
+          </a:prstGeom>
+          <a:noFill/>
+        </p:spPr>
+        <p:txBody>
+          <a:bodyPr wrap="square" rtlCol="0">
+            <a:spAutoFit/>
+          </a:bodyPr>
+          <a:lstStyle/>
+          <a:p>
+            <a:r>
+              <a:rPr lang="en-US" sz="1800" b="1" dirty="0"/>
+              <a:t>Frame Counts</a:t>
+            </a:r>
+          </a:p>
+        </p:txBody>
+      </p:sp>
+      <p:sp>
+        <p:nvSpPr>
+          <p:cNvPr id="91" name="Rectangle 90">
+            <a:extLst>
+              <a:ext uri="{FF2B5EF4-FFF2-40B4-BE49-F238E27FC236}">
+                <a16:creationId xmlns:a16="http://schemas.microsoft.com/office/drawing/2014/main" id="{8250172E-F6BC-7E49-A5CE-231EDA32DD19}"/>
+              </a:ext>
+            </a:extLst>
+          </p:cNvPr>
+          <p:cNvSpPr/>
+          <p:nvPr/>
+        </p:nvSpPr>
+        <p:spPr>
+          <a:xfrm>
+            <a:off x="11901032" y="2576341"/>
+            <a:ext cx="2742655" cy="4516617"/>
+          </a:xfrm>
+          <a:prstGeom prst="rect">
+            <a:avLst/>
+          </a:prstGeom>
+          <a:noFill/>
+          <a:ln w="38100">
+            <a:solidFill>
+              <a:srgbClr val="FF0000"/>
+            </a:solidFill>
+          </a:ln>
+        </p:spPr>
+        <p:style>
+          <a:lnRef idx="2">
+            <a:schemeClr val="accent1">
+              <a:shade val="50000"/>
+            </a:schemeClr>
+          </a:lnRef>
+          <a:fillRef idx="1">
+            <a:schemeClr val="accent1"/>
+          </a:fillRef>
+          <a:effectRef idx="0">
+            <a:schemeClr val="accent1"/>
+          </a:effectRef>
+          <a:fontRef idx="minor">
+            <a:schemeClr val="lt1"/>
+          </a:fontRef>
+        </p:style>
+        <p:txBody>
+          <a:bodyPr rtlCol="0" anchor="ctr"/>
+          <a:lstStyle/>
+          <a:p>
+            <a:pPr algn="ctr"/>
+            <a:endParaRPr lang="en-US"/>
+          </a:p>
+        </p:txBody>
+      </p:sp>
+      <p:sp>
+        <p:nvSpPr>
+          <p:cNvPr id="92" name="TextBox 91">
+            <a:extLst>
+              <a:ext uri="{FF2B5EF4-FFF2-40B4-BE49-F238E27FC236}">
+                <a16:creationId xmlns:a16="http://schemas.microsoft.com/office/drawing/2014/main" id="{A09C082F-7FA5-FE43-BA34-90FEAADFCB3D}"/>
+              </a:ext>
+            </a:extLst>
+          </p:cNvPr>
+          <p:cNvSpPr txBox="1"/>
+          <p:nvPr/>
+        </p:nvSpPr>
+        <p:spPr>
+          <a:xfrm>
+            <a:off x="11853707" y="2253621"/>
+            <a:ext cx="2776693" cy="369332"/>
+          </a:xfrm>
+          <a:prstGeom prst="rect">
+            <a:avLst/>
+          </a:prstGeom>
+          <a:noFill/>
+        </p:spPr>
+        <p:txBody>
+          <a:bodyPr wrap="square" rtlCol="0">
+            <a:spAutoFit/>
+          </a:bodyPr>
+          <a:lstStyle/>
+          <a:p>
+            <a:r>
+              <a:rPr lang="en-US" sz="1800" b="1" dirty="0">
+                <a:solidFill>
+                  <a:srgbClr val="FF0000"/>
+                </a:solidFill>
+              </a:rPr>
+              <a:t>Frame-level Computations</a:t>
+            </a:r>
+          </a:p>
+        </p:txBody>
+      </p:sp>
+      <p:sp>
+        <p:nvSpPr>
+          <p:cNvPr id="96" name="Rectangle 95">
+            <a:extLst>
+              <a:ext uri="{FF2B5EF4-FFF2-40B4-BE49-F238E27FC236}">
+                <a16:creationId xmlns:a16="http://schemas.microsoft.com/office/drawing/2014/main" id="{65DF255C-0989-F64B-A29E-B7B8C5A89D22}"/>
+              </a:ext>
+            </a:extLst>
+          </p:cNvPr>
+          <p:cNvSpPr/>
+          <p:nvPr/>
+        </p:nvSpPr>
+        <p:spPr>
+          <a:xfrm>
+            <a:off x="11897469" y="267476"/>
+            <a:ext cx="2718510" cy="2041591"/>
+          </a:xfrm>
+          <a:prstGeom prst="rect">
+            <a:avLst/>
+          </a:prstGeom>
+          <a:noFill/>
+          <a:ln w="38100">
+            <a:solidFill>
+              <a:srgbClr val="FF0000"/>
+            </a:solidFill>
+          </a:ln>
+        </p:spPr>
+        <p:style>
+          <a:lnRef idx="2">
+            <a:schemeClr val="accent1">
+              <a:shade val="50000"/>
+            </a:schemeClr>
+          </a:lnRef>
+          <a:fillRef idx="1">
+            <a:schemeClr val="accent1"/>
+          </a:fillRef>
+          <a:effectRef idx="0">
+            <a:schemeClr val="accent1"/>
+          </a:effectRef>
+          <a:fontRef idx="minor">
+            <a:schemeClr val="lt1"/>
+          </a:fontRef>
+        </p:style>
+        <p:txBody>
+          <a:bodyPr rtlCol="0" anchor="ctr"/>
+          <a:lstStyle/>
+          <a:p>
+            <a:pPr algn="ctr"/>
+            <a:endParaRPr lang="en-US"/>
+          </a:p>
+        </p:txBody>
+      </p:sp>
+      <p:sp>
+        <p:nvSpPr>
+          <p:cNvPr id="97" name="TextBox 96">
+            <a:extLst>
+              <a:ext uri="{FF2B5EF4-FFF2-40B4-BE49-F238E27FC236}">
+                <a16:creationId xmlns:a16="http://schemas.microsoft.com/office/drawing/2014/main" id="{9BD302B3-4FE7-D142-9A6A-BCEFBABE724A}"/>
+              </a:ext>
+            </a:extLst>
+          </p:cNvPr>
+          <p:cNvSpPr txBox="1"/>
+          <p:nvPr/>
+        </p:nvSpPr>
+        <p:spPr>
+          <a:xfrm>
+            <a:off x="11808281" y="-66603"/>
+            <a:ext cx="2776693" cy="369332"/>
+          </a:xfrm>
+          <a:prstGeom prst="rect">
+            <a:avLst/>
+          </a:prstGeom>
+          <a:noFill/>
+        </p:spPr>
+        <p:txBody>
+          <a:bodyPr wrap="square" rtlCol="0">
+            <a:spAutoFit/>
+          </a:bodyPr>
+          <a:lstStyle/>
+          <a:p>
+            <a:r>
+              <a:rPr lang="en-US" sz="1800" b="1" dirty="0">
+                <a:solidFill>
+                  <a:srgbClr val="FF0000"/>
+                </a:solidFill>
+              </a:rPr>
+              <a:t>Derived Computations</a:t>
+            </a:r>
+          </a:p>
+        </p:txBody>
+      </p:sp>
+      <p:sp>
+        <p:nvSpPr>
+          <p:cNvPr id="99" name="Rectangle 98">
+            <a:extLst>
+              <a:ext uri="{FF2B5EF4-FFF2-40B4-BE49-F238E27FC236}">
+                <a16:creationId xmlns:a16="http://schemas.microsoft.com/office/drawing/2014/main" id="{CA376A48-3D3D-F747-A232-7416F9B0C77D}"/>
+              </a:ext>
+            </a:extLst>
+          </p:cNvPr>
+          <p:cNvSpPr/>
+          <p:nvPr/>
+        </p:nvSpPr>
+        <p:spPr>
+          <a:xfrm>
+            <a:off x="9318549" y="269276"/>
+            <a:ext cx="2548918" cy="2030323"/>
+          </a:xfrm>
+          <a:prstGeom prst="rect">
+            <a:avLst/>
+          </a:prstGeom>
+          <a:noFill/>
+          <a:ln w="38100">
+            <a:solidFill>
+              <a:schemeClr val="tx1"/>
+            </a:solidFill>
+          </a:ln>
+        </p:spPr>
+        <p:style>
+          <a:lnRef idx="2">
+            <a:schemeClr val="accent1">
+              <a:shade val="50000"/>
+            </a:schemeClr>
+          </a:lnRef>
+          <a:fillRef idx="1">
+            <a:schemeClr val="accent1"/>
+          </a:fillRef>
+          <a:effectRef idx="0">
+            <a:schemeClr val="accent1"/>
+          </a:effectRef>
+          <a:fontRef idx="minor">
+            <a:schemeClr val="lt1"/>
+          </a:fontRef>
+        </p:style>
+        <p:txBody>
+          <a:bodyPr rtlCol="0" anchor="ctr"/>
+          <a:lstStyle/>
+          <a:p>
+            <a:pPr algn="ctr"/>
+            <a:endParaRPr lang="en-US"/>
+          </a:p>
+        </p:txBody>
+      </p:sp>
+      <p:sp>
+        <p:nvSpPr>
+          <p:cNvPr id="100" name="TextBox 99">
+            <a:extLst>
+              <a:ext uri="{FF2B5EF4-FFF2-40B4-BE49-F238E27FC236}">
+                <a16:creationId xmlns:a16="http://schemas.microsoft.com/office/drawing/2014/main" id="{361EA2B2-9F40-5C45-A572-D9B11B1DA87A}"/>
+              </a:ext>
+            </a:extLst>
+          </p:cNvPr>
+          <p:cNvSpPr txBox="1"/>
+          <p:nvPr/>
+        </p:nvSpPr>
+        <p:spPr>
+          <a:xfrm>
+            <a:off x="9321952" y="-44416"/>
+            <a:ext cx="2776693" cy="369332"/>
+          </a:xfrm>
+          <a:prstGeom prst="rect">
+            <a:avLst/>
+          </a:prstGeom>
+          <a:noFill/>
+        </p:spPr>
+        <p:txBody>
+          <a:bodyPr wrap="square" rtlCol="0">
+            <a:spAutoFit/>
+          </a:bodyPr>
+          <a:lstStyle/>
+          <a:p>
+            <a:r>
+              <a:rPr lang="en-US" sz="1800" b="1" dirty="0"/>
+              <a:t>Segment Counts</a:t>
+            </a:r>
           </a:p>
         </p:txBody>
       </p:sp>

</xml_diff>

<commit_message>
final check for proofs
</commit_message>
<xml_diff>
--- a/paper_rmd/fig_levels.pptx
+++ b/paper_rmd/fig_levels.pptx
@@ -4,6 +4,9 @@
   <p:sldMasterIdLst>
     <p:sldMasterId id="2147483672" r:id="rId1"/>
   </p:sldMasterIdLst>
+  <p:notesMasterIdLst>
+    <p:notesMasterId r:id="rId3"/>
+  </p:notesMasterIdLst>
   <p:sldIdLst>
     <p:sldId id="256" r:id="rId2"/>
   </p:sldIdLst>
@@ -112,6 +115,440 @@
 </p:presentation>
 </file>
 
+<file path=ppt/notesMasters/notesMaster1.xml><?xml version="1.0" encoding="utf-8"?>
+<p:notesMaster xmlns:a="http://schemas.openxmlformats.org/drawingml/2006/main" xmlns:r="http://schemas.openxmlformats.org/officeDocument/2006/relationships" xmlns:p="http://schemas.openxmlformats.org/presentationml/2006/main">
+  <p:cSld>
+    <p:bg>
+      <p:bgRef idx="1001">
+        <a:schemeClr val="bg1"/>
+      </p:bgRef>
+    </p:bg>
+    <p:spTree>
+      <p:nvGrpSpPr>
+        <p:cNvPr id="1" name=""/>
+        <p:cNvGrpSpPr/>
+        <p:nvPr/>
+      </p:nvGrpSpPr>
+      <p:grpSpPr>
+        <a:xfrm>
+          <a:off x="0" y="0"/>
+          <a:ext cx="0" cy="0"/>
+          <a:chOff x="0" y="0"/>
+          <a:chExt cx="0" cy="0"/>
+        </a:xfrm>
+      </p:grpSpPr>
+      <p:sp>
+        <p:nvSpPr>
+          <p:cNvPr id="2" name="Header Placeholder 1"/>
+          <p:cNvSpPr>
+            <a:spLocks noGrp="1"/>
+          </p:cNvSpPr>
+          <p:nvPr>
+            <p:ph type="hdr" sz="quarter"/>
+          </p:nvPr>
+        </p:nvSpPr>
+        <p:spPr>
+          <a:xfrm>
+            <a:off x="0" y="0"/>
+            <a:ext cx="2971800" cy="458788"/>
+          </a:xfrm>
+          <a:prstGeom prst="rect">
+            <a:avLst/>
+          </a:prstGeom>
+        </p:spPr>
+        <p:txBody>
+          <a:bodyPr vert="horz" lIns="91440" tIns="45720" rIns="91440" bIns="45720" rtlCol="0"/>
+          <a:lstStyle>
+            <a:lvl1pPr algn="l">
+              <a:defRPr sz="1200"/>
+            </a:lvl1pPr>
+          </a:lstStyle>
+          <a:p>
+            <a:endParaRPr lang="en-US"/>
+          </a:p>
+        </p:txBody>
+      </p:sp>
+      <p:sp>
+        <p:nvSpPr>
+          <p:cNvPr id="3" name="Date Placeholder 2"/>
+          <p:cNvSpPr>
+            <a:spLocks noGrp="1"/>
+          </p:cNvSpPr>
+          <p:nvPr>
+            <p:ph type="dt" idx="1"/>
+          </p:nvPr>
+        </p:nvSpPr>
+        <p:spPr>
+          <a:xfrm>
+            <a:off x="3884613" y="0"/>
+            <a:ext cx="2971800" cy="458788"/>
+          </a:xfrm>
+          <a:prstGeom prst="rect">
+            <a:avLst/>
+          </a:prstGeom>
+        </p:spPr>
+        <p:txBody>
+          <a:bodyPr vert="horz" lIns="91440" tIns="45720" rIns="91440" bIns="45720" rtlCol="0"/>
+          <a:lstStyle>
+            <a:lvl1pPr algn="r">
+              <a:defRPr sz="1200"/>
+            </a:lvl1pPr>
+          </a:lstStyle>
+          <a:p>
+            <a:fld id="{08BEB818-3435-0541-9D5D-2978F018E00D}" type="datetimeFigureOut">
+              <a:rPr lang="en-US" smtClean="0"/>
+              <a:t>5/15/20</a:t>
+            </a:fld>
+            <a:endParaRPr lang="en-US"/>
+          </a:p>
+        </p:txBody>
+      </p:sp>
+      <p:sp>
+        <p:nvSpPr>
+          <p:cNvPr id="4" name="Slide Image Placeholder 3"/>
+          <p:cNvSpPr>
+            <a:spLocks noGrp="1" noRot="1" noChangeAspect="1"/>
+          </p:cNvSpPr>
+          <p:nvPr>
+            <p:ph type="sldImg" idx="2"/>
+          </p:nvPr>
+        </p:nvSpPr>
+        <p:spPr>
+          <a:xfrm>
+            <a:off x="249238" y="1143000"/>
+            <a:ext cx="6359525" cy="3086100"/>
+          </a:xfrm>
+          <a:prstGeom prst="rect">
+            <a:avLst/>
+          </a:prstGeom>
+          <a:noFill/>
+          <a:ln w="12700">
+            <a:solidFill>
+              <a:prstClr val="black"/>
+            </a:solidFill>
+          </a:ln>
+        </p:spPr>
+        <p:txBody>
+          <a:bodyPr vert="horz" lIns="91440" tIns="45720" rIns="91440" bIns="45720" rtlCol="0" anchor="ctr"/>
+          <a:lstStyle/>
+          <a:p>
+            <a:endParaRPr lang="en-US"/>
+          </a:p>
+        </p:txBody>
+      </p:sp>
+      <p:sp>
+        <p:nvSpPr>
+          <p:cNvPr id="5" name="Notes Placeholder 4"/>
+          <p:cNvSpPr>
+            <a:spLocks noGrp="1"/>
+          </p:cNvSpPr>
+          <p:nvPr>
+            <p:ph type="body" sz="quarter" idx="3"/>
+          </p:nvPr>
+        </p:nvSpPr>
+        <p:spPr>
+          <a:xfrm>
+            <a:off x="685800" y="4400550"/>
+            <a:ext cx="5486400" cy="3600450"/>
+          </a:xfrm>
+          <a:prstGeom prst="rect">
+            <a:avLst/>
+          </a:prstGeom>
+        </p:spPr>
+        <p:txBody>
+          <a:bodyPr vert="horz" lIns="91440" tIns="45720" rIns="91440" bIns="45720" rtlCol="0"/>
+          <a:lstStyle/>
+          <a:p>
+            <a:pPr lvl="0"/>
+            <a:r>
+              <a:rPr lang="fr-FR" smtClean="0"/>
+              <a:t>Click to edit Master text styles</a:t>
+            </a:r>
+          </a:p>
+          <a:p>
+            <a:pPr lvl="1"/>
+            <a:r>
+              <a:rPr lang="fr-FR" smtClean="0"/>
+              <a:t>Second level</a:t>
+            </a:r>
+          </a:p>
+          <a:p>
+            <a:pPr lvl="2"/>
+            <a:r>
+              <a:rPr lang="fr-FR" smtClean="0"/>
+              <a:t>Third level</a:t>
+            </a:r>
+          </a:p>
+          <a:p>
+            <a:pPr lvl="3"/>
+            <a:r>
+              <a:rPr lang="fr-FR" smtClean="0"/>
+              <a:t>Fourth level</a:t>
+            </a:r>
+          </a:p>
+          <a:p>
+            <a:pPr lvl="4"/>
+            <a:r>
+              <a:rPr lang="fr-FR" smtClean="0"/>
+              <a:t>Fifth level</a:t>
+            </a:r>
+            <a:endParaRPr lang="en-US"/>
+          </a:p>
+        </p:txBody>
+      </p:sp>
+      <p:sp>
+        <p:nvSpPr>
+          <p:cNvPr id="6" name="Footer Placeholder 5"/>
+          <p:cNvSpPr>
+            <a:spLocks noGrp="1"/>
+          </p:cNvSpPr>
+          <p:nvPr>
+            <p:ph type="ftr" sz="quarter" idx="4"/>
+          </p:nvPr>
+        </p:nvSpPr>
+        <p:spPr>
+          <a:xfrm>
+            <a:off x="0" y="8685213"/>
+            <a:ext cx="2971800" cy="458787"/>
+          </a:xfrm>
+          <a:prstGeom prst="rect">
+            <a:avLst/>
+          </a:prstGeom>
+        </p:spPr>
+        <p:txBody>
+          <a:bodyPr vert="horz" lIns="91440" tIns="45720" rIns="91440" bIns="45720" rtlCol="0" anchor="b"/>
+          <a:lstStyle>
+            <a:lvl1pPr algn="l">
+              <a:defRPr sz="1200"/>
+            </a:lvl1pPr>
+          </a:lstStyle>
+          <a:p>
+            <a:endParaRPr lang="en-US"/>
+          </a:p>
+        </p:txBody>
+      </p:sp>
+      <p:sp>
+        <p:nvSpPr>
+          <p:cNvPr id="7" name="Slide Number Placeholder 6"/>
+          <p:cNvSpPr>
+            <a:spLocks noGrp="1"/>
+          </p:cNvSpPr>
+          <p:nvPr>
+            <p:ph type="sldNum" sz="quarter" idx="5"/>
+          </p:nvPr>
+        </p:nvSpPr>
+        <p:spPr>
+          <a:xfrm>
+            <a:off x="3884613" y="8685213"/>
+            <a:ext cx="2971800" cy="458787"/>
+          </a:xfrm>
+          <a:prstGeom prst="rect">
+            <a:avLst/>
+          </a:prstGeom>
+        </p:spPr>
+        <p:txBody>
+          <a:bodyPr vert="horz" lIns="91440" tIns="45720" rIns="91440" bIns="45720" rtlCol="0" anchor="b"/>
+          <a:lstStyle>
+            <a:lvl1pPr algn="r">
+              <a:defRPr sz="1200"/>
+            </a:lvl1pPr>
+          </a:lstStyle>
+          <a:p>
+            <a:fld id="{E2C7AD82-9662-4940-9266-8A54F3FA2B2E}" type="slidenum">
+              <a:rPr lang="en-US" smtClean="0"/>
+              <a:t>‹#›</a:t>
+            </a:fld>
+            <a:endParaRPr lang="en-US"/>
+          </a:p>
+        </p:txBody>
+      </p:sp>
+    </p:spTree>
+    <p:extLst>
+      <p:ext uri="{BB962C8B-B14F-4D97-AF65-F5344CB8AC3E}">
+        <p14:creationId xmlns:p14="http://schemas.microsoft.com/office/powerpoint/2010/main" val="1979583997"/>
+      </p:ext>
+    </p:extLst>
+  </p:cSld>
+  <p:clrMap bg1="lt1" tx1="dk1" bg2="lt2" tx2="dk2" accent1="accent1" accent2="accent2" accent3="accent3" accent4="accent4" accent5="accent5" accent6="accent6" hlink="hlink" folHlink="folHlink"/>
+  <p:notesStyle>
+    <a:lvl1pPr marL="0" algn="l" defTabSz="914400" rtl="0" eaLnBrk="1" latinLnBrk="0" hangingPunct="1">
+      <a:defRPr sz="1200" kern="1200">
+        <a:solidFill>
+          <a:schemeClr val="tx1"/>
+        </a:solidFill>
+        <a:latin typeface="+mn-lt"/>
+        <a:ea typeface="+mn-ea"/>
+        <a:cs typeface="+mn-cs"/>
+      </a:defRPr>
+    </a:lvl1pPr>
+    <a:lvl2pPr marL="457200" algn="l" defTabSz="914400" rtl="0" eaLnBrk="1" latinLnBrk="0" hangingPunct="1">
+      <a:defRPr sz="1200" kern="1200">
+        <a:solidFill>
+          <a:schemeClr val="tx1"/>
+        </a:solidFill>
+        <a:latin typeface="+mn-lt"/>
+        <a:ea typeface="+mn-ea"/>
+        <a:cs typeface="+mn-cs"/>
+      </a:defRPr>
+    </a:lvl2pPr>
+    <a:lvl3pPr marL="914400" algn="l" defTabSz="914400" rtl="0" eaLnBrk="1" latinLnBrk="0" hangingPunct="1">
+      <a:defRPr sz="1200" kern="1200">
+        <a:solidFill>
+          <a:schemeClr val="tx1"/>
+        </a:solidFill>
+        <a:latin typeface="+mn-lt"/>
+        <a:ea typeface="+mn-ea"/>
+        <a:cs typeface="+mn-cs"/>
+      </a:defRPr>
+    </a:lvl3pPr>
+    <a:lvl4pPr marL="1371600" algn="l" defTabSz="914400" rtl="0" eaLnBrk="1" latinLnBrk="0" hangingPunct="1">
+      <a:defRPr sz="1200" kern="1200">
+        <a:solidFill>
+          <a:schemeClr val="tx1"/>
+        </a:solidFill>
+        <a:latin typeface="+mn-lt"/>
+        <a:ea typeface="+mn-ea"/>
+        <a:cs typeface="+mn-cs"/>
+      </a:defRPr>
+    </a:lvl4pPr>
+    <a:lvl5pPr marL="1828800" algn="l" defTabSz="914400" rtl="0" eaLnBrk="1" latinLnBrk="0" hangingPunct="1">
+      <a:defRPr sz="1200" kern="1200">
+        <a:solidFill>
+          <a:schemeClr val="tx1"/>
+        </a:solidFill>
+        <a:latin typeface="+mn-lt"/>
+        <a:ea typeface="+mn-ea"/>
+        <a:cs typeface="+mn-cs"/>
+      </a:defRPr>
+    </a:lvl5pPr>
+    <a:lvl6pPr marL="2286000" algn="l" defTabSz="914400" rtl="0" eaLnBrk="1" latinLnBrk="0" hangingPunct="1">
+      <a:defRPr sz="1200" kern="1200">
+        <a:solidFill>
+          <a:schemeClr val="tx1"/>
+        </a:solidFill>
+        <a:latin typeface="+mn-lt"/>
+        <a:ea typeface="+mn-ea"/>
+        <a:cs typeface="+mn-cs"/>
+      </a:defRPr>
+    </a:lvl6pPr>
+    <a:lvl7pPr marL="2743200" algn="l" defTabSz="914400" rtl="0" eaLnBrk="1" latinLnBrk="0" hangingPunct="1">
+      <a:defRPr sz="1200" kern="1200">
+        <a:solidFill>
+          <a:schemeClr val="tx1"/>
+        </a:solidFill>
+        <a:latin typeface="+mn-lt"/>
+        <a:ea typeface="+mn-ea"/>
+        <a:cs typeface="+mn-cs"/>
+      </a:defRPr>
+    </a:lvl7pPr>
+    <a:lvl8pPr marL="3200400" algn="l" defTabSz="914400" rtl="0" eaLnBrk="1" latinLnBrk="0" hangingPunct="1">
+      <a:defRPr sz="1200" kern="1200">
+        <a:solidFill>
+          <a:schemeClr val="tx1"/>
+        </a:solidFill>
+        <a:latin typeface="+mn-lt"/>
+        <a:ea typeface="+mn-ea"/>
+        <a:cs typeface="+mn-cs"/>
+      </a:defRPr>
+    </a:lvl8pPr>
+    <a:lvl9pPr marL="3657600" algn="l" defTabSz="914400" rtl="0" eaLnBrk="1" latinLnBrk="0" hangingPunct="1">
+      <a:defRPr sz="1200" kern="1200">
+        <a:solidFill>
+          <a:schemeClr val="tx1"/>
+        </a:solidFill>
+        <a:latin typeface="+mn-lt"/>
+        <a:ea typeface="+mn-ea"/>
+        <a:cs typeface="+mn-cs"/>
+      </a:defRPr>
+    </a:lvl9pPr>
+  </p:notesStyle>
+</p:notesMaster>
+</file>
+
+<file path=ppt/notesSlides/notesSlide1.xml><?xml version="1.0" encoding="utf-8"?>
+<p:notes xmlns:a="http://schemas.openxmlformats.org/drawingml/2006/main" xmlns:r="http://schemas.openxmlformats.org/officeDocument/2006/relationships" xmlns:p="http://schemas.openxmlformats.org/presentationml/2006/main">
+  <p:cSld>
+    <p:spTree>
+      <p:nvGrpSpPr>
+        <p:cNvPr id="1" name=""/>
+        <p:cNvGrpSpPr/>
+        <p:nvPr/>
+      </p:nvGrpSpPr>
+      <p:grpSpPr>
+        <a:xfrm>
+          <a:off x="0" y="0"/>
+          <a:ext cx="0" cy="0"/>
+          <a:chOff x="0" y="0"/>
+          <a:chExt cx="0" cy="0"/>
+        </a:xfrm>
+      </p:grpSpPr>
+      <p:sp>
+        <p:nvSpPr>
+          <p:cNvPr id="2" name="Slide Image Placeholder 1"/>
+          <p:cNvSpPr>
+            <a:spLocks noGrp="1" noRot="1" noChangeAspect="1"/>
+          </p:cNvSpPr>
+          <p:nvPr>
+            <p:ph type="sldImg"/>
+          </p:nvPr>
+        </p:nvSpPr>
+        <p:spPr/>
+      </p:sp>
+      <p:sp>
+        <p:nvSpPr>
+          <p:cNvPr id="3" name="Notes Placeholder 2"/>
+          <p:cNvSpPr>
+            <a:spLocks noGrp="1"/>
+          </p:cNvSpPr>
+          <p:nvPr>
+            <p:ph type="body" idx="1"/>
+          </p:nvPr>
+        </p:nvSpPr>
+        <p:spPr/>
+        <p:txBody>
+          <a:bodyPr/>
+          <a:lstStyle/>
+          <a:p>
+            <a:endParaRPr lang="en-US" dirty="0"/>
+          </a:p>
+        </p:txBody>
+      </p:sp>
+      <p:sp>
+        <p:nvSpPr>
+          <p:cNvPr id="4" name="Slide Number Placeholder 3"/>
+          <p:cNvSpPr>
+            <a:spLocks noGrp="1"/>
+          </p:cNvSpPr>
+          <p:nvPr>
+            <p:ph type="sldNum" sz="quarter" idx="10"/>
+          </p:nvPr>
+        </p:nvSpPr>
+        <p:spPr/>
+        <p:txBody>
+          <a:bodyPr/>
+          <a:lstStyle/>
+          <a:p>
+            <a:fld id="{E2C7AD82-9662-4940-9266-8A54F3FA2B2E}" type="slidenum">
+              <a:rPr lang="en-US" smtClean="0"/>
+              <a:t>1</a:t>
+            </a:fld>
+            <a:endParaRPr lang="en-US"/>
+          </a:p>
+        </p:txBody>
+      </p:sp>
+    </p:spTree>
+    <p:extLst>
+      <p:ext uri="{BB962C8B-B14F-4D97-AF65-F5344CB8AC3E}">
+        <p14:creationId xmlns:p14="http://schemas.microsoft.com/office/powerpoint/2010/main" val="2051578255"/>
+      </p:ext>
+    </p:extLst>
+  </p:cSld>
+  <p:clrMapOvr>
+    <a:masterClrMapping/>
+  </p:clrMapOvr>
+</p:notes>
+</file>
+
 <file path=ppt/slideLayouts/slideLayout1.xml><?xml version="1.0" encoding="utf-8"?>
 <p:sldLayout xmlns:a="http://schemas.openxmlformats.org/drawingml/2006/main" xmlns:r="http://schemas.openxmlformats.org/officeDocument/2006/relationships" xmlns:p="http://schemas.openxmlformats.org/presentationml/2006/main" type="title" preserve="1">
   <p:cSld name="Title Slide">
@@ -243,7 +680,7 @@
           <a:p>
             <a:fld id="{B379093E-BEAA-FA4E-8A8F-8A6D064ADF88}" type="datetimeFigureOut">
               <a:rPr lang="en-US" smtClean="0"/>
-              <a:t>1/14/20</a:t>
+              <a:t>5/15/20</a:t>
             </a:fld>
             <a:endParaRPr lang="en-US"/>
           </a:p>
@@ -413,7 +850,7 @@
           <a:p>
             <a:fld id="{B379093E-BEAA-FA4E-8A8F-8A6D064ADF88}" type="datetimeFigureOut">
               <a:rPr lang="en-US" smtClean="0"/>
-              <a:t>1/14/20</a:t>
+              <a:t>5/15/20</a:t>
             </a:fld>
             <a:endParaRPr lang="en-US"/>
           </a:p>
@@ -593,7 +1030,7 @@
           <a:p>
             <a:fld id="{B379093E-BEAA-FA4E-8A8F-8A6D064ADF88}" type="datetimeFigureOut">
               <a:rPr lang="en-US" smtClean="0"/>
-              <a:t>1/14/20</a:t>
+              <a:t>5/15/20</a:t>
             </a:fld>
             <a:endParaRPr lang="en-US"/>
           </a:p>
@@ -763,7 +1200,7 @@
           <a:p>
             <a:fld id="{B379093E-BEAA-FA4E-8A8F-8A6D064ADF88}" type="datetimeFigureOut">
               <a:rPr lang="en-US" smtClean="0"/>
-              <a:t>1/14/20</a:t>
+              <a:t>5/15/20</a:t>
             </a:fld>
             <a:endParaRPr lang="en-US"/>
           </a:p>
@@ -1009,7 +1446,7 @@
           <a:p>
             <a:fld id="{B379093E-BEAA-FA4E-8A8F-8A6D064ADF88}" type="datetimeFigureOut">
               <a:rPr lang="en-US" smtClean="0"/>
-              <a:t>1/14/20</a:t>
+              <a:t>5/15/20</a:t>
             </a:fld>
             <a:endParaRPr lang="en-US"/>
           </a:p>
@@ -1241,7 +1678,7 @@
           <a:p>
             <a:fld id="{B379093E-BEAA-FA4E-8A8F-8A6D064ADF88}" type="datetimeFigureOut">
               <a:rPr lang="en-US" smtClean="0"/>
-              <a:t>1/14/20</a:t>
+              <a:t>5/15/20</a:t>
             </a:fld>
             <a:endParaRPr lang="en-US"/>
           </a:p>
@@ -1608,7 +2045,7 @@
           <a:p>
             <a:fld id="{B379093E-BEAA-FA4E-8A8F-8A6D064ADF88}" type="datetimeFigureOut">
               <a:rPr lang="en-US" smtClean="0"/>
-              <a:t>1/14/20</a:t>
+              <a:t>5/15/20</a:t>
             </a:fld>
             <a:endParaRPr lang="en-US"/>
           </a:p>
@@ -1726,7 +2163,7 @@
           <a:p>
             <a:fld id="{B379093E-BEAA-FA4E-8A8F-8A6D064ADF88}" type="datetimeFigureOut">
               <a:rPr lang="en-US" smtClean="0"/>
-              <a:t>1/14/20</a:t>
+              <a:t>5/15/20</a:t>
             </a:fld>
             <a:endParaRPr lang="en-US"/>
           </a:p>
@@ -1821,7 +2258,7 @@
           <a:p>
             <a:fld id="{B379093E-BEAA-FA4E-8A8F-8A6D064ADF88}" type="datetimeFigureOut">
               <a:rPr lang="en-US" smtClean="0"/>
-              <a:t>1/14/20</a:t>
+              <a:t>5/15/20</a:t>
             </a:fld>
             <a:endParaRPr lang="en-US"/>
           </a:p>
@@ -2098,7 +2535,7 @@
           <a:p>
             <a:fld id="{B379093E-BEAA-FA4E-8A8F-8A6D064ADF88}" type="datetimeFigureOut">
               <a:rPr lang="en-US" smtClean="0"/>
-              <a:t>1/14/20</a:t>
+              <a:t>5/15/20</a:t>
             </a:fld>
             <a:endParaRPr lang="en-US"/>
           </a:p>
@@ -2355,7 +2792,7 @@
           <a:p>
             <a:fld id="{B379093E-BEAA-FA4E-8A8F-8A6D064ADF88}" type="datetimeFigureOut">
               <a:rPr lang="en-US" smtClean="0"/>
-              <a:t>1/14/20</a:t>
+              <a:t>5/15/20</a:t>
             </a:fld>
             <a:endParaRPr lang="en-US"/>
           </a:p>
@@ -2568,7 +3005,7 @@
           <a:p>
             <a:fld id="{B379093E-BEAA-FA4E-8A8F-8A6D064ADF88}" type="datetimeFigureOut">
               <a:rPr lang="en-US" smtClean="0"/>
-              <a:t>1/14/20</a:t>
+              <a:t>5/15/20</a:t>
             </a:fld>
             <a:endParaRPr lang="en-US"/>
           </a:p>
@@ -2973,6 +3410,456 @@
           <a:chExt cx="0" cy="0"/>
         </a:xfrm>
       </p:grpSpPr>
+      <p:cxnSp>
+        <p:nvCxnSpPr>
+          <p:cNvPr id="115" name="Straight Connector 114"/>
+          <p:cNvCxnSpPr/>
+          <p:nvPr/>
+        </p:nvCxnSpPr>
+        <p:spPr>
+          <a:xfrm flipH="1" flipV="1">
+            <a:off x="4122283" y="6689007"/>
+            <a:ext cx="10526845" cy="1927"/>
+          </a:xfrm>
+          <a:prstGeom prst="line">
+            <a:avLst/>
+          </a:prstGeom>
+          <a:ln>
+            <a:solidFill>
+              <a:schemeClr val="tx1"/>
+            </a:solidFill>
+            <a:prstDash val="dash"/>
+          </a:ln>
+        </p:spPr>
+        <p:style>
+          <a:lnRef idx="1">
+            <a:schemeClr val="accent1"/>
+          </a:lnRef>
+          <a:fillRef idx="0">
+            <a:schemeClr val="accent1"/>
+          </a:fillRef>
+          <a:effectRef idx="0">
+            <a:schemeClr val="accent1"/>
+          </a:effectRef>
+          <a:fontRef idx="minor">
+            <a:schemeClr val="tx1"/>
+          </a:fontRef>
+        </p:style>
+      </p:cxnSp>
+      <p:sp>
+        <p:nvSpPr>
+          <p:cNvPr id="196" name="Rectangle 195"/>
+          <p:cNvSpPr/>
+          <p:nvPr/>
+        </p:nvSpPr>
+        <p:spPr>
+          <a:xfrm>
+            <a:off x="8278607" y="2769474"/>
+            <a:ext cx="871980" cy="201168"/>
+          </a:xfrm>
+          <a:prstGeom prst="rect">
+            <a:avLst/>
+          </a:prstGeom>
+          <a:solidFill>
+            <a:schemeClr val="tx1"/>
+          </a:solidFill>
+        </p:spPr>
+        <p:style>
+          <a:lnRef idx="2">
+            <a:schemeClr val="accent1">
+              <a:shade val="50000"/>
+            </a:schemeClr>
+          </a:lnRef>
+          <a:fillRef idx="1">
+            <a:schemeClr val="accent1"/>
+          </a:fillRef>
+          <a:effectRef idx="0">
+            <a:schemeClr val="accent1"/>
+          </a:effectRef>
+          <a:fontRef idx="minor">
+            <a:schemeClr val="lt1"/>
+          </a:fontRef>
+        </p:style>
+        <p:txBody>
+          <a:bodyPr rtlCol="0" anchor="ctr"/>
+          <a:lstStyle/>
+          <a:p>
+            <a:pPr algn="ctr"/>
+            <a:endParaRPr lang="en-US" dirty="0"/>
+          </a:p>
+        </p:txBody>
+      </p:sp>
+      <p:cxnSp>
+        <p:nvCxnSpPr>
+          <p:cNvPr id="101" name="Straight Connector 100"/>
+          <p:cNvCxnSpPr/>
+          <p:nvPr/>
+        </p:nvCxnSpPr>
+        <p:spPr>
+          <a:xfrm flipH="1" flipV="1">
+            <a:off x="4103556" y="2995753"/>
+            <a:ext cx="10526845" cy="1927"/>
+          </a:xfrm>
+          <a:prstGeom prst="line">
+            <a:avLst/>
+          </a:prstGeom>
+          <a:ln>
+            <a:solidFill>
+              <a:schemeClr val="tx1"/>
+            </a:solidFill>
+            <a:prstDash val="dash"/>
+          </a:ln>
+        </p:spPr>
+        <p:style>
+          <a:lnRef idx="1">
+            <a:schemeClr val="accent1"/>
+          </a:lnRef>
+          <a:fillRef idx="0">
+            <a:schemeClr val="accent1"/>
+          </a:fillRef>
+          <a:effectRef idx="0">
+            <a:schemeClr val="accent1"/>
+          </a:effectRef>
+          <a:fontRef idx="minor">
+            <a:schemeClr val="tx1"/>
+          </a:fontRef>
+        </p:style>
+      </p:cxnSp>
+      <p:cxnSp>
+        <p:nvCxnSpPr>
+          <p:cNvPr id="116" name="Straight Connector 115"/>
+          <p:cNvCxnSpPr/>
+          <p:nvPr/>
+        </p:nvCxnSpPr>
+        <p:spPr>
+          <a:xfrm flipH="1" flipV="1">
+            <a:off x="4060811" y="6064420"/>
+            <a:ext cx="10526845" cy="1927"/>
+          </a:xfrm>
+          <a:prstGeom prst="line">
+            <a:avLst/>
+          </a:prstGeom>
+          <a:ln>
+            <a:solidFill>
+              <a:schemeClr val="tx1"/>
+            </a:solidFill>
+            <a:prstDash val="solid"/>
+          </a:ln>
+        </p:spPr>
+        <p:style>
+          <a:lnRef idx="1">
+            <a:schemeClr val="accent1"/>
+          </a:lnRef>
+          <a:fillRef idx="0">
+            <a:schemeClr val="accent1"/>
+          </a:fillRef>
+          <a:effectRef idx="0">
+            <a:schemeClr val="accent1"/>
+          </a:effectRef>
+          <a:fontRef idx="minor">
+            <a:schemeClr val="tx1"/>
+          </a:fontRef>
+        </p:style>
+      </p:cxnSp>
+      <p:sp>
+        <p:nvSpPr>
+          <p:cNvPr id="104" name="Rectangle 103"/>
+          <p:cNvSpPr/>
+          <p:nvPr/>
+        </p:nvSpPr>
+        <p:spPr>
+          <a:xfrm>
+            <a:off x="4085013" y="3842365"/>
+            <a:ext cx="10542689" cy="3162566"/>
+          </a:xfrm>
+          <a:prstGeom prst="rect">
+            <a:avLst/>
+          </a:prstGeom>
+          <a:noFill/>
+          <a:ln>
+            <a:solidFill>
+              <a:schemeClr val="tx1"/>
+            </a:solidFill>
+          </a:ln>
+          <a:effectLst/>
+        </p:spPr>
+        <p:style>
+          <a:lnRef idx="2">
+            <a:schemeClr val="accent1">
+              <a:shade val="50000"/>
+            </a:schemeClr>
+          </a:lnRef>
+          <a:fillRef idx="1">
+            <a:schemeClr val="accent1"/>
+          </a:fillRef>
+          <a:effectRef idx="0">
+            <a:schemeClr val="accent1"/>
+          </a:effectRef>
+          <a:fontRef idx="minor">
+            <a:schemeClr val="lt1"/>
+          </a:fontRef>
+        </p:style>
+        <p:txBody>
+          <a:bodyPr rtlCol="0" anchor="ctr"/>
+          <a:lstStyle/>
+          <a:p>
+            <a:pPr algn="ctr"/>
+            <a:endParaRPr lang="en-US" dirty="0"/>
+          </a:p>
+        </p:txBody>
+      </p:sp>
+      <p:cxnSp>
+        <p:nvCxnSpPr>
+          <p:cNvPr id="106" name="Straight Connector 105"/>
+          <p:cNvCxnSpPr/>
+          <p:nvPr/>
+        </p:nvCxnSpPr>
+        <p:spPr>
+          <a:xfrm flipH="1" flipV="1">
+            <a:off x="4115276" y="4132886"/>
+            <a:ext cx="10526845" cy="1927"/>
+          </a:xfrm>
+          <a:prstGeom prst="line">
+            <a:avLst/>
+          </a:prstGeom>
+          <a:ln>
+            <a:solidFill>
+              <a:schemeClr val="tx1"/>
+            </a:solidFill>
+            <a:prstDash val="dash"/>
+          </a:ln>
+        </p:spPr>
+        <p:style>
+          <a:lnRef idx="1">
+            <a:schemeClr val="accent1"/>
+          </a:lnRef>
+          <a:fillRef idx="0">
+            <a:schemeClr val="accent1"/>
+          </a:fillRef>
+          <a:effectRef idx="0">
+            <a:schemeClr val="accent1"/>
+          </a:effectRef>
+          <a:fontRef idx="minor">
+            <a:schemeClr val="tx1"/>
+          </a:fontRef>
+        </p:style>
+      </p:cxnSp>
+      <p:cxnSp>
+        <p:nvCxnSpPr>
+          <p:cNvPr id="107" name="Straight Connector 106"/>
+          <p:cNvCxnSpPr/>
+          <p:nvPr/>
+        </p:nvCxnSpPr>
+        <p:spPr>
+          <a:xfrm flipH="1" flipV="1">
+            <a:off x="4126996" y="4425960"/>
+            <a:ext cx="10526845" cy="1927"/>
+          </a:xfrm>
+          <a:prstGeom prst="line">
+            <a:avLst/>
+          </a:prstGeom>
+          <a:ln>
+            <a:solidFill>
+              <a:schemeClr val="tx1"/>
+            </a:solidFill>
+            <a:prstDash val="dash"/>
+          </a:ln>
+        </p:spPr>
+        <p:style>
+          <a:lnRef idx="1">
+            <a:schemeClr val="accent1"/>
+          </a:lnRef>
+          <a:fillRef idx="0">
+            <a:schemeClr val="accent1"/>
+          </a:fillRef>
+          <a:effectRef idx="0">
+            <a:schemeClr val="accent1"/>
+          </a:effectRef>
+          <a:fontRef idx="minor">
+            <a:schemeClr val="tx1"/>
+          </a:fontRef>
+        </p:style>
+      </p:cxnSp>
+      <p:cxnSp>
+        <p:nvCxnSpPr>
+          <p:cNvPr id="108" name="Straight Connector 107"/>
+          <p:cNvCxnSpPr/>
+          <p:nvPr/>
+        </p:nvCxnSpPr>
+        <p:spPr>
+          <a:xfrm flipH="1" flipV="1">
+            <a:off x="4138716" y="4719034"/>
+            <a:ext cx="10526845" cy="1927"/>
+          </a:xfrm>
+          <a:prstGeom prst="line">
+            <a:avLst/>
+          </a:prstGeom>
+          <a:ln>
+            <a:solidFill>
+              <a:schemeClr val="tx1"/>
+            </a:solidFill>
+            <a:prstDash val="dash"/>
+          </a:ln>
+        </p:spPr>
+        <p:style>
+          <a:lnRef idx="1">
+            <a:schemeClr val="accent1"/>
+          </a:lnRef>
+          <a:fillRef idx="0">
+            <a:schemeClr val="accent1"/>
+          </a:fillRef>
+          <a:effectRef idx="0">
+            <a:schemeClr val="accent1"/>
+          </a:effectRef>
+          <a:fontRef idx="minor">
+            <a:schemeClr val="tx1"/>
+          </a:fontRef>
+        </p:style>
+      </p:cxnSp>
+      <p:cxnSp>
+        <p:nvCxnSpPr>
+          <p:cNvPr id="110" name="Straight Connector 109"/>
+          <p:cNvCxnSpPr/>
+          <p:nvPr/>
+        </p:nvCxnSpPr>
+        <p:spPr>
+          <a:xfrm flipH="1" flipV="1">
+            <a:off x="4134020" y="5094167"/>
+            <a:ext cx="10526845" cy="1927"/>
+          </a:xfrm>
+          <a:prstGeom prst="line">
+            <a:avLst/>
+          </a:prstGeom>
+          <a:ln>
+            <a:solidFill>
+              <a:schemeClr val="tx1"/>
+            </a:solidFill>
+            <a:prstDash val="solid"/>
+          </a:ln>
+        </p:spPr>
+        <p:style>
+          <a:lnRef idx="1">
+            <a:schemeClr val="accent1"/>
+          </a:lnRef>
+          <a:fillRef idx="0">
+            <a:schemeClr val="accent1"/>
+          </a:fillRef>
+          <a:effectRef idx="0">
+            <a:schemeClr val="accent1"/>
+          </a:effectRef>
+          <a:fontRef idx="minor">
+            <a:schemeClr val="tx1"/>
+          </a:fontRef>
+        </p:style>
+      </p:cxnSp>
+      <p:cxnSp>
+        <p:nvCxnSpPr>
+          <p:cNvPr id="111" name="Straight Connector 110"/>
+          <p:cNvCxnSpPr/>
+          <p:nvPr/>
+        </p:nvCxnSpPr>
+        <p:spPr>
+          <a:xfrm flipH="1" flipV="1">
+            <a:off x="4131672" y="5401309"/>
+            <a:ext cx="10526845" cy="1927"/>
+          </a:xfrm>
+          <a:prstGeom prst="line">
+            <a:avLst/>
+          </a:prstGeom>
+          <a:ln>
+            <a:solidFill>
+              <a:schemeClr val="tx1"/>
+            </a:solidFill>
+            <a:prstDash val="dash"/>
+          </a:ln>
+        </p:spPr>
+        <p:style>
+          <a:lnRef idx="1">
+            <a:schemeClr val="accent1"/>
+          </a:lnRef>
+          <a:fillRef idx="0">
+            <a:schemeClr val="accent1"/>
+          </a:fillRef>
+          <a:effectRef idx="0">
+            <a:schemeClr val="accent1"/>
+          </a:effectRef>
+          <a:fontRef idx="minor">
+            <a:schemeClr val="tx1"/>
+          </a:fontRef>
+        </p:style>
+      </p:cxnSp>
+      <p:cxnSp>
+        <p:nvCxnSpPr>
+          <p:cNvPr id="112" name="Straight Connector 111"/>
+          <p:cNvCxnSpPr/>
+          <p:nvPr/>
+        </p:nvCxnSpPr>
+        <p:spPr>
+          <a:xfrm flipH="1" flipV="1">
+            <a:off x="4129324" y="5694383"/>
+            <a:ext cx="10526845" cy="1927"/>
+          </a:xfrm>
+          <a:prstGeom prst="line">
+            <a:avLst/>
+          </a:prstGeom>
+          <a:ln>
+            <a:solidFill>
+              <a:schemeClr val="tx1"/>
+            </a:solidFill>
+            <a:prstDash val="dash"/>
+          </a:ln>
+        </p:spPr>
+        <p:style>
+          <a:lnRef idx="1">
+            <a:schemeClr val="accent1"/>
+          </a:lnRef>
+          <a:fillRef idx="0">
+            <a:schemeClr val="accent1"/>
+          </a:fillRef>
+          <a:effectRef idx="0">
+            <a:schemeClr val="accent1"/>
+          </a:effectRef>
+          <a:fontRef idx="minor">
+            <a:schemeClr val="tx1"/>
+          </a:fontRef>
+        </p:style>
+      </p:cxnSp>
+      <p:cxnSp>
+        <p:nvCxnSpPr>
+          <p:cNvPr id="114" name="Straight Connector 113"/>
+          <p:cNvCxnSpPr/>
+          <p:nvPr/>
+        </p:nvCxnSpPr>
+        <p:spPr>
+          <a:xfrm flipH="1" flipV="1">
+            <a:off x="4138696" y="6421207"/>
+            <a:ext cx="10526845" cy="1927"/>
+          </a:xfrm>
+          <a:prstGeom prst="line">
+            <a:avLst/>
+          </a:prstGeom>
+          <a:ln>
+            <a:solidFill>
+              <a:schemeClr val="tx1"/>
+            </a:solidFill>
+            <a:prstDash val="dash"/>
+          </a:ln>
+        </p:spPr>
+        <p:style>
+          <a:lnRef idx="1">
+            <a:schemeClr val="accent1"/>
+          </a:lnRef>
+          <a:fillRef idx="0">
+            <a:schemeClr val="accent1"/>
+          </a:fillRef>
+          <a:effectRef idx="0">
+            <a:schemeClr val="accent1"/>
+          </a:effectRef>
+          <a:fontRef idx="minor">
+            <a:schemeClr val="tx1"/>
+          </a:fontRef>
+        </p:style>
+      </p:cxnSp>
       <p:sp>
         <p:nvSpPr>
           <p:cNvPr id="149" name="Rectangle 148"/>
@@ -4233,7 +5120,7 @@
         </p:nvSpPr>
         <p:spPr>
           <a:xfrm>
-            <a:off x="3311024" y="2761947"/>
+            <a:off x="3085941" y="2761947"/>
             <a:ext cx="1045322" cy="923330"/>
           </a:xfrm>
           <a:prstGeom prst="rect">
@@ -4512,7 +5399,7 @@
         </p:nvSpPr>
         <p:spPr>
           <a:xfrm>
-            <a:off x="9245484" y="3039883"/>
+            <a:off x="9245484" y="3011747"/>
             <a:ext cx="2453253" cy="395045"/>
           </a:xfrm>
           <a:prstGeom prst="rect">
@@ -4577,7 +5464,7 @@
         </p:nvSpPr>
         <p:spPr>
           <a:xfrm>
-            <a:off x="9245484" y="3428019"/>
+            <a:off x="9245484" y="3368887"/>
             <a:ext cx="2437659" cy="395045"/>
           </a:xfrm>
           <a:prstGeom prst="rect">
@@ -4600,14 +5487,14 @@
       </p:sp>
       <p:sp>
         <p:nvSpPr>
-          <p:cNvPr id="196" name="Rectangle 195"/>
+          <p:cNvPr id="197" name="Rectangle 196"/>
           <p:cNvSpPr/>
           <p:nvPr/>
         </p:nvSpPr>
         <p:spPr>
           <a:xfrm>
-            <a:off x="8278607" y="2758267"/>
-            <a:ext cx="871980" cy="195409"/>
+            <a:off x="7598050" y="3122001"/>
+            <a:ext cx="409417" cy="201168"/>
           </a:xfrm>
           <a:prstGeom prst="rect">
             <a:avLst/>
@@ -4643,14 +5530,14 @@
       </p:sp>
       <p:sp>
         <p:nvSpPr>
-          <p:cNvPr id="197" name="Rectangle 196"/>
+          <p:cNvPr id="198" name="Rectangle 197"/>
           <p:cNvSpPr/>
           <p:nvPr/>
         </p:nvSpPr>
         <p:spPr>
           <a:xfrm>
-            <a:off x="7569914" y="3151567"/>
-            <a:ext cx="409417" cy="182880"/>
+            <a:off x="5776946" y="3462655"/>
+            <a:ext cx="258487" cy="201168"/>
           </a:xfrm>
           <a:prstGeom prst="rect">
             <a:avLst/>
@@ -4686,14 +5573,14 @@
       </p:sp>
       <p:sp>
         <p:nvSpPr>
-          <p:cNvPr id="198" name="Rectangle 197"/>
+          <p:cNvPr id="199" name="Rectangle 198"/>
           <p:cNvSpPr/>
           <p:nvPr/>
         </p:nvSpPr>
         <p:spPr>
           <a:xfrm>
-            <a:off x="5776946" y="3521787"/>
-            <a:ext cx="258487" cy="182880"/>
+            <a:off x="4598853" y="2777663"/>
+            <a:ext cx="164592" cy="201168"/>
           </a:xfrm>
           <a:prstGeom prst="rect">
             <a:avLst/>
@@ -4729,14 +5616,14 @@
       </p:sp>
       <p:sp>
         <p:nvSpPr>
-          <p:cNvPr id="199" name="Rectangle 198"/>
+          <p:cNvPr id="200" name="Rectangle 199"/>
           <p:cNvSpPr/>
           <p:nvPr/>
         </p:nvSpPr>
         <p:spPr>
           <a:xfrm>
-            <a:off x="4598853" y="2808659"/>
-            <a:ext cx="168845" cy="182880"/>
+            <a:off x="7323442" y="3439887"/>
+            <a:ext cx="246472" cy="201168"/>
           </a:xfrm>
           <a:prstGeom prst="rect">
             <a:avLst/>
@@ -4772,14 +5659,48 @@
       </p:sp>
       <p:sp>
         <p:nvSpPr>
-          <p:cNvPr id="200" name="Rectangle 199"/>
+          <p:cNvPr id="201" name="TextBox 200"/>
+          <p:cNvSpPr txBox="1"/>
+          <p:nvPr/>
+        </p:nvSpPr>
+        <p:spPr>
+          <a:xfrm>
+            <a:off x="9301756" y="3792742"/>
+            <a:ext cx="2437659" cy="395045"/>
+          </a:xfrm>
+          <a:prstGeom prst="rect">
+            <a:avLst/>
+          </a:prstGeom>
+          <a:noFill/>
+        </p:spPr>
+        <p:txBody>
+          <a:bodyPr wrap="square" rtlCol="0">
+            <a:spAutoFit/>
+          </a:bodyPr>
+          <a:lstStyle/>
+          <a:p>
+            <a:r>
+              <a:rPr lang="en-US" dirty="0"/>
+              <a:t>Speech </a:t>
+            </a:r>
+            <a:r>
+              <a:rPr lang="en-US" dirty="0" smtClean="0"/>
+              <a:t>453f</a:t>
+            </a:r>
+            <a:endParaRPr lang="en-US" dirty="0"/>
+          </a:p>
+        </p:txBody>
+      </p:sp>
+      <p:sp>
+        <p:nvSpPr>
+          <p:cNvPr id="202" name="Rectangle 201"/>
           <p:cNvSpPr/>
           <p:nvPr/>
         </p:nvSpPr>
         <p:spPr>
           <a:xfrm>
-            <a:off x="7323442" y="3499020"/>
-            <a:ext cx="246472" cy="186257"/>
+            <a:off x="4598853" y="3919187"/>
+            <a:ext cx="2971061" cy="197972"/>
           </a:xfrm>
           <a:prstGeom prst="rect">
             <a:avLst/>
@@ -4815,85 +5736,13 @@
       </p:sp>
       <p:sp>
         <p:nvSpPr>
-          <p:cNvPr id="201" name="TextBox 200"/>
-          <p:cNvSpPr txBox="1"/>
-          <p:nvPr/>
-        </p:nvSpPr>
-        <p:spPr>
-          <a:xfrm>
-            <a:off x="9245484" y="3849014"/>
-            <a:ext cx="2437659" cy="395045"/>
-          </a:xfrm>
-          <a:prstGeom prst="rect">
-            <a:avLst/>
-          </a:prstGeom>
-          <a:noFill/>
-        </p:spPr>
-        <p:txBody>
-          <a:bodyPr wrap="square" rtlCol="0">
-            <a:spAutoFit/>
-          </a:bodyPr>
-          <a:lstStyle/>
-          <a:p>
-            <a:r>
-              <a:rPr lang="en-US" dirty="0"/>
-              <a:t>Speech 443f</a:t>
-            </a:r>
-          </a:p>
-        </p:txBody>
-      </p:sp>
-      <p:sp>
-        <p:nvSpPr>
-          <p:cNvPr id="202" name="Rectangle 201"/>
-          <p:cNvSpPr/>
-          <p:nvPr/>
-        </p:nvSpPr>
-        <p:spPr>
-          <a:xfrm>
-            <a:off x="4598853" y="3919187"/>
-            <a:ext cx="2971061" cy="197972"/>
-          </a:xfrm>
-          <a:prstGeom prst="rect">
-            <a:avLst/>
-          </a:prstGeom>
-          <a:solidFill>
-            <a:schemeClr val="tx1"/>
-          </a:solidFill>
-        </p:spPr>
-        <p:style>
-          <a:lnRef idx="2">
-            <a:schemeClr val="accent1">
-              <a:shade val="50000"/>
-            </a:schemeClr>
-          </a:lnRef>
-          <a:fillRef idx="1">
-            <a:schemeClr val="accent1"/>
-          </a:fillRef>
-          <a:effectRef idx="0">
-            <a:schemeClr val="accent1"/>
-          </a:effectRef>
-          <a:fontRef idx="minor">
-            <a:schemeClr val="lt1"/>
-          </a:fontRef>
-        </p:style>
-        <p:txBody>
-          <a:bodyPr rtlCol="0" anchor="ctr"/>
-          <a:lstStyle/>
-          <a:p>
-            <a:pPr algn="ctr"/>
-            <a:endParaRPr lang="en-US" dirty="0"/>
-          </a:p>
-        </p:txBody>
-      </p:sp>
-      <p:sp>
-        <p:nvSpPr>
           <p:cNvPr id="203" name="Rectangle 202"/>
           <p:cNvSpPr/>
           <p:nvPr/>
         </p:nvSpPr>
         <p:spPr>
           <a:xfrm>
-            <a:off x="7979331" y="3934121"/>
+            <a:off x="7979331" y="3918623"/>
             <a:ext cx="1171256" cy="200471"/>
           </a:xfrm>
           <a:prstGeom prst="rect">
@@ -4972,8 +5821,8 @@
         </p:nvCxnSpPr>
         <p:spPr>
           <a:xfrm flipH="1" flipV="1">
-            <a:off x="2902933" y="2240508"/>
-            <a:ext cx="543546" cy="4405953"/>
+            <a:off x="2902933" y="2240509"/>
+            <a:ext cx="292641" cy="4380580"/>
           </a:xfrm>
           <a:prstGeom prst="line">
             <a:avLst/>
@@ -5008,7 +5857,7 @@
         </p:nvSpPr>
         <p:spPr>
           <a:xfrm>
-            <a:off x="3323090" y="4573301"/>
+            <a:off x="3071715" y="4656919"/>
             <a:ext cx="1105599" cy="1000467"/>
           </a:xfrm>
           <a:prstGeom prst="rect">
@@ -5024,8 +5873,13 @@
           <a:p>
             <a:r>
               <a:rPr lang="en-US" dirty="0"/>
-              <a:t>Precision &amp; recall analyses</a:t>
-            </a:r>
+              <a:t>Precision </a:t>
+            </a:r>
+            <a:r>
+              <a:rPr lang="en-US" dirty="0" smtClean="0"/>
+              <a:t>&amp; recall analyses</a:t>
+            </a:r>
+            <a:endParaRPr lang="en-US" dirty="0"/>
           </a:p>
         </p:txBody>
       </p:sp>
@@ -5037,7 +5891,7 @@
         </p:nvSpPr>
         <p:spPr>
           <a:xfrm>
-            <a:off x="9245484" y="5211321"/>
+            <a:off x="9245484" y="5070641"/>
             <a:ext cx="3017506" cy="395045"/>
           </a:xfrm>
           <a:prstGeom prst="rect">
@@ -5053,8 +5907,13 @@
           <a:p>
             <a:r>
               <a:rPr lang="en-US" dirty="0"/>
-              <a:t>CHN &amp; Key child 107f</a:t>
-            </a:r>
+              <a:t>CHN &amp; Key child </a:t>
+            </a:r>
+            <a:r>
+              <a:rPr lang="en-US" dirty="0" smtClean="0"/>
+              <a:t>109f</a:t>
+            </a:r>
+            <a:endParaRPr lang="en-US" dirty="0"/>
           </a:p>
         </p:txBody>
       </p:sp>
@@ -5066,8 +5925,8 @@
         </p:nvSpPr>
         <p:spPr>
           <a:xfrm>
-            <a:off x="4785205" y="5213293"/>
-            <a:ext cx="973951" cy="159229"/>
+            <a:off x="4766753" y="5195974"/>
+            <a:ext cx="996696" cy="201168"/>
           </a:xfrm>
           <a:prstGeom prst="rect">
             <a:avLst/>
@@ -5109,8 +5968,8 @@
         </p:nvSpPr>
         <p:spPr>
           <a:xfrm>
-            <a:off x="6046048" y="5455391"/>
-            <a:ext cx="1303450" cy="187872"/>
+            <a:off x="6044026" y="5466542"/>
+            <a:ext cx="1303450" cy="201168"/>
           </a:xfrm>
           <a:prstGeom prst="rect">
             <a:avLst/>
@@ -5152,7 +6011,7 @@
         </p:nvSpPr>
         <p:spPr>
           <a:xfrm>
-            <a:off x="9245484" y="5490986"/>
+            <a:off x="9245484" y="5378442"/>
             <a:ext cx="3566823" cy="395045"/>
           </a:xfrm>
           <a:prstGeom prst="rect">
@@ -5181,7 +6040,7 @@
         </p:nvSpPr>
         <p:spPr>
           <a:xfrm>
-            <a:off x="9245484" y="4261874"/>
+            <a:off x="9287688" y="4121195"/>
             <a:ext cx="3017506" cy="395045"/>
           </a:xfrm>
           <a:prstGeom prst="rect">
@@ -5210,7 +6069,7 @@
         </p:nvSpPr>
         <p:spPr>
           <a:xfrm>
-            <a:off x="9245484" y="4583775"/>
+            <a:off x="9301756" y="4400894"/>
             <a:ext cx="3017506" cy="395045"/>
           </a:xfrm>
           <a:prstGeom prst="rect">
@@ -5226,8 +6085,13 @@
           <a:p>
             <a:r>
               <a:rPr lang="en-US" dirty="0"/>
-              <a:t>FAN 140f</a:t>
-            </a:r>
+              <a:t>FAN </a:t>
+            </a:r>
+            <a:r>
+              <a:rPr lang="en-US" dirty="0" smtClean="0"/>
+              <a:t>143f</a:t>
+            </a:r>
+            <a:endParaRPr lang="en-US" dirty="0"/>
           </a:p>
         </p:txBody>
       </p:sp>
@@ -5239,8 +6103,8 @@
         </p:nvSpPr>
         <p:spPr>
           <a:xfrm>
-            <a:off x="9245484" y="6041936"/>
-            <a:ext cx="3017506" cy="395045"/>
+            <a:off x="9245484" y="6070072"/>
+            <a:ext cx="3017506" cy="697755"/>
           </a:xfrm>
           <a:prstGeom prst="rect">
             <a:avLst/>
@@ -5255,8 +6119,19 @@
           <a:p>
             <a:r>
               <a:rPr lang="en-US" dirty="0"/>
-              <a:t>Key child 256f</a:t>
-            </a:r>
+              <a:t>Key </a:t>
+            </a:r>
+            <a:r>
+              <a:rPr lang="en-US" dirty="0" smtClean="0"/>
+              <a:t>child 256</a:t>
+            </a:r>
+          </a:p>
+          <a:p>
+            <a:r>
+              <a:rPr lang="en-US" dirty="0" smtClean="0"/>
+              <a:t>f</a:t>
+            </a:r>
+            <a:endParaRPr lang="en-US" dirty="0"/>
           </a:p>
         </p:txBody>
       </p:sp>
@@ -5268,7 +6143,7 @@
         </p:nvSpPr>
         <p:spPr>
           <a:xfrm>
-            <a:off x="9245484" y="6385968"/>
+            <a:off x="9245484" y="6374756"/>
             <a:ext cx="3017506" cy="395045"/>
           </a:xfrm>
           <a:prstGeom prst="rect">
@@ -5284,8 +6159,13 @@
           <a:p>
             <a:r>
               <a:rPr lang="en-US" dirty="0"/>
-              <a:t>Female adult 196f</a:t>
-            </a:r>
+              <a:t>Female adult </a:t>
+            </a:r>
+            <a:r>
+              <a:rPr lang="en-US" dirty="0" smtClean="0"/>
+              <a:t>193f</a:t>
+            </a:r>
+            <a:endParaRPr lang="en-US" dirty="0"/>
           </a:p>
         </p:txBody>
       </p:sp>
@@ -5297,7 +6177,7 @@
         </p:nvSpPr>
         <p:spPr>
           <a:xfrm>
-            <a:off x="9245484" y="4902144"/>
+            <a:off x="9287688" y="4677061"/>
             <a:ext cx="3017506" cy="395045"/>
           </a:xfrm>
           <a:prstGeom prst="rect">
@@ -5313,8 +6193,13 @@
           <a:p>
             <a:r>
               <a:rPr lang="en-US" dirty="0"/>
-              <a:t>MAN 104f</a:t>
-            </a:r>
+              <a:t>MAN </a:t>
+            </a:r>
+            <a:r>
+              <a:rPr lang="en-US" dirty="0" smtClean="0"/>
+              <a:t>103f</a:t>
+            </a:r>
+            <a:endParaRPr lang="en-US" dirty="0"/>
           </a:p>
         </p:txBody>
       </p:sp>
@@ -5326,7 +6211,7 @@
         </p:nvSpPr>
         <p:spPr>
           <a:xfrm>
-            <a:off x="9245484" y="6704255"/>
+            <a:off x="9245484" y="6693047"/>
             <a:ext cx="3017506" cy="395045"/>
           </a:xfrm>
           <a:prstGeom prst="rect">
@@ -5355,7 +6240,7 @@
         </p:nvSpPr>
         <p:spPr>
           <a:xfrm>
-            <a:off x="9245484" y="5745439"/>
+            <a:off x="9245484" y="5675099"/>
             <a:ext cx="3566823" cy="395045"/>
           </a:xfrm>
           <a:prstGeom prst="rect">
@@ -5378,10 +6263,10 @@
       </p:sp>
       <p:grpSp>
         <p:nvGrpSpPr>
-          <p:cNvPr id="8" name="Group 7">
+          <p:cNvPr id="7" name="Group 6">
             <a:extLst>
               <a:ext uri="{FF2B5EF4-FFF2-40B4-BE49-F238E27FC236}">
-                <a16:creationId xmlns:a16="http://schemas.microsoft.com/office/drawing/2014/main" id="{27DB7850-3006-C14F-AF81-4F9C5CDDB698}"/>
+                <a16:creationId xmlns:a16="http://schemas.microsoft.com/office/drawing/2014/main" xmlns="" id="{C755969C-A581-084B-B059-48A8DCC1CD76}"/>
               </a:ext>
             </a:extLst>
           </p:cNvPr>
@@ -5390,262 +6275,22 @@
         </p:nvGrpSpPr>
         <p:grpSpPr>
           <a:xfrm>
-            <a:off x="11870701" y="188865"/>
-            <a:ext cx="3017506" cy="6970809"/>
-            <a:chOff x="11963061" y="188865"/>
-            <a:chExt cx="3017506" cy="6970809"/>
+            <a:off x="11932183" y="188865"/>
+            <a:ext cx="1765348" cy="997430"/>
+            <a:chOff x="12024543" y="96505"/>
+            <a:chExt cx="1765348" cy="997430"/>
           </a:xfrm>
         </p:grpSpPr>
-        <p:grpSp>
-          <p:nvGrpSpPr>
-            <p:cNvPr id="7" name="Group 6">
-              <a:extLst>
-                <a:ext uri="{FF2B5EF4-FFF2-40B4-BE49-F238E27FC236}">
-                  <a16:creationId xmlns:a16="http://schemas.microsoft.com/office/drawing/2014/main" id="{C755969C-A581-084B-B059-48A8DCC1CD76}"/>
-                </a:ext>
-              </a:extLst>
-            </p:cNvPr>
-            <p:cNvGrpSpPr/>
-            <p:nvPr/>
-          </p:nvGrpSpPr>
-          <p:grpSpPr>
-            <a:xfrm>
-              <a:off x="12024543" y="188865"/>
-              <a:ext cx="1765348" cy="997430"/>
-              <a:chOff x="12024543" y="96505"/>
-              <a:chExt cx="1765348" cy="997430"/>
-            </a:xfrm>
-          </p:grpSpPr>
-          <p:sp>
-            <p:nvSpPr>
-              <p:cNvPr id="172" name="TextBox 171"/>
-              <p:cNvSpPr txBox="1"/>
-              <p:nvPr/>
-            </p:nvSpPr>
-            <p:spPr>
-              <a:xfrm>
-                <a:off x="12024543" y="96505"/>
-                <a:ext cx="1765348" cy="395045"/>
-              </a:xfrm>
-              <a:prstGeom prst="rect">
-                <a:avLst/>
-              </a:prstGeom>
-              <a:noFill/>
-            </p:spPr>
-            <p:txBody>
-              <a:bodyPr wrap="square" rtlCol="0">
-                <a:spAutoFit/>
-              </a:bodyPr>
-              <a:lstStyle/>
-              <a:p>
-                <a:r>
-                  <a:rPr lang="en-US" dirty="0">
-                    <a:solidFill>
-                      <a:srgbClr val="FF0000"/>
-                    </a:solidFill>
-                  </a:rPr>
-                  <a:t>LENA CVC=1</a:t>
-                </a:r>
-              </a:p>
-            </p:txBody>
-          </p:sp>
-          <p:sp>
-            <p:nvSpPr>
-              <p:cNvPr id="173" name="TextBox 172"/>
-              <p:cNvSpPr txBox="1"/>
-              <p:nvPr/>
-            </p:nvSpPr>
-            <p:spPr>
-              <a:xfrm>
-                <a:off x="12024543" y="397188"/>
-                <a:ext cx="1451310" cy="395045"/>
-              </a:xfrm>
-              <a:prstGeom prst="rect">
-                <a:avLst/>
-              </a:prstGeom>
-              <a:noFill/>
-            </p:spPr>
-            <p:txBody>
-              <a:bodyPr wrap="square" rtlCol="0">
-                <a:spAutoFit/>
-              </a:bodyPr>
-              <a:lstStyle/>
-              <a:p>
-                <a:r>
-                  <a:rPr lang="en-US" dirty="0">
-                    <a:solidFill>
-                      <a:srgbClr val="FF0000"/>
-                    </a:solidFill>
-                  </a:rPr>
-                  <a:t>LENA CTC=1</a:t>
-                </a:r>
-              </a:p>
-            </p:txBody>
-          </p:sp>
-          <p:sp>
-            <p:nvSpPr>
-              <p:cNvPr id="179" name="TextBox 178"/>
-              <p:cNvSpPr txBox="1"/>
-              <p:nvPr/>
-            </p:nvSpPr>
-            <p:spPr>
-              <a:xfrm>
-                <a:off x="12024543" y="698890"/>
-                <a:ext cx="1765346" cy="395045"/>
-              </a:xfrm>
-              <a:prstGeom prst="rect">
-                <a:avLst/>
-              </a:prstGeom>
-              <a:noFill/>
-            </p:spPr>
-            <p:txBody>
-              <a:bodyPr wrap="square" rtlCol="0">
-                <a:spAutoFit/>
-              </a:bodyPr>
-              <a:lstStyle/>
-              <a:p>
-                <a:r>
-                  <a:rPr lang="en-US" dirty="0">
-                    <a:solidFill>
-                      <a:srgbClr val="FF0000"/>
-                    </a:solidFill>
-                  </a:rPr>
-                  <a:t>LENA AWC=3.6</a:t>
-                </a:r>
-              </a:p>
-            </p:txBody>
-          </p:sp>
-        </p:grpSp>
-        <p:grpSp>
-          <p:nvGrpSpPr>
-            <p:cNvPr id="6" name="Group 5">
-              <a:extLst>
-                <a:ext uri="{FF2B5EF4-FFF2-40B4-BE49-F238E27FC236}">
-                  <a16:creationId xmlns:a16="http://schemas.microsoft.com/office/drawing/2014/main" id="{DB538943-FEB6-6741-89E9-34CFF838A36A}"/>
-                </a:ext>
-              </a:extLst>
-            </p:cNvPr>
-            <p:cNvGrpSpPr/>
-            <p:nvPr/>
-          </p:nvGrpSpPr>
-          <p:grpSpPr>
-            <a:xfrm>
-              <a:off x="12024543" y="1325391"/>
-              <a:ext cx="2051675" cy="997430"/>
-              <a:chOff x="12024543" y="1371571"/>
-              <a:chExt cx="2051675" cy="997430"/>
-            </a:xfrm>
-          </p:grpSpPr>
-          <p:sp>
-            <p:nvSpPr>
-              <p:cNvPr id="180" name="TextBox 179"/>
-              <p:cNvSpPr txBox="1"/>
-              <p:nvPr/>
-            </p:nvSpPr>
-            <p:spPr>
-              <a:xfrm>
-                <a:off x="12024543" y="1371571"/>
-                <a:ext cx="1885421" cy="395045"/>
-              </a:xfrm>
-              <a:prstGeom prst="rect">
-                <a:avLst/>
-              </a:prstGeom>
-              <a:noFill/>
-            </p:spPr>
-            <p:txBody>
-              <a:bodyPr wrap="square" rtlCol="0">
-                <a:spAutoFit/>
-              </a:bodyPr>
-              <a:lstStyle/>
-              <a:p>
-                <a:r>
-                  <a:rPr lang="en-US" dirty="0">
-                    <a:solidFill>
-                      <a:srgbClr val="FF0000"/>
-                    </a:solidFill>
-                  </a:rPr>
-                  <a:t>Human CVC=2</a:t>
-                </a:r>
-              </a:p>
-            </p:txBody>
-          </p:sp>
-          <p:sp>
-            <p:nvSpPr>
-              <p:cNvPr id="181" name="TextBox 180"/>
-              <p:cNvSpPr txBox="1"/>
-              <p:nvPr/>
-            </p:nvSpPr>
-            <p:spPr>
-              <a:xfrm>
-                <a:off x="12024543" y="1672254"/>
-                <a:ext cx="1885421" cy="395045"/>
-              </a:xfrm>
-              <a:prstGeom prst="rect">
-                <a:avLst/>
-              </a:prstGeom>
-              <a:noFill/>
-            </p:spPr>
-            <p:txBody>
-              <a:bodyPr wrap="square" rtlCol="0">
-                <a:spAutoFit/>
-              </a:bodyPr>
-              <a:lstStyle/>
-              <a:p>
-                <a:r>
-                  <a:rPr lang="en-US" dirty="0">
-                    <a:solidFill>
-                      <a:srgbClr val="FF0000"/>
-                    </a:solidFill>
-                  </a:rPr>
-                  <a:t>Human CTC=2</a:t>
-                </a:r>
-              </a:p>
-            </p:txBody>
-          </p:sp>
-          <p:sp>
-            <p:nvSpPr>
-              <p:cNvPr id="182" name="TextBox 181"/>
-              <p:cNvSpPr txBox="1"/>
-              <p:nvPr/>
-            </p:nvSpPr>
-            <p:spPr>
-              <a:xfrm>
-                <a:off x="12024543" y="1973956"/>
-                <a:ext cx="2051675" cy="395045"/>
-              </a:xfrm>
-              <a:prstGeom prst="rect">
-                <a:avLst/>
-              </a:prstGeom>
-              <a:noFill/>
-            </p:spPr>
-            <p:txBody>
-              <a:bodyPr wrap="square" rtlCol="0">
-                <a:spAutoFit/>
-              </a:bodyPr>
-              <a:lstStyle/>
-              <a:p>
-                <a:r>
-                  <a:rPr lang="en-US" dirty="0">
-                    <a:solidFill>
-                      <a:srgbClr val="FF0000"/>
-                    </a:solidFill>
-                  </a:rPr>
-                  <a:t>Human AWC=6</a:t>
-                </a:r>
-              </a:p>
-            </p:txBody>
-          </p:sp>
-        </p:grpSp>
         <p:sp>
           <p:nvSpPr>
-            <p:cNvPr id="206" name="TextBox 205"/>
+            <p:cNvPr id="172" name="TextBox 171"/>
             <p:cNvSpPr txBox="1"/>
             <p:nvPr/>
           </p:nvSpPr>
           <p:spPr>
             <a:xfrm>
-              <a:off x="11963061" y="2631879"/>
-              <a:ext cx="2227758" cy="395045"/>
+              <a:off x="12024543" y="96505"/>
+              <a:ext cx="1765348" cy="395045"/>
             </a:xfrm>
             <a:prstGeom prst="rect">
               <a:avLst/>
@@ -5664,21 +6309,21 @@
                     <a:srgbClr val="FF0000"/>
                   </a:solidFill>
                 </a:rPr>
-                <a:t>miss rate = 113/443</a:t>
+                <a:t>LENA CVC=1</a:t>
               </a:r>
             </a:p>
           </p:txBody>
         </p:sp>
         <p:sp>
           <p:nvSpPr>
-            <p:cNvPr id="207" name="TextBox 206"/>
+            <p:cNvPr id="173" name="TextBox 172"/>
             <p:cNvSpPr txBox="1"/>
             <p:nvPr/>
           </p:nvSpPr>
           <p:spPr>
             <a:xfrm>
-              <a:off x="11963061" y="3017284"/>
-              <a:ext cx="2810655" cy="395045"/>
+              <a:off x="12024543" y="397188"/>
+              <a:ext cx="1451310" cy="395045"/>
             </a:xfrm>
             <a:prstGeom prst="rect">
               <a:avLst/>
@@ -5697,21 +6342,21 @@
                     <a:srgbClr val="FF0000"/>
                   </a:solidFill>
                 </a:rPr>
-                <a:t>false alarm rate = 45/443</a:t>
+                <a:t>LENA CTC=1</a:t>
               </a:r>
             </a:p>
           </p:txBody>
         </p:sp>
         <p:sp>
           <p:nvSpPr>
-            <p:cNvPr id="208" name="TextBox 207"/>
+            <p:cNvPr id="179" name="TextBox 178"/>
             <p:cNvSpPr txBox="1"/>
             <p:nvPr/>
           </p:nvSpPr>
           <p:spPr>
             <a:xfrm>
-              <a:off x="11963061" y="3463942"/>
-              <a:ext cx="2634445" cy="395045"/>
+              <a:off x="12024543" y="698890"/>
+              <a:ext cx="1765346" cy="395045"/>
             </a:xfrm>
             <a:prstGeom prst="rect">
               <a:avLst/>
@@ -5730,21 +6375,42 @@
                     <a:srgbClr val="FF0000"/>
                   </a:solidFill>
                 </a:rPr>
-                <a:t>confusion rate = 55/443</a:t>
+                <a:t>LENA AWC=3.6</a:t>
               </a:r>
             </a:p>
           </p:txBody>
         </p:sp>
+      </p:grpSp>
+      <p:grpSp>
+        <p:nvGrpSpPr>
+          <p:cNvPr id="6" name="Group 5">
+            <a:extLst>
+              <a:ext uri="{FF2B5EF4-FFF2-40B4-BE49-F238E27FC236}">
+                <a16:creationId xmlns:a16="http://schemas.microsoft.com/office/drawing/2014/main" xmlns="" id="{DB538943-FEB6-6741-89E9-34CFF838A36A}"/>
+              </a:ext>
+            </a:extLst>
+          </p:cNvPr>
+          <p:cNvGrpSpPr/>
+          <p:nvPr/>
+        </p:nvGrpSpPr>
+        <p:grpSpPr>
+          <a:xfrm>
+            <a:off x="11932183" y="1325391"/>
+            <a:ext cx="2051675" cy="997430"/>
+            <a:chOff x="12024543" y="1371571"/>
+            <a:chExt cx="2051675" cy="997430"/>
+          </a:xfrm>
+        </p:grpSpPr>
         <p:sp>
           <p:nvSpPr>
-            <p:cNvPr id="218" name="TextBox 217"/>
+            <p:cNvPr id="180" name="TextBox 179"/>
             <p:cNvSpPr txBox="1"/>
             <p:nvPr/>
           </p:nvSpPr>
           <p:spPr>
             <a:xfrm>
-              <a:off x="11963061" y="4175125"/>
-              <a:ext cx="3017506" cy="395045"/>
+              <a:off x="12024543" y="1371571"/>
+              <a:ext cx="1885421" cy="395045"/>
             </a:xfrm>
             <a:prstGeom prst="rect">
               <a:avLst/>
@@ -5763,21 +6429,21 @@
                     <a:srgbClr val="FF0000"/>
                   </a:solidFill>
                 </a:rPr>
-                <a:t>CHN Precision = 107/140</a:t>
+                <a:t>Human CVC=2</a:t>
               </a:r>
             </a:p>
           </p:txBody>
         </p:sp>
         <p:sp>
           <p:nvSpPr>
-            <p:cNvPr id="219" name="TextBox 218"/>
+            <p:cNvPr id="181" name="TextBox 180"/>
             <p:cNvSpPr txBox="1"/>
             <p:nvPr/>
           </p:nvSpPr>
           <p:spPr>
             <a:xfrm>
-              <a:off x="11963061" y="4541539"/>
-              <a:ext cx="3017506" cy="395045"/>
+              <a:off x="12024543" y="1672254"/>
+              <a:ext cx="1885421" cy="395045"/>
             </a:xfrm>
             <a:prstGeom prst="rect">
               <a:avLst/>
@@ -5796,21 +6462,21 @@
                     <a:srgbClr val="FF0000"/>
                   </a:solidFill>
                 </a:rPr>
-                <a:t>FAN Precision = 143/140</a:t>
+                <a:t>Human CTC=2</a:t>
               </a:r>
             </a:p>
           </p:txBody>
         </p:sp>
         <p:sp>
           <p:nvSpPr>
-            <p:cNvPr id="221" name="TextBox 220"/>
+            <p:cNvPr id="182" name="TextBox 181"/>
             <p:cNvSpPr txBox="1"/>
             <p:nvPr/>
           </p:nvSpPr>
           <p:spPr>
             <a:xfrm>
-              <a:off x="11963061" y="4882601"/>
-              <a:ext cx="3017506" cy="395045"/>
+              <a:off x="12024543" y="1973956"/>
+              <a:ext cx="2051675" cy="395045"/>
             </a:xfrm>
             <a:prstGeom prst="rect">
               <a:avLst/>
@@ -5829,106 +6495,7 @@
                     <a:srgbClr val="FF0000"/>
                   </a:solidFill>
                 </a:rPr>
-                <a:t>MAN Precision = 0/104</a:t>
-              </a:r>
-            </a:p>
-          </p:txBody>
-        </p:sp>
-        <p:sp>
-          <p:nvSpPr>
-            <p:cNvPr id="224" name="TextBox 223"/>
-            <p:cNvSpPr txBox="1"/>
-            <p:nvPr/>
-          </p:nvSpPr>
-          <p:spPr>
-            <a:xfrm>
-              <a:off x="11963061" y="6057153"/>
-              <a:ext cx="3017506" cy="395045"/>
-            </a:xfrm>
-            <a:prstGeom prst="rect">
-              <a:avLst/>
-            </a:prstGeom>
-            <a:noFill/>
-          </p:spPr>
-          <p:txBody>
-            <a:bodyPr wrap="square" rtlCol="0">
-              <a:spAutoFit/>
-            </a:bodyPr>
-            <a:lstStyle/>
-            <a:p>
-              <a:r>
-                <a:rPr lang="en-US" dirty="0">
-                  <a:solidFill>
-                    <a:srgbClr val="FF0000"/>
-                  </a:solidFill>
-                </a:rPr>
-                <a:t>CHN Recall = 107/256</a:t>
-              </a:r>
-            </a:p>
-          </p:txBody>
-        </p:sp>
-        <p:sp>
-          <p:nvSpPr>
-            <p:cNvPr id="225" name="TextBox 224"/>
-            <p:cNvSpPr txBox="1"/>
-            <p:nvPr/>
-          </p:nvSpPr>
-          <p:spPr>
-            <a:xfrm>
-              <a:off x="11963061" y="6423567"/>
-              <a:ext cx="3017506" cy="395045"/>
-            </a:xfrm>
-            <a:prstGeom prst="rect">
-              <a:avLst/>
-            </a:prstGeom>
-            <a:noFill/>
-          </p:spPr>
-          <p:txBody>
-            <a:bodyPr wrap="square" rtlCol="0">
-              <a:spAutoFit/>
-            </a:bodyPr>
-            <a:lstStyle/>
-            <a:p>
-              <a:r>
-                <a:rPr lang="en-US" dirty="0">
-                  <a:solidFill>
-                    <a:srgbClr val="FF0000"/>
-                  </a:solidFill>
-                </a:rPr>
-                <a:t>FAN Recall = 143/196</a:t>
-              </a:r>
-            </a:p>
-          </p:txBody>
-        </p:sp>
-        <p:sp>
-          <p:nvSpPr>
-            <p:cNvPr id="226" name="TextBox 225"/>
-            <p:cNvSpPr txBox="1"/>
-            <p:nvPr/>
-          </p:nvSpPr>
-          <p:spPr>
-            <a:xfrm>
-              <a:off x="11963061" y="6764629"/>
-              <a:ext cx="3017506" cy="395045"/>
-            </a:xfrm>
-            <a:prstGeom prst="rect">
-              <a:avLst/>
-            </a:prstGeom>
-            <a:noFill/>
-          </p:spPr>
-          <p:txBody>
-            <a:bodyPr wrap="square" rtlCol="0">
-              <a:spAutoFit/>
-            </a:bodyPr>
-            <a:lstStyle/>
-            <a:p>
-              <a:r>
-                <a:rPr lang="en-US" dirty="0">
-                  <a:solidFill>
-                    <a:srgbClr val="FF0000"/>
-                  </a:solidFill>
-                </a:rPr>
-                <a:t>MAN Recall = NA</a:t>
+                <a:t>Human AWC=6</a:t>
               </a:r>
             </a:p>
           </p:txBody>
@@ -5936,14 +6503,437 @@
       </p:grpSp>
       <p:sp>
         <p:nvSpPr>
+          <p:cNvPr id="206" name="TextBox 205"/>
+          <p:cNvSpPr txBox="1"/>
+          <p:nvPr/>
+        </p:nvSpPr>
+        <p:spPr>
+          <a:xfrm>
+            <a:off x="11870701" y="2631879"/>
+            <a:ext cx="2227758" cy="395045"/>
+          </a:xfrm>
+          <a:prstGeom prst="rect">
+            <a:avLst/>
+          </a:prstGeom>
+          <a:noFill/>
+        </p:spPr>
+        <p:txBody>
+          <a:bodyPr wrap="square" rtlCol="0">
+            <a:spAutoFit/>
+          </a:bodyPr>
+          <a:lstStyle/>
+          <a:p>
+            <a:r>
+              <a:rPr lang="en-US" dirty="0">
+                <a:solidFill>
+                  <a:srgbClr val="FF0000"/>
+                </a:solidFill>
+              </a:rPr>
+              <a:t>M</a:t>
+            </a:r>
+            <a:r>
+              <a:rPr lang="en-US" dirty="0" smtClean="0">
+                <a:solidFill>
+                  <a:srgbClr val="FF0000"/>
+                </a:solidFill>
+              </a:rPr>
+              <a:t>iss </a:t>
+            </a:r>
+            <a:r>
+              <a:rPr lang="en-US" dirty="0">
+                <a:solidFill>
+                  <a:srgbClr val="FF0000"/>
+                </a:solidFill>
+              </a:rPr>
+              <a:t>rate = 113/443</a:t>
+            </a:r>
+          </a:p>
+        </p:txBody>
+      </p:sp>
+      <p:sp>
+        <p:nvSpPr>
+          <p:cNvPr id="207" name="TextBox 206"/>
+          <p:cNvSpPr txBox="1"/>
+          <p:nvPr/>
+        </p:nvSpPr>
+        <p:spPr>
+          <a:xfrm>
+            <a:off x="11870701" y="3003216"/>
+            <a:ext cx="2810655" cy="395045"/>
+          </a:xfrm>
+          <a:prstGeom prst="rect">
+            <a:avLst/>
+          </a:prstGeom>
+          <a:noFill/>
+        </p:spPr>
+        <p:txBody>
+          <a:bodyPr wrap="square" rtlCol="0">
+            <a:spAutoFit/>
+          </a:bodyPr>
+          <a:lstStyle/>
+          <a:p>
+            <a:r>
+              <a:rPr lang="en-US" dirty="0">
+                <a:solidFill>
+                  <a:srgbClr val="FF0000"/>
+                </a:solidFill>
+              </a:rPr>
+              <a:t>F</a:t>
+            </a:r>
+            <a:r>
+              <a:rPr lang="en-US" dirty="0" smtClean="0">
+                <a:solidFill>
+                  <a:srgbClr val="FF0000"/>
+                </a:solidFill>
+              </a:rPr>
+              <a:t>alse </a:t>
+            </a:r>
+            <a:r>
+              <a:rPr lang="en-US" dirty="0">
+                <a:solidFill>
+                  <a:srgbClr val="FF0000"/>
+                </a:solidFill>
+              </a:rPr>
+              <a:t>alarm rate = 45/443</a:t>
+            </a:r>
+          </a:p>
+        </p:txBody>
+      </p:sp>
+      <p:sp>
+        <p:nvSpPr>
+          <p:cNvPr id="208" name="TextBox 207"/>
+          <p:cNvSpPr txBox="1"/>
+          <p:nvPr/>
+        </p:nvSpPr>
+        <p:spPr>
+          <a:xfrm>
+            <a:off x="11870701" y="3334470"/>
+            <a:ext cx="2759699" cy="395045"/>
+          </a:xfrm>
+          <a:prstGeom prst="rect">
+            <a:avLst/>
+          </a:prstGeom>
+          <a:noFill/>
+        </p:spPr>
+        <p:txBody>
+          <a:bodyPr wrap="square" rtlCol="0">
+            <a:spAutoFit/>
+          </a:bodyPr>
+          <a:lstStyle/>
+          <a:p>
+            <a:r>
+              <a:rPr lang="en-US" dirty="0">
+                <a:solidFill>
+                  <a:srgbClr val="FF0000"/>
+                </a:solidFill>
+              </a:rPr>
+              <a:t>C</a:t>
+            </a:r>
+            <a:r>
+              <a:rPr lang="en-US" dirty="0" smtClean="0">
+                <a:solidFill>
+                  <a:srgbClr val="FF0000"/>
+                </a:solidFill>
+              </a:rPr>
+              <a:t>onfusion </a:t>
+            </a:r>
+            <a:r>
+              <a:rPr lang="en-US" dirty="0">
+                <a:solidFill>
+                  <a:srgbClr val="FF0000"/>
+                </a:solidFill>
+              </a:rPr>
+              <a:t>rate = 55/443</a:t>
+            </a:r>
+          </a:p>
+        </p:txBody>
+      </p:sp>
+      <p:sp>
+        <p:nvSpPr>
+          <p:cNvPr id="218" name="TextBox 217"/>
+          <p:cNvSpPr txBox="1"/>
+          <p:nvPr/>
+        </p:nvSpPr>
+        <p:spPr>
+          <a:xfrm>
+            <a:off x="11870701" y="4090717"/>
+            <a:ext cx="3017506" cy="395045"/>
+          </a:xfrm>
+          <a:prstGeom prst="rect">
+            <a:avLst/>
+          </a:prstGeom>
+          <a:noFill/>
+        </p:spPr>
+        <p:txBody>
+          <a:bodyPr wrap="square" rtlCol="0">
+            <a:spAutoFit/>
+          </a:bodyPr>
+          <a:lstStyle/>
+          <a:p>
+            <a:r>
+              <a:rPr lang="en-US" dirty="0">
+                <a:solidFill>
+                  <a:srgbClr val="FF0000"/>
+                </a:solidFill>
+              </a:rPr>
+              <a:t>CHN Precision = </a:t>
+            </a:r>
+            <a:r>
+              <a:rPr lang="en-US" dirty="0" smtClean="0">
+                <a:solidFill>
+                  <a:srgbClr val="FF0000"/>
+                </a:solidFill>
+              </a:rPr>
+              <a:t>109/140</a:t>
+            </a:r>
+            <a:endParaRPr lang="en-US" dirty="0">
+              <a:solidFill>
+                <a:srgbClr val="FF0000"/>
+              </a:solidFill>
+            </a:endParaRPr>
+          </a:p>
+        </p:txBody>
+      </p:sp>
+      <p:sp>
+        <p:nvSpPr>
+          <p:cNvPr id="219" name="TextBox 218"/>
+          <p:cNvSpPr txBox="1"/>
+          <p:nvPr/>
+        </p:nvSpPr>
+        <p:spPr>
+          <a:xfrm>
+            <a:off x="11884769" y="4386791"/>
+            <a:ext cx="3017506" cy="395045"/>
+          </a:xfrm>
+          <a:prstGeom prst="rect">
+            <a:avLst/>
+          </a:prstGeom>
+          <a:noFill/>
+        </p:spPr>
+        <p:txBody>
+          <a:bodyPr wrap="square" rtlCol="0">
+            <a:spAutoFit/>
+          </a:bodyPr>
+          <a:lstStyle/>
+          <a:p>
+            <a:r>
+              <a:rPr lang="en-US" dirty="0">
+                <a:solidFill>
+                  <a:srgbClr val="FF0000"/>
+                </a:solidFill>
+              </a:rPr>
+              <a:t>FAN Precision = </a:t>
+            </a:r>
+            <a:r>
+              <a:rPr lang="en-US" dirty="0" smtClean="0">
+                <a:solidFill>
+                  <a:srgbClr val="FF0000"/>
+                </a:solidFill>
+              </a:rPr>
+              <a:t>143/143</a:t>
+            </a:r>
+            <a:endParaRPr lang="en-US" dirty="0">
+              <a:solidFill>
+                <a:srgbClr val="FF0000"/>
+              </a:solidFill>
+            </a:endParaRPr>
+          </a:p>
+        </p:txBody>
+      </p:sp>
+      <p:sp>
+        <p:nvSpPr>
+          <p:cNvPr id="221" name="TextBox 220"/>
+          <p:cNvSpPr txBox="1"/>
+          <p:nvPr/>
+        </p:nvSpPr>
+        <p:spPr>
+          <a:xfrm>
+            <a:off x="11870701" y="4657518"/>
+            <a:ext cx="3017506" cy="395045"/>
+          </a:xfrm>
+          <a:prstGeom prst="rect">
+            <a:avLst/>
+          </a:prstGeom>
+          <a:noFill/>
+        </p:spPr>
+        <p:txBody>
+          <a:bodyPr wrap="square" rtlCol="0">
+            <a:spAutoFit/>
+          </a:bodyPr>
+          <a:lstStyle/>
+          <a:p>
+            <a:r>
+              <a:rPr lang="en-US" dirty="0">
+                <a:solidFill>
+                  <a:srgbClr val="FF0000"/>
+                </a:solidFill>
+              </a:rPr>
+              <a:t>MAN Precision = </a:t>
+            </a:r>
+            <a:r>
+              <a:rPr lang="en-US" dirty="0" smtClean="0">
+                <a:solidFill>
+                  <a:srgbClr val="FF0000"/>
+                </a:solidFill>
+              </a:rPr>
+              <a:t>0/103</a:t>
+            </a:r>
+            <a:endParaRPr lang="en-US" dirty="0">
+              <a:solidFill>
+                <a:srgbClr val="FF0000"/>
+              </a:solidFill>
+            </a:endParaRPr>
+          </a:p>
+        </p:txBody>
+      </p:sp>
+      <p:sp>
+        <p:nvSpPr>
+          <p:cNvPr id="224" name="TextBox 223"/>
+          <p:cNvSpPr txBox="1"/>
+          <p:nvPr/>
+        </p:nvSpPr>
+        <p:spPr>
+          <a:xfrm>
+            <a:off x="11870701" y="6085288"/>
+            <a:ext cx="3017506" cy="395045"/>
+          </a:xfrm>
+          <a:prstGeom prst="rect">
+            <a:avLst/>
+          </a:prstGeom>
+          <a:noFill/>
+        </p:spPr>
+        <p:txBody>
+          <a:bodyPr wrap="square" rtlCol="0">
+            <a:spAutoFit/>
+          </a:bodyPr>
+          <a:lstStyle/>
+          <a:p>
+            <a:r>
+              <a:rPr lang="en-US" dirty="0">
+                <a:solidFill>
+                  <a:srgbClr val="FF0000"/>
+                </a:solidFill>
+              </a:rPr>
+              <a:t>CHN Recall = </a:t>
+            </a:r>
+            <a:r>
+              <a:rPr lang="en-US" dirty="0" smtClean="0">
+                <a:solidFill>
+                  <a:srgbClr val="FF0000"/>
+                </a:solidFill>
+              </a:rPr>
+              <a:t>109/256</a:t>
+            </a:r>
+            <a:endParaRPr lang="en-US" dirty="0">
+              <a:solidFill>
+                <a:srgbClr val="FF0000"/>
+              </a:solidFill>
+            </a:endParaRPr>
+          </a:p>
+        </p:txBody>
+      </p:sp>
+      <p:sp>
+        <p:nvSpPr>
+          <p:cNvPr id="225" name="TextBox 224"/>
+          <p:cNvSpPr txBox="1"/>
+          <p:nvPr/>
+        </p:nvSpPr>
+        <p:spPr>
+          <a:xfrm>
+            <a:off x="11870701" y="6370158"/>
+            <a:ext cx="3017506" cy="395045"/>
+          </a:xfrm>
+          <a:prstGeom prst="rect">
+            <a:avLst/>
+          </a:prstGeom>
+          <a:noFill/>
+        </p:spPr>
+        <p:txBody>
+          <a:bodyPr wrap="square" rtlCol="0">
+            <a:spAutoFit/>
+          </a:bodyPr>
+          <a:lstStyle/>
+          <a:p>
+            <a:r>
+              <a:rPr lang="en-US" dirty="0">
+                <a:solidFill>
+                  <a:srgbClr val="FF0000"/>
+                </a:solidFill>
+              </a:rPr>
+              <a:t>FAN Recall = </a:t>
+            </a:r>
+            <a:r>
+              <a:rPr lang="en-US" dirty="0" smtClean="0">
+                <a:solidFill>
+                  <a:srgbClr val="FF0000"/>
+                </a:solidFill>
+              </a:rPr>
+              <a:t>143/193</a:t>
+            </a:r>
+            <a:endParaRPr lang="en-US" dirty="0">
+              <a:solidFill>
+                <a:srgbClr val="FF0000"/>
+              </a:solidFill>
+            </a:endParaRPr>
+          </a:p>
+        </p:txBody>
+      </p:sp>
+      <p:sp>
+        <p:nvSpPr>
+          <p:cNvPr id="226" name="TextBox 225"/>
+          <p:cNvSpPr txBox="1"/>
+          <p:nvPr/>
+        </p:nvSpPr>
+        <p:spPr>
+          <a:xfrm>
+            <a:off x="11870701" y="6640882"/>
+            <a:ext cx="3017506" cy="395045"/>
+          </a:xfrm>
+          <a:prstGeom prst="rect">
+            <a:avLst/>
+          </a:prstGeom>
+          <a:noFill/>
+        </p:spPr>
+        <p:txBody>
+          <a:bodyPr wrap="square" rtlCol="0">
+            <a:spAutoFit/>
+          </a:bodyPr>
+          <a:lstStyle/>
+          <a:p>
+            <a:r>
+              <a:rPr lang="en-US" dirty="0">
+                <a:solidFill>
+                  <a:srgbClr val="FF0000"/>
+                </a:solidFill>
+              </a:rPr>
+              <a:t>MAN Recall = </a:t>
+            </a:r>
+            <a:r>
+              <a:rPr lang="en-US" dirty="0" smtClean="0">
+                <a:solidFill>
+                  <a:srgbClr val="FF0000"/>
+                </a:solidFill>
+              </a:rPr>
+              <a:t>0/0 = NA</a:t>
+            </a:r>
+            <a:endParaRPr lang="en-US" dirty="0">
+              <a:solidFill>
+                <a:srgbClr val="FF0000"/>
+              </a:solidFill>
+            </a:endParaRPr>
+          </a:p>
+        </p:txBody>
+      </p:sp>
+      <p:sp>
+        <p:nvSpPr>
           <p:cNvPr id="227" name="Rectangle 226"/>
           <p:cNvSpPr/>
           <p:nvPr/>
         </p:nvSpPr>
         <p:spPr>
           <a:xfrm>
-            <a:off x="4770932" y="4507674"/>
-            <a:ext cx="1238446" cy="182880"/>
+            <a:off x="4785000" y="4209388"/>
+            <a:ext cx="1238446" cy="201168"/>
           </a:xfrm>
           <a:prstGeom prst="rect">
             <a:avLst/>
@@ -5985,8 +6975,8 @@
         </p:nvSpPr>
         <p:spPr>
           <a:xfrm>
-            <a:off x="6066199" y="4740047"/>
-            <a:ext cx="1238446" cy="182880"/>
+            <a:off x="6023446" y="4486827"/>
+            <a:ext cx="1310068" cy="201168"/>
           </a:xfrm>
           <a:prstGeom prst="rect">
             <a:avLst/>
@@ -6028,8 +7018,8 @@
         </p:nvSpPr>
         <p:spPr>
           <a:xfrm>
-            <a:off x="7546832" y="4998389"/>
-            <a:ext cx="708500" cy="182880"/>
+            <a:off x="7323442" y="4787370"/>
+            <a:ext cx="945958" cy="203827"/>
           </a:xfrm>
           <a:prstGeom prst="rect">
             <a:avLst/>
@@ -6071,8 +7061,8 @@
         </p:nvSpPr>
         <p:spPr>
           <a:xfrm>
-            <a:off x="4592202" y="6135350"/>
-            <a:ext cx="1166954" cy="250617"/>
+            <a:off x="4592202" y="6195908"/>
+            <a:ext cx="1166954" cy="201168"/>
           </a:xfrm>
           <a:prstGeom prst="rect">
             <a:avLst/>
@@ -6114,8 +7104,8 @@
         </p:nvSpPr>
         <p:spPr>
           <a:xfrm flipV="1">
-            <a:off x="5781149" y="6452196"/>
-            <a:ext cx="1765683" cy="194263"/>
+            <a:off x="5781149" y="6483187"/>
+            <a:ext cx="1765683" cy="201168"/>
           </a:xfrm>
           <a:prstGeom prst="rect">
             <a:avLst/>
@@ -6212,7 +7202,7 @@
           <p:cNvPr id="4" name="Rectangle 3">
             <a:extLst>
               <a:ext uri="{FF2B5EF4-FFF2-40B4-BE49-F238E27FC236}">
-                <a16:creationId xmlns:a16="http://schemas.microsoft.com/office/drawing/2014/main" id="{FDA1E27B-1934-D540-8805-5F450CFBAAFD}"/>
+                <a16:creationId xmlns:a16="http://schemas.microsoft.com/office/drawing/2014/main" xmlns="" id="{FDA1E27B-1934-D540-8805-5F450CFBAAFD}"/>
               </a:ext>
             </a:extLst>
           </p:cNvPr>
@@ -6264,7 +7254,7 @@
           <p:cNvPr id="5" name="TextBox 4">
             <a:extLst>
               <a:ext uri="{FF2B5EF4-FFF2-40B4-BE49-F238E27FC236}">
-                <a16:creationId xmlns:a16="http://schemas.microsoft.com/office/drawing/2014/main" id="{1A57059C-1324-F342-B6E1-BE56A58A7F9E}"/>
+                <a16:creationId xmlns:a16="http://schemas.microsoft.com/office/drawing/2014/main" xmlns="" id="{1A57059C-1324-F342-B6E1-BE56A58A7F9E}"/>
               </a:ext>
             </a:extLst>
           </p:cNvPr>
@@ -6299,7 +7289,7 @@
           <p:cNvPr id="91" name="Rectangle 90">
             <a:extLst>
               <a:ext uri="{FF2B5EF4-FFF2-40B4-BE49-F238E27FC236}">
-                <a16:creationId xmlns:a16="http://schemas.microsoft.com/office/drawing/2014/main" id="{8250172E-F6BC-7E49-A5CE-231EDA32DD19}"/>
+                <a16:creationId xmlns:a16="http://schemas.microsoft.com/office/drawing/2014/main" xmlns="" id="{8250172E-F6BC-7E49-A5CE-231EDA32DD19}"/>
               </a:ext>
             </a:extLst>
           </p:cNvPr>
@@ -6351,7 +7341,7 @@
           <p:cNvPr id="92" name="TextBox 91">
             <a:extLst>
               <a:ext uri="{FF2B5EF4-FFF2-40B4-BE49-F238E27FC236}">
-                <a16:creationId xmlns:a16="http://schemas.microsoft.com/office/drawing/2014/main" id="{A09C082F-7FA5-FE43-BA34-90FEAADFCB3D}"/>
+                <a16:creationId xmlns:a16="http://schemas.microsoft.com/office/drawing/2014/main" xmlns="" id="{A09C082F-7FA5-FE43-BA34-90FEAADFCB3D}"/>
               </a:ext>
             </a:extLst>
           </p:cNvPr>
@@ -6390,7 +7380,7 @@
           <p:cNvPr id="96" name="Rectangle 95">
             <a:extLst>
               <a:ext uri="{FF2B5EF4-FFF2-40B4-BE49-F238E27FC236}">
-                <a16:creationId xmlns:a16="http://schemas.microsoft.com/office/drawing/2014/main" id="{65DF255C-0989-F64B-A29E-B7B8C5A89D22}"/>
+                <a16:creationId xmlns:a16="http://schemas.microsoft.com/office/drawing/2014/main" xmlns="" id="{65DF255C-0989-F64B-A29E-B7B8C5A89D22}"/>
               </a:ext>
             </a:extLst>
           </p:cNvPr>
@@ -6442,7 +7432,7 @@
           <p:cNvPr id="97" name="TextBox 96">
             <a:extLst>
               <a:ext uri="{FF2B5EF4-FFF2-40B4-BE49-F238E27FC236}">
-                <a16:creationId xmlns:a16="http://schemas.microsoft.com/office/drawing/2014/main" id="{9BD302B3-4FE7-D142-9A6A-BCEFBABE724A}"/>
+                <a16:creationId xmlns:a16="http://schemas.microsoft.com/office/drawing/2014/main" xmlns="" id="{9BD302B3-4FE7-D142-9A6A-BCEFBABE724A}"/>
               </a:ext>
             </a:extLst>
           </p:cNvPr>
@@ -6481,7 +7471,7 @@
           <p:cNvPr id="99" name="Rectangle 98">
             <a:extLst>
               <a:ext uri="{FF2B5EF4-FFF2-40B4-BE49-F238E27FC236}">
-                <a16:creationId xmlns:a16="http://schemas.microsoft.com/office/drawing/2014/main" id="{CA376A48-3D3D-F747-A232-7416F9B0C77D}"/>
+                <a16:creationId xmlns:a16="http://schemas.microsoft.com/office/drawing/2014/main" xmlns="" id="{CA376A48-3D3D-F747-A232-7416F9B0C77D}"/>
               </a:ext>
             </a:extLst>
           </p:cNvPr>
@@ -6533,7 +7523,7 @@
           <p:cNvPr id="100" name="TextBox 99">
             <a:extLst>
               <a:ext uri="{FF2B5EF4-FFF2-40B4-BE49-F238E27FC236}">
-                <a16:creationId xmlns:a16="http://schemas.microsoft.com/office/drawing/2014/main" id="{361EA2B2-9F40-5C45-A572-D9B11B1DA87A}"/>
+                <a16:creationId xmlns:a16="http://schemas.microsoft.com/office/drawing/2014/main" xmlns="" id="{361EA2B2-9F40-5C45-A572-D9B11B1DA87A}"/>
               </a:ext>
             </a:extLst>
           </p:cNvPr>
@@ -6560,6 +7550,132 @@
               <a:rPr lang="en-US" sz="1800" b="1" dirty="0"/>
               <a:t>Segment Counts</a:t>
             </a:r>
+          </a:p>
+        </p:txBody>
+      </p:sp>
+      <p:sp>
+        <p:nvSpPr>
+          <p:cNvPr id="98" name="Rectangle 97"/>
+          <p:cNvSpPr/>
+          <p:nvPr/>
+        </p:nvSpPr>
+        <p:spPr>
+          <a:xfrm>
+            <a:off x="4073290" y="2715921"/>
+            <a:ext cx="10542689" cy="1042402"/>
+          </a:xfrm>
+          <a:prstGeom prst="rect">
+            <a:avLst/>
+          </a:prstGeom>
+          <a:noFill/>
+          <a:ln>
+            <a:solidFill>
+              <a:schemeClr val="tx1"/>
+            </a:solidFill>
+          </a:ln>
+          <a:effectLst/>
+        </p:spPr>
+        <p:style>
+          <a:lnRef idx="2">
+            <a:schemeClr val="accent1">
+              <a:shade val="50000"/>
+            </a:schemeClr>
+          </a:lnRef>
+          <a:fillRef idx="1">
+            <a:schemeClr val="accent1"/>
+          </a:fillRef>
+          <a:effectRef idx="0">
+            <a:schemeClr val="accent1"/>
+          </a:effectRef>
+          <a:fontRef idx="minor">
+            <a:schemeClr val="lt1"/>
+          </a:fontRef>
+        </p:style>
+        <p:txBody>
+          <a:bodyPr rtlCol="0" anchor="ctr"/>
+          <a:lstStyle/>
+          <a:p>
+            <a:pPr algn="ctr"/>
+            <a:endParaRPr lang="en-US" dirty="0"/>
+          </a:p>
+        </p:txBody>
+      </p:sp>
+      <p:cxnSp>
+        <p:nvCxnSpPr>
+          <p:cNvPr id="103" name="Straight Connector 102"/>
+          <p:cNvCxnSpPr/>
+          <p:nvPr/>
+        </p:nvCxnSpPr>
+        <p:spPr>
+          <a:xfrm flipH="1" flipV="1">
+            <a:off x="4101214" y="3331037"/>
+            <a:ext cx="10526845" cy="1927"/>
+          </a:xfrm>
+          <a:prstGeom prst="line">
+            <a:avLst/>
+          </a:prstGeom>
+          <a:ln>
+            <a:solidFill>
+              <a:schemeClr val="tx1"/>
+            </a:solidFill>
+            <a:prstDash val="dash"/>
+          </a:ln>
+        </p:spPr>
+        <p:style>
+          <a:lnRef idx="1">
+            <a:schemeClr val="accent1"/>
+          </a:lnRef>
+          <a:fillRef idx="0">
+            <a:schemeClr val="accent1"/>
+          </a:fillRef>
+          <a:effectRef idx="0">
+            <a:schemeClr val="accent1"/>
+          </a:effectRef>
+          <a:fontRef idx="minor">
+            <a:schemeClr val="tx1"/>
+          </a:fontRef>
+        </p:style>
+      </p:cxnSp>
+      <p:sp>
+        <p:nvSpPr>
+          <p:cNvPr id="117" name="Rectangle 116"/>
+          <p:cNvSpPr/>
+          <p:nvPr/>
+        </p:nvSpPr>
+        <p:spPr>
+          <a:xfrm>
+            <a:off x="7999248" y="6193326"/>
+            <a:ext cx="1166954" cy="201168"/>
+          </a:xfrm>
+          <a:prstGeom prst="rect">
+            <a:avLst/>
+          </a:prstGeom>
+          <a:solidFill>
+            <a:schemeClr val="tx1"/>
+          </a:solidFill>
+        </p:spPr>
+        <p:style>
+          <a:lnRef idx="2">
+            <a:schemeClr val="accent1">
+              <a:shade val="50000"/>
+            </a:schemeClr>
+          </a:lnRef>
+          <a:fillRef idx="1">
+            <a:schemeClr val="accent1"/>
+          </a:fillRef>
+          <a:effectRef idx="0">
+            <a:schemeClr val="accent1"/>
+          </a:effectRef>
+          <a:fontRef idx="minor">
+            <a:schemeClr val="lt1"/>
+          </a:fontRef>
+        </p:style>
+        <p:txBody>
+          <a:bodyPr rtlCol="0" anchor="ctr"/>
+          <a:lstStyle/>
+          <a:p>
+            <a:pPr algn="ctr"/>
+            <a:endParaRPr lang="en-US" dirty="0"/>
           </a:p>
         </p:txBody>
       </p:sp>
@@ -6835,4 +7951,265 @@
     </a:ext>
   </a:extLst>
 </a:theme>
+</file>
+
+<file path=ppt/theme/theme2.xml><?xml version="1.0" encoding="utf-8"?>
+<a:theme xmlns:a="http://schemas.openxmlformats.org/drawingml/2006/main" name="Office Theme">
+  <a:themeElements>
+    <a:clrScheme name="Office">
+      <a:dk1>
+        <a:sysClr val="windowText" lastClr="000000"/>
+      </a:dk1>
+      <a:lt1>
+        <a:sysClr val="window" lastClr="FFFFFF"/>
+      </a:lt1>
+      <a:dk2>
+        <a:srgbClr val="44546A"/>
+      </a:dk2>
+      <a:lt2>
+        <a:srgbClr val="E7E6E6"/>
+      </a:lt2>
+      <a:accent1>
+        <a:srgbClr val="5B9BD5"/>
+      </a:accent1>
+      <a:accent2>
+        <a:srgbClr val="ED7D31"/>
+      </a:accent2>
+      <a:accent3>
+        <a:srgbClr val="A5A5A5"/>
+      </a:accent3>
+      <a:accent4>
+        <a:srgbClr val="FFC000"/>
+      </a:accent4>
+      <a:accent5>
+        <a:srgbClr val="4472C4"/>
+      </a:accent5>
+      <a:accent6>
+        <a:srgbClr val="70AD47"/>
+      </a:accent6>
+      <a:hlink>
+        <a:srgbClr val="0563C1"/>
+      </a:hlink>
+      <a:folHlink>
+        <a:srgbClr val="954F72"/>
+      </a:folHlink>
+    </a:clrScheme>
+    <a:fontScheme name="Office">
+      <a:majorFont>
+        <a:latin typeface="Calibri Light" panose="020F0302020204030204"/>
+        <a:ea typeface=""/>
+        <a:cs typeface=""/>
+        <a:font script="Jpan" typeface="ＭＳ Ｐゴシック"/>
+        <a:font script="Hang" typeface="맑은 고딕"/>
+        <a:font script="Hans" typeface="宋体"/>
+        <a:font script="Hant" typeface="新細明體"/>
+        <a:font script="Arab" typeface="Times New Roman"/>
+        <a:font script="Hebr" typeface="Times New Roman"/>
+        <a:font script="Thai" typeface="Angsana New"/>
+        <a:font script="Ethi" typeface="Nyala"/>
+        <a:font script="Beng" typeface="Vrinda"/>
+        <a:font script="Gujr" typeface="Shruti"/>
+        <a:font script="Khmr" typeface="MoolBoran"/>
+        <a:font script="Knda" typeface="Tunga"/>
+        <a:font script="Guru" typeface="Raavi"/>
+        <a:font script="Cans" typeface="Euphemia"/>
+        <a:font script="Cher" typeface="Plantagenet Cherokee"/>
+        <a:font script="Yiii" typeface="Microsoft Yi Baiti"/>
+        <a:font script="Tibt" typeface="Microsoft Himalaya"/>
+        <a:font script="Thaa" typeface="MV Boli"/>
+        <a:font script="Deva" typeface="Mangal"/>
+        <a:font script="Telu" typeface="Gautami"/>
+        <a:font script="Taml" typeface="Latha"/>
+        <a:font script="Syrc" typeface="Estrangelo Edessa"/>
+        <a:font script="Orya" typeface="Kalinga"/>
+        <a:font script="Mlym" typeface="Kartika"/>
+        <a:font script="Laoo" typeface="DokChampa"/>
+        <a:font script="Sinh" typeface="Iskoola Pota"/>
+        <a:font script="Mong" typeface="Mongolian Baiti"/>
+        <a:font script="Viet" typeface="Times New Roman"/>
+        <a:font script="Uigh" typeface="Microsoft Uighur"/>
+        <a:font script="Geor" typeface="Sylfaen"/>
+      </a:majorFont>
+      <a:minorFont>
+        <a:latin typeface="Calibri" panose="020F0502020204030204"/>
+        <a:ea typeface=""/>
+        <a:cs typeface=""/>
+        <a:font script="Jpan" typeface="ＭＳ Ｐゴシック"/>
+        <a:font script="Hang" typeface="맑은 고딕"/>
+        <a:font script="Hans" typeface="宋体"/>
+        <a:font script="Hant" typeface="新細明體"/>
+        <a:font script="Arab" typeface="Arial"/>
+        <a:font script="Hebr" typeface="Arial"/>
+        <a:font script="Thai" typeface="Cordia New"/>
+        <a:font script="Ethi" typeface="Nyala"/>
+        <a:font script="Beng" typeface="Vrinda"/>
+        <a:font script="Gujr" typeface="Shruti"/>
+        <a:font script="Khmr" typeface="DaunPenh"/>
+        <a:font script="Knda" typeface="Tunga"/>
+        <a:font script="Guru" typeface="Raavi"/>
+        <a:font script="Cans" typeface="Euphemia"/>
+        <a:font script="Cher" typeface="Plantagenet Cherokee"/>
+        <a:font script="Yiii" typeface="Microsoft Yi Baiti"/>
+        <a:font script="Tibt" typeface="Microsoft Himalaya"/>
+        <a:font script="Thaa" typeface="MV Boli"/>
+        <a:font script="Deva" typeface="Mangal"/>
+        <a:font script="Telu" typeface="Gautami"/>
+        <a:font script="Taml" typeface="Latha"/>
+        <a:font script="Syrc" typeface="Estrangelo Edessa"/>
+        <a:font script="Orya" typeface="Kalinga"/>
+        <a:font script="Mlym" typeface="Kartika"/>
+        <a:font script="Laoo" typeface="DokChampa"/>
+        <a:font script="Sinh" typeface="Iskoola Pota"/>
+        <a:font script="Mong" typeface="Mongolian Baiti"/>
+        <a:font script="Viet" typeface="Arial"/>
+        <a:font script="Uigh" typeface="Microsoft Uighur"/>
+        <a:font script="Geor" typeface="Sylfaen"/>
+      </a:minorFont>
+    </a:fontScheme>
+    <a:fmtScheme name="Office">
+      <a:fillStyleLst>
+        <a:solidFill>
+          <a:schemeClr val="phClr"/>
+        </a:solidFill>
+        <a:gradFill rotWithShape="1">
+          <a:gsLst>
+            <a:gs pos="0">
+              <a:schemeClr val="phClr">
+                <a:lumMod val="110000"/>
+                <a:satMod val="105000"/>
+                <a:tint val="67000"/>
+              </a:schemeClr>
+            </a:gs>
+            <a:gs pos="50000">
+              <a:schemeClr val="phClr">
+                <a:lumMod val="105000"/>
+                <a:satMod val="103000"/>
+                <a:tint val="73000"/>
+              </a:schemeClr>
+            </a:gs>
+            <a:gs pos="100000">
+              <a:schemeClr val="phClr">
+                <a:lumMod val="105000"/>
+                <a:satMod val="109000"/>
+                <a:tint val="81000"/>
+              </a:schemeClr>
+            </a:gs>
+          </a:gsLst>
+          <a:lin ang="5400000" scaled="0"/>
+        </a:gradFill>
+        <a:gradFill rotWithShape="1">
+          <a:gsLst>
+            <a:gs pos="0">
+              <a:schemeClr val="phClr">
+                <a:satMod val="103000"/>
+                <a:lumMod val="102000"/>
+                <a:tint val="94000"/>
+              </a:schemeClr>
+            </a:gs>
+            <a:gs pos="50000">
+              <a:schemeClr val="phClr">
+                <a:satMod val="110000"/>
+                <a:lumMod val="100000"/>
+                <a:shade val="100000"/>
+              </a:schemeClr>
+            </a:gs>
+            <a:gs pos="100000">
+              <a:schemeClr val="phClr">
+                <a:lumMod val="99000"/>
+                <a:satMod val="120000"/>
+                <a:shade val="78000"/>
+              </a:schemeClr>
+            </a:gs>
+          </a:gsLst>
+          <a:lin ang="5400000" scaled="0"/>
+        </a:gradFill>
+      </a:fillStyleLst>
+      <a:lnStyleLst>
+        <a:ln w="6350" cap="flat" cmpd="sng" algn="ctr">
+          <a:solidFill>
+            <a:schemeClr val="phClr"/>
+          </a:solidFill>
+          <a:prstDash val="solid"/>
+          <a:miter lim="800000"/>
+        </a:ln>
+        <a:ln w="12700" cap="flat" cmpd="sng" algn="ctr">
+          <a:solidFill>
+            <a:schemeClr val="phClr"/>
+          </a:solidFill>
+          <a:prstDash val="solid"/>
+          <a:miter lim="800000"/>
+        </a:ln>
+        <a:ln w="19050" cap="flat" cmpd="sng" algn="ctr">
+          <a:solidFill>
+            <a:schemeClr val="phClr"/>
+          </a:solidFill>
+          <a:prstDash val="solid"/>
+          <a:miter lim="800000"/>
+        </a:ln>
+      </a:lnStyleLst>
+      <a:effectStyleLst>
+        <a:effectStyle>
+          <a:effectLst/>
+        </a:effectStyle>
+        <a:effectStyle>
+          <a:effectLst/>
+        </a:effectStyle>
+        <a:effectStyle>
+          <a:effectLst>
+            <a:outerShdw blurRad="57150" dist="19050" dir="5400000" algn="ctr" rotWithShape="0">
+              <a:srgbClr val="000000">
+                <a:alpha val="63000"/>
+              </a:srgbClr>
+            </a:outerShdw>
+          </a:effectLst>
+        </a:effectStyle>
+      </a:effectStyleLst>
+      <a:bgFillStyleLst>
+        <a:solidFill>
+          <a:schemeClr val="phClr"/>
+        </a:solidFill>
+        <a:solidFill>
+          <a:schemeClr val="phClr">
+            <a:tint val="95000"/>
+            <a:satMod val="170000"/>
+          </a:schemeClr>
+        </a:solidFill>
+        <a:gradFill rotWithShape="1">
+          <a:gsLst>
+            <a:gs pos="0">
+              <a:schemeClr val="phClr">
+                <a:tint val="93000"/>
+                <a:satMod val="150000"/>
+                <a:shade val="98000"/>
+                <a:lumMod val="102000"/>
+              </a:schemeClr>
+            </a:gs>
+            <a:gs pos="50000">
+              <a:schemeClr val="phClr">
+                <a:tint val="98000"/>
+                <a:satMod val="130000"/>
+                <a:shade val="90000"/>
+                <a:lumMod val="103000"/>
+              </a:schemeClr>
+            </a:gs>
+            <a:gs pos="100000">
+              <a:schemeClr val="phClr">
+                <a:shade val="63000"/>
+                <a:satMod val="120000"/>
+              </a:schemeClr>
+            </a:gs>
+          </a:gsLst>
+          <a:lin ang="5400000" scaled="0"/>
+        </a:gradFill>
+      </a:bgFillStyleLst>
+    </a:fmtScheme>
+  </a:themeElements>
+  <a:objectDefaults/>
+  <a:extraClrSchemeLst/>
+  <a:extLst>
+    <a:ext uri="{05A4C25C-085E-4340-85A3-A5531E510DB2}">
+      <thm15:themeFamily xmlns:thm15="http://schemas.microsoft.com/office/thememl/2012/main" name="Office Theme" id="{62F939B6-93AF-4DB8-9C6B-D6C7DFDC589F}" vid="{4A3C46E8-61CC-4603-A589-7422A47A8E4A}"/>
+    </a:ext>
+  </a:extLst>
+</a:theme>
 </file>
</xml_diff>